<commit_message>
Agrego las futuras lineas
</commit_message>
<xml_diff>
--- a/ENTREGABLE N°3.pptx
+++ b/ENTREGABLE N°3.pptx
@@ -15,23 +15,24 @@
     <p:sldId id="264" r:id="rId9"/>
     <p:sldId id="265" r:id="rId10"/>
     <p:sldId id="266" r:id="rId11"/>
-    <p:sldId id="267" r:id="rId12"/>
-    <p:sldId id="268" r:id="rId13"/>
-    <p:sldId id="269" r:id="rId14"/>
-    <p:sldId id="270" r:id="rId15"/>
-    <p:sldId id="271" r:id="rId16"/>
-    <p:sldId id="272" r:id="rId17"/>
-    <p:sldId id="273" r:id="rId18"/>
-    <p:sldId id="274" r:id="rId19"/>
-    <p:sldId id="275" r:id="rId20"/>
-    <p:sldId id="276" r:id="rId21"/>
-    <p:sldId id="277" r:id="rId22"/>
-    <p:sldId id="278" r:id="rId23"/>
-    <p:sldId id="279" r:id="rId24"/>
-    <p:sldId id="280" r:id="rId25"/>
-    <p:sldId id="281" r:id="rId26"/>
-    <p:sldId id="282" r:id="rId27"/>
-    <p:sldId id="283" r:id="rId28"/>
+    <p:sldId id="284" r:id="rId12"/>
+    <p:sldId id="267" r:id="rId13"/>
+    <p:sldId id="268" r:id="rId14"/>
+    <p:sldId id="269" r:id="rId15"/>
+    <p:sldId id="270" r:id="rId16"/>
+    <p:sldId id="271" r:id="rId17"/>
+    <p:sldId id="272" r:id="rId18"/>
+    <p:sldId id="273" r:id="rId19"/>
+    <p:sldId id="274" r:id="rId20"/>
+    <p:sldId id="275" r:id="rId21"/>
+    <p:sldId id="276" r:id="rId22"/>
+    <p:sldId id="277" r:id="rId23"/>
+    <p:sldId id="278" r:id="rId24"/>
+    <p:sldId id="279" r:id="rId25"/>
+    <p:sldId id="280" r:id="rId26"/>
+    <p:sldId id="281" r:id="rId27"/>
+    <p:sldId id="282" r:id="rId28"/>
+    <p:sldId id="283" r:id="rId29"/>
   </p:sldIdLst>
   <p:sldSz cx="12192000" cy="6858000"/>
   <p:notesSz cx="6858000" cy="9144000"/>
@@ -287,7 +288,7 @@
           <a:p>
             <a:fld id="{2003E9E0-235C-40B6-9F34-CF215F21C9F9}" type="datetimeFigureOut">
               <a:rPr lang="es-AR" smtClean="0"/>
-              <a:t>13/3/23</a:t>
+              <a:t>14/3/23</a:t>
             </a:fld>
             <a:endParaRPr lang="es-AR"/>
           </a:p>
@@ -487,7 +488,7 @@
           <a:p>
             <a:fld id="{2003E9E0-235C-40B6-9F34-CF215F21C9F9}" type="datetimeFigureOut">
               <a:rPr lang="es-AR" smtClean="0"/>
-              <a:t>13/3/23</a:t>
+              <a:t>14/3/23</a:t>
             </a:fld>
             <a:endParaRPr lang="es-AR"/>
           </a:p>
@@ -697,7 +698,7 @@
           <a:p>
             <a:fld id="{2003E9E0-235C-40B6-9F34-CF215F21C9F9}" type="datetimeFigureOut">
               <a:rPr lang="es-AR" smtClean="0"/>
-              <a:t>13/3/23</a:t>
+              <a:t>14/3/23</a:t>
             </a:fld>
             <a:endParaRPr lang="es-AR"/>
           </a:p>
@@ -897,7 +898,7 @@
           <a:p>
             <a:fld id="{2003E9E0-235C-40B6-9F34-CF215F21C9F9}" type="datetimeFigureOut">
               <a:rPr lang="es-AR" smtClean="0"/>
-              <a:t>13/3/23</a:t>
+              <a:t>14/3/23</a:t>
             </a:fld>
             <a:endParaRPr lang="es-AR"/>
           </a:p>
@@ -1173,7 +1174,7 @@
           <a:p>
             <a:fld id="{2003E9E0-235C-40B6-9F34-CF215F21C9F9}" type="datetimeFigureOut">
               <a:rPr lang="es-AR" smtClean="0"/>
-              <a:t>13/3/23</a:t>
+              <a:t>14/3/23</a:t>
             </a:fld>
             <a:endParaRPr lang="es-AR"/>
           </a:p>
@@ -1441,7 +1442,7 @@
           <a:p>
             <a:fld id="{2003E9E0-235C-40B6-9F34-CF215F21C9F9}" type="datetimeFigureOut">
               <a:rPr lang="es-AR" smtClean="0"/>
-              <a:t>13/3/23</a:t>
+              <a:t>14/3/23</a:t>
             </a:fld>
             <a:endParaRPr lang="es-AR"/>
           </a:p>
@@ -1856,7 +1857,7 @@
           <a:p>
             <a:fld id="{2003E9E0-235C-40B6-9F34-CF215F21C9F9}" type="datetimeFigureOut">
               <a:rPr lang="es-AR" smtClean="0"/>
-              <a:t>13/3/23</a:t>
+              <a:t>14/3/23</a:t>
             </a:fld>
             <a:endParaRPr lang="es-AR"/>
           </a:p>
@@ -1998,7 +1999,7 @@
           <a:p>
             <a:fld id="{2003E9E0-235C-40B6-9F34-CF215F21C9F9}" type="datetimeFigureOut">
               <a:rPr lang="es-AR" smtClean="0"/>
-              <a:t>13/3/23</a:t>
+              <a:t>14/3/23</a:t>
             </a:fld>
             <a:endParaRPr lang="es-AR"/>
           </a:p>
@@ -2111,7 +2112,7 @@
           <a:p>
             <a:fld id="{2003E9E0-235C-40B6-9F34-CF215F21C9F9}" type="datetimeFigureOut">
               <a:rPr lang="es-AR" smtClean="0"/>
-              <a:t>13/3/23</a:t>
+              <a:t>14/3/23</a:t>
             </a:fld>
             <a:endParaRPr lang="es-AR"/>
           </a:p>
@@ -2424,7 +2425,7 @@
           <a:p>
             <a:fld id="{2003E9E0-235C-40B6-9F34-CF215F21C9F9}" type="datetimeFigureOut">
               <a:rPr lang="es-AR" smtClean="0"/>
-              <a:t>13/3/23</a:t>
+              <a:t>14/3/23</a:t>
             </a:fld>
             <a:endParaRPr lang="es-AR"/>
           </a:p>
@@ -2713,7 +2714,7 @@
           <a:p>
             <a:fld id="{2003E9E0-235C-40B6-9F34-CF215F21C9F9}" type="datetimeFigureOut">
               <a:rPr lang="es-AR" smtClean="0"/>
-              <a:t>13/3/23</a:t>
+              <a:t>14/3/23</a:t>
             </a:fld>
             <a:endParaRPr lang="es-AR"/>
           </a:p>
@@ -2956,7 +2957,7 @@
           <a:p>
             <a:fld id="{2003E9E0-235C-40B6-9F34-CF215F21C9F9}" type="datetimeFigureOut">
               <a:rPr lang="es-AR" smtClean="0"/>
-              <a:t>13/3/23</a:t>
+              <a:t>14/3/23</a:t>
             </a:fld>
             <a:endParaRPr lang="es-AR"/>
           </a:p>
@@ -4902,152 +4903,1326 @@
           <a:chExt cx="0" cy="0"/>
         </a:xfrm>
       </p:grpSpPr>
+      <p:graphicFrame>
+        <p:nvGraphicFramePr>
+          <p:cNvPr id="4" name="Tabla 3">
+            <a:extLst>
+              <a:ext uri="{FF2B5EF4-FFF2-40B4-BE49-F238E27FC236}">
+                <a16:creationId xmlns:a16="http://schemas.microsoft.com/office/drawing/2014/main" id="{71DE7746-B276-4206-98AE-4506DD3B0016}"/>
+              </a:ext>
+            </a:extLst>
+          </p:cNvPr>
+          <p:cNvGraphicFramePr>
+            <a:graphicFrameLocks noGrp="1"/>
+          </p:cNvGraphicFramePr>
+          <p:nvPr>
+            <p:extLst>
+              <p:ext uri="{D42A27DB-BD31-4B8C-83A1-F6EECF244321}">
+                <p14:modId xmlns:p14="http://schemas.microsoft.com/office/powerpoint/2010/main" val="1750658024"/>
+              </p:ext>
+            </p:extLst>
+          </p:nvPr>
+        </p:nvGraphicFramePr>
+        <p:xfrm>
+          <a:off x="717550" y="453335"/>
+          <a:ext cx="4356099" cy="2413000"/>
+        </p:xfrm>
+        <a:graphic>
+          <a:graphicData uri="http://schemas.openxmlformats.org/drawingml/2006/table">
+            <a:tbl>
+              <a:tblPr>
+                <a:tableStyleId>{5C22544A-7EE6-4342-B048-85BDC9FD1C3A}</a:tableStyleId>
+              </a:tblPr>
+              <a:tblGrid>
+                <a:gridCol w="1229621">
+                  <a:extLst>
+                    <a:ext uri="{9D8B030D-6E8A-4147-A177-3AD203B41FA5}">
+                      <a16:colId xmlns:a16="http://schemas.microsoft.com/office/drawing/2014/main" val="3480113576"/>
+                    </a:ext>
+                  </a:extLst>
+                </a:gridCol>
+                <a:gridCol w="1401196">
+                  <a:extLst>
+                    <a:ext uri="{9D8B030D-6E8A-4147-A177-3AD203B41FA5}">
+                      <a16:colId xmlns:a16="http://schemas.microsoft.com/office/drawing/2014/main" val="80442749"/>
+                    </a:ext>
+                  </a:extLst>
+                </a:gridCol>
+                <a:gridCol w="1725282">
+                  <a:extLst>
+                    <a:ext uri="{9D8B030D-6E8A-4147-A177-3AD203B41FA5}">
+                      <a16:colId xmlns:a16="http://schemas.microsoft.com/office/drawing/2014/main" val="825768545"/>
+                    </a:ext>
+                  </a:extLst>
+                </a:gridCol>
+              </a:tblGrid>
+              <a:tr h="279400">
+                <a:tc gridSpan="3">
+                  <a:txBody>
+                    <a:bodyPr/>
+                    <a:lstStyle/>
+                    <a:p>
+                      <a:pPr algn="ctr" fontAlgn="b"/>
+                      <a:r>
+                        <a:rPr lang="es-AR" sz="1600" u="none" strike="noStrike">
+                          <a:effectLst/>
+                        </a:rPr>
+                        <a:t>TABLA - BIBLIOTECA</a:t>
+                      </a:r>
+                      <a:endParaRPr lang="es-AR" sz="1600" b="1" i="0" u="none" strike="noStrike">
+                        <a:solidFill>
+                          <a:srgbClr val="FF0000"/>
+                        </a:solidFill>
+                        <a:effectLst/>
+                        <a:latin typeface="Calibri" panose="020F0502020204030204" pitchFamily="34" charset="0"/>
+                      </a:endParaRPr>
+                    </a:p>
+                  </a:txBody>
+                  <a:tcPr marL="9525" marR="9525" marT="9525" marB="0" anchor="b"/>
+                </a:tc>
+                <a:tc hMerge="1">
+                  <a:txBody>
+                    <a:bodyPr/>
+                    <a:lstStyle/>
+                    <a:p>
+                      <a:endParaRPr lang="es-AR"/>
+                    </a:p>
+                  </a:txBody>
+                  <a:tcPr/>
+                </a:tc>
+                <a:tc hMerge="1">
+                  <a:txBody>
+                    <a:bodyPr/>
+                    <a:lstStyle/>
+                    <a:p>
+                      <a:endParaRPr lang="es-AR"/>
+                    </a:p>
+                  </a:txBody>
+                  <a:tcPr/>
+                </a:tc>
+                <a:extLst>
+                  <a:ext uri="{0D108BD9-81ED-4DB2-BD59-A6C34878D82A}">
+                    <a16:rowId xmlns:a16="http://schemas.microsoft.com/office/drawing/2014/main" val="1196360055"/>
+                  </a:ext>
+                </a:extLst>
+              </a:tr>
+              <a:tr h="266700">
+                <a:tc>
+                  <a:txBody>
+                    <a:bodyPr/>
+                    <a:lstStyle/>
+                    <a:p>
+                      <a:pPr algn="ctr" fontAlgn="b"/>
+                      <a:endParaRPr lang="es-AR" sz="1600" b="0" i="0" u="none" strike="noStrike">
+                        <a:solidFill>
+                          <a:srgbClr val="000000"/>
+                        </a:solidFill>
+                        <a:effectLst/>
+                        <a:latin typeface="Calibri" panose="020F0502020204030204" pitchFamily="34" charset="0"/>
+                      </a:endParaRPr>
+                    </a:p>
+                  </a:txBody>
+                  <a:tcPr marL="9525" marR="9525" marT="9525" marB="0" anchor="b"/>
+                </a:tc>
+                <a:tc>
+                  <a:txBody>
+                    <a:bodyPr/>
+                    <a:lstStyle/>
+                    <a:p>
+                      <a:pPr algn="ctr" fontAlgn="b"/>
+                      <a:endParaRPr lang="es-AR" sz="1600" b="0" i="0" u="none" strike="noStrike">
+                        <a:solidFill>
+                          <a:srgbClr val="000000"/>
+                        </a:solidFill>
+                        <a:effectLst/>
+                        <a:latin typeface="Calibri" panose="020F0502020204030204" pitchFamily="34" charset="0"/>
+                      </a:endParaRPr>
+                    </a:p>
+                  </a:txBody>
+                  <a:tcPr marL="9525" marR="9525" marT="9525" marB="0" anchor="b"/>
+                </a:tc>
+                <a:tc>
+                  <a:txBody>
+                    <a:bodyPr/>
+                    <a:lstStyle/>
+                    <a:p>
+                      <a:pPr algn="ctr" fontAlgn="b"/>
+                      <a:endParaRPr lang="es-AR" sz="1600" b="0" i="0" u="none" strike="noStrike">
+                        <a:solidFill>
+                          <a:srgbClr val="000000"/>
+                        </a:solidFill>
+                        <a:effectLst/>
+                        <a:latin typeface="Calibri" panose="020F0502020204030204" pitchFamily="34" charset="0"/>
+                      </a:endParaRPr>
+                    </a:p>
+                  </a:txBody>
+                  <a:tcPr marL="9525" marR="9525" marT="9525" marB="0" anchor="b"/>
+                </a:tc>
+                <a:extLst>
+                  <a:ext uri="{0D108BD9-81ED-4DB2-BD59-A6C34878D82A}">
+                    <a16:rowId xmlns:a16="http://schemas.microsoft.com/office/drawing/2014/main" val="4126097446"/>
+                  </a:ext>
+                </a:extLst>
+              </a:tr>
+              <a:tr h="266700">
+                <a:tc>
+                  <a:txBody>
+                    <a:bodyPr/>
+                    <a:lstStyle/>
+                    <a:p>
+                      <a:pPr algn="ctr" fontAlgn="b"/>
+                      <a:r>
+                        <a:rPr lang="es-AR" sz="1600" u="none" strike="noStrike">
+                          <a:effectLst/>
+                        </a:rPr>
+                        <a:t>TIPO CLAVE</a:t>
+                      </a:r>
+                      <a:endParaRPr lang="es-AR" sz="1600" b="1" i="0" u="none" strike="noStrike">
+                        <a:solidFill>
+                          <a:srgbClr val="000000"/>
+                        </a:solidFill>
+                        <a:effectLst/>
+                        <a:latin typeface="Calibri" panose="020F0502020204030204" pitchFamily="34" charset="0"/>
+                      </a:endParaRPr>
+                    </a:p>
+                  </a:txBody>
+                  <a:tcPr marL="9525" marR="9525" marT="9525" marB="0" anchor="b"/>
+                </a:tc>
+                <a:tc>
+                  <a:txBody>
+                    <a:bodyPr/>
+                    <a:lstStyle/>
+                    <a:p>
+                      <a:pPr algn="ctr" fontAlgn="b"/>
+                      <a:r>
+                        <a:rPr lang="es-AR" sz="1600" u="none" strike="noStrike">
+                          <a:effectLst/>
+                        </a:rPr>
+                        <a:t>CAMPO</a:t>
+                      </a:r>
+                      <a:endParaRPr lang="es-AR" sz="1600" b="1" i="0" u="none" strike="noStrike">
+                        <a:solidFill>
+                          <a:srgbClr val="000000"/>
+                        </a:solidFill>
+                        <a:effectLst/>
+                        <a:latin typeface="Calibri" panose="020F0502020204030204" pitchFamily="34" charset="0"/>
+                      </a:endParaRPr>
+                    </a:p>
+                  </a:txBody>
+                  <a:tcPr marL="9525" marR="9525" marT="9525" marB="0" anchor="b"/>
+                </a:tc>
+                <a:tc>
+                  <a:txBody>
+                    <a:bodyPr/>
+                    <a:lstStyle/>
+                    <a:p>
+                      <a:pPr algn="ctr" fontAlgn="b"/>
+                      <a:r>
+                        <a:rPr lang="es-AR" sz="1600" u="none" strike="noStrike">
+                          <a:effectLst/>
+                        </a:rPr>
+                        <a:t>TIPO CAMPO</a:t>
+                      </a:r>
+                      <a:endParaRPr lang="es-AR" sz="1600" b="1" i="0" u="none" strike="noStrike">
+                        <a:solidFill>
+                          <a:srgbClr val="000000"/>
+                        </a:solidFill>
+                        <a:effectLst/>
+                        <a:latin typeface="Calibri" panose="020F0502020204030204" pitchFamily="34" charset="0"/>
+                      </a:endParaRPr>
+                    </a:p>
+                  </a:txBody>
+                  <a:tcPr marL="9525" marR="9525" marT="9525" marB="0" anchor="b"/>
+                </a:tc>
+                <a:extLst>
+                  <a:ext uri="{0D108BD9-81ED-4DB2-BD59-A6C34878D82A}">
+                    <a16:rowId xmlns:a16="http://schemas.microsoft.com/office/drawing/2014/main" val="1133698618"/>
+                  </a:ext>
+                </a:extLst>
+              </a:tr>
+              <a:tr h="266700">
+                <a:tc>
+                  <a:txBody>
+                    <a:bodyPr/>
+                    <a:lstStyle/>
+                    <a:p>
+                      <a:pPr algn="ctr" fontAlgn="b"/>
+                      <a:r>
+                        <a:rPr lang="es-AR" sz="1600" u="none" strike="noStrike">
+                          <a:effectLst/>
+                        </a:rPr>
+                        <a:t>PK</a:t>
+                      </a:r>
+                      <a:endParaRPr lang="es-AR" sz="1600" b="0" i="0" u="none" strike="noStrike">
+                        <a:solidFill>
+                          <a:srgbClr val="000000"/>
+                        </a:solidFill>
+                        <a:effectLst/>
+                        <a:latin typeface="Calibri" panose="020F0502020204030204" pitchFamily="34" charset="0"/>
+                      </a:endParaRPr>
+                    </a:p>
+                  </a:txBody>
+                  <a:tcPr marL="9525" marR="9525" marT="9525" marB="0" anchor="b"/>
+                </a:tc>
+                <a:tc>
+                  <a:txBody>
+                    <a:bodyPr/>
+                    <a:lstStyle/>
+                    <a:p>
+                      <a:pPr algn="ctr" fontAlgn="b"/>
+                      <a:r>
+                        <a:rPr lang="es-AR" sz="1600" u="none" strike="noStrike">
+                          <a:effectLst/>
+                        </a:rPr>
+                        <a:t>libro_id</a:t>
+                      </a:r>
+                      <a:endParaRPr lang="es-AR" sz="1600" b="0" i="0" u="none" strike="noStrike">
+                        <a:solidFill>
+                          <a:srgbClr val="000000"/>
+                        </a:solidFill>
+                        <a:effectLst/>
+                        <a:latin typeface="Calibri" panose="020F0502020204030204" pitchFamily="34" charset="0"/>
+                      </a:endParaRPr>
+                    </a:p>
+                  </a:txBody>
+                  <a:tcPr marL="9525" marR="9525" marT="9525" marB="0" anchor="b"/>
+                </a:tc>
+                <a:tc>
+                  <a:txBody>
+                    <a:bodyPr/>
+                    <a:lstStyle/>
+                    <a:p>
+                      <a:pPr algn="ctr" fontAlgn="b"/>
+                      <a:r>
+                        <a:rPr lang="es-AR" sz="1600" u="none" strike="noStrike">
+                          <a:effectLst/>
+                        </a:rPr>
+                        <a:t>INT, NOT NULL, AI</a:t>
+                      </a:r>
+                      <a:endParaRPr lang="es-AR" sz="1600" b="0" i="0" u="none" strike="noStrike">
+                        <a:solidFill>
+                          <a:srgbClr val="000000"/>
+                        </a:solidFill>
+                        <a:effectLst/>
+                        <a:latin typeface="Calibri" panose="020F0502020204030204" pitchFamily="34" charset="0"/>
+                      </a:endParaRPr>
+                    </a:p>
+                  </a:txBody>
+                  <a:tcPr marL="9525" marR="9525" marT="9525" marB="0" anchor="b"/>
+                </a:tc>
+                <a:extLst>
+                  <a:ext uri="{0D108BD9-81ED-4DB2-BD59-A6C34878D82A}">
+                    <a16:rowId xmlns:a16="http://schemas.microsoft.com/office/drawing/2014/main" val="1540354631"/>
+                  </a:ext>
+                </a:extLst>
+              </a:tr>
+              <a:tr h="266700">
+                <a:tc>
+                  <a:txBody>
+                    <a:bodyPr/>
+                    <a:lstStyle/>
+                    <a:p>
+                      <a:pPr algn="ctr" fontAlgn="b"/>
+                      <a:r>
+                        <a:rPr lang="es-AR" sz="1600" u="none" strike="noStrike">
+                          <a:effectLst/>
+                        </a:rPr>
+                        <a:t>--</a:t>
+                      </a:r>
+                      <a:endParaRPr lang="es-AR" sz="1600" b="0" i="0" u="none" strike="noStrike">
+                        <a:solidFill>
+                          <a:srgbClr val="000000"/>
+                        </a:solidFill>
+                        <a:effectLst/>
+                        <a:latin typeface="Calibri" panose="020F0502020204030204" pitchFamily="34" charset="0"/>
+                      </a:endParaRPr>
+                    </a:p>
+                  </a:txBody>
+                  <a:tcPr marL="9525" marR="9525" marT="9525" marB="0" anchor="b"/>
+                </a:tc>
+                <a:tc>
+                  <a:txBody>
+                    <a:bodyPr/>
+                    <a:lstStyle/>
+                    <a:p>
+                      <a:pPr algn="ctr" fontAlgn="b"/>
+                      <a:r>
+                        <a:rPr lang="es-AR" sz="1600" u="none" strike="noStrike">
+                          <a:effectLst/>
+                        </a:rPr>
+                        <a:t>isbn</a:t>
+                      </a:r>
+                      <a:endParaRPr lang="es-AR" sz="1600" b="0" i="0" u="none" strike="noStrike">
+                        <a:solidFill>
+                          <a:srgbClr val="000000"/>
+                        </a:solidFill>
+                        <a:effectLst/>
+                        <a:latin typeface="Calibri" panose="020F0502020204030204" pitchFamily="34" charset="0"/>
+                      </a:endParaRPr>
+                    </a:p>
+                  </a:txBody>
+                  <a:tcPr marL="9525" marR="9525" marT="9525" marB="0" anchor="b"/>
+                </a:tc>
+                <a:tc>
+                  <a:txBody>
+                    <a:bodyPr/>
+                    <a:lstStyle/>
+                    <a:p>
+                      <a:pPr algn="ctr" fontAlgn="b"/>
+                      <a:r>
+                        <a:rPr lang="es-AR" sz="1600" u="none" strike="noStrike">
+                          <a:effectLst/>
+                        </a:rPr>
+                        <a:t>VARCHAR(50)</a:t>
+                      </a:r>
+                      <a:endParaRPr lang="es-AR" sz="1600" b="0" i="0" u="none" strike="noStrike">
+                        <a:solidFill>
+                          <a:srgbClr val="000000"/>
+                        </a:solidFill>
+                        <a:effectLst/>
+                        <a:latin typeface="Calibri" panose="020F0502020204030204" pitchFamily="34" charset="0"/>
+                      </a:endParaRPr>
+                    </a:p>
+                  </a:txBody>
+                  <a:tcPr marL="9525" marR="9525" marT="9525" marB="0" anchor="b"/>
+                </a:tc>
+                <a:extLst>
+                  <a:ext uri="{0D108BD9-81ED-4DB2-BD59-A6C34878D82A}">
+                    <a16:rowId xmlns:a16="http://schemas.microsoft.com/office/drawing/2014/main" val="1841510195"/>
+                  </a:ext>
+                </a:extLst>
+              </a:tr>
+              <a:tr h="266700">
+                <a:tc>
+                  <a:txBody>
+                    <a:bodyPr/>
+                    <a:lstStyle/>
+                    <a:p>
+                      <a:pPr algn="ctr" fontAlgn="b"/>
+                      <a:r>
+                        <a:rPr lang="es-AR" sz="1600" u="none" strike="noStrike">
+                          <a:effectLst/>
+                        </a:rPr>
+                        <a:t>--</a:t>
+                      </a:r>
+                      <a:endParaRPr lang="es-AR" sz="1600" b="0" i="0" u="none" strike="noStrike">
+                        <a:solidFill>
+                          <a:srgbClr val="000000"/>
+                        </a:solidFill>
+                        <a:effectLst/>
+                        <a:latin typeface="Calibri" panose="020F0502020204030204" pitchFamily="34" charset="0"/>
+                      </a:endParaRPr>
+                    </a:p>
+                  </a:txBody>
+                  <a:tcPr marL="9525" marR="9525" marT="9525" marB="0" anchor="b"/>
+                </a:tc>
+                <a:tc>
+                  <a:txBody>
+                    <a:bodyPr/>
+                    <a:lstStyle/>
+                    <a:p>
+                      <a:pPr algn="ctr" fontAlgn="b"/>
+                      <a:r>
+                        <a:rPr lang="es-AR" sz="1600" u="none" strike="noStrike">
+                          <a:effectLst/>
+                        </a:rPr>
+                        <a:t>titulo</a:t>
+                      </a:r>
+                      <a:endParaRPr lang="es-AR" sz="1600" b="0" i="0" u="none" strike="noStrike">
+                        <a:solidFill>
+                          <a:srgbClr val="000000"/>
+                        </a:solidFill>
+                        <a:effectLst/>
+                        <a:latin typeface="Calibri" panose="020F0502020204030204" pitchFamily="34" charset="0"/>
+                      </a:endParaRPr>
+                    </a:p>
+                  </a:txBody>
+                  <a:tcPr marL="9525" marR="9525" marT="9525" marB="0" anchor="b"/>
+                </a:tc>
+                <a:tc>
+                  <a:txBody>
+                    <a:bodyPr/>
+                    <a:lstStyle/>
+                    <a:p>
+                      <a:pPr algn="ctr" fontAlgn="b"/>
+                      <a:r>
+                        <a:rPr lang="es-AR" sz="1600" u="none" strike="noStrike">
+                          <a:effectLst/>
+                        </a:rPr>
+                        <a:t>VARCHAR(50)</a:t>
+                      </a:r>
+                      <a:endParaRPr lang="es-AR" sz="1600" b="0" i="0" u="none" strike="noStrike">
+                        <a:solidFill>
+                          <a:srgbClr val="000000"/>
+                        </a:solidFill>
+                        <a:effectLst/>
+                        <a:latin typeface="Calibri" panose="020F0502020204030204" pitchFamily="34" charset="0"/>
+                      </a:endParaRPr>
+                    </a:p>
+                  </a:txBody>
+                  <a:tcPr marL="9525" marR="9525" marT="9525" marB="0" anchor="b"/>
+                </a:tc>
+                <a:extLst>
+                  <a:ext uri="{0D108BD9-81ED-4DB2-BD59-A6C34878D82A}">
+                    <a16:rowId xmlns:a16="http://schemas.microsoft.com/office/drawing/2014/main" val="1153714305"/>
+                  </a:ext>
+                </a:extLst>
+              </a:tr>
+              <a:tr h="266700">
+                <a:tc>
+                  <a:txBody>
+                    <a:bodyPr/>
+                    <a:lstStyle/>
+                    <a:p>
+                      <a:pPr algn="ctr" fontAlgn="b"/>
+                      <a:r>
+                        <a:rPr lang="es-AR" sz="1600" u="none" strike="noStrike">
+                          <a:effectLst/>
+                        </a:rPr>
+                        <a:t>--</a:t>
+                      </a:r>
+                      <a:endParaRPr lang="es-AR" sz="1600" b="0" i="0" u="none" strike="noStrike">
+                        <a:solidFill>
+                          <a:srgbClr val="000000"/>
+                        </a:solidFill>
+                        <a:effectLst/>
+                        <a:latin typeface="Calibri" panose="020F0502020204030204" pitchFamily="34" charset="0"/>
+                      </a:endParaRPr>
+                    </a:p>
+                  </a:txBody>
+                  <a:tcPr marL="9525" marR="9525" marT="9525" marB="0" anchor="b"/>
+                </a:tc>
+                <a:tc>
+                  <a:txBody>
+                    <a:bodyPr/>
+                    <a:lstStyle/>
+                    <a:p>
+                      <a:pPr algn="ctr" fontAlgn="b"/>
+                      <a:r>
+                        <a:rPr lang="es-AR" sz="1600" u="none" strike="noStrike">
+                          <a:effectLst/>
+                        </a:rPr>
+                        <a:t>categoria</a:t>
+                      </a:r>
+                      <a:endParaRPr lang="es-AR" sz="1600" b="0" i="0" u="none" strike="noStrike">
+                        <a:solidFill>
+                          <a:srgbClr val="000000"/>
+                        </a:solidFill>
+                        <a:effectLst/>
+                        <a:latin typeface="Calibri" panose="020F0502020204030204" pitchFamily="34" charset="0"/>
+                      </a:endParaRPr>
+                    </a:p>
+                  </a:txBody>
+                  <a:tcPr marL="9525" marR="9525" marT="9525" marB="0" anchor="b"/>
+                </a:tc>
+                <a:tc>
+                  <a:txBody>
+                    <a:bodyPr/>
+                    <a:lstStyle/>
+                    <a:p>
+                      <a:pPr algn="ctr" fontAlgn="b"/>
+                      <a:r>
+                        <a:rPr lang="es-AR" sz="1600" u="none" strike="noStrike">
+                          <a:effectLst/>
+                        </a:rPr>
+                        <a:t>VARCHAR(50)</a:t>
+                      </a:r>
+                      <a:endParaRPr lang="es-AR" sz="1600" b="0" i="0" u="none" strike="noStrike">
+                        <a:solidFill>
+                          <a:srgbClr val="000000"/>
+                        </a:solidFill>
+                        <a:effectLst/>
+                        <a:latin typeface="Calibri" panose="020F0502020204030204" pitchFamily="34" charset="0"/>
+                      </a:endParaRPr>
+                    </a:p>
+                  </a:txBody>
+                  <a:tcPr marL="9525" marR="9525" marT="9525" marB="0" anchor="b"/>
+                </a:tc>
+                <a:extLst>
+                  <a:ext uri="{0D108BD9-81ED-4DB2-BD59-A6C34878D82A}">
+                    <a16:rowId xmlns:a16="http://schemas.microsoft.com/office/drawing/2014/main" val="3633803964"/>
+                  </a:ext>
+                </a:extLst>
+              </a:tr>
+              <a:tr h="266700">
+                <a:tc>
+                  <a:txBody>
+                    <a:bodyPr/>
+                    <a:lstStyle/>
+                    <a:p>
+                      <a:pPr algn="ctr" fontAlgn="b"/>
+                      <a:r>
+                        <a:rPr lang="es-AR" sz="1600" u="none" strike="noStrike">
+                          <a:effectLst/>
+                        </a:rPr>
+                        <a:t>--</a:t>
+                      </a:r>
+                      <a:endParaRPr lang="es-AR" sz="1600" b="0" i="0" u="none" strike="noStrike">
+                        <a:solidFill>
+                          <a:srgbClr val="000000"/>
+                        </a:solidFill>
+                        <a:effectLst/>
+                        <a:latin typeface="Calibri" panose="020F0502020204030204" pitchFamily="34" charset="0"/>
+                      </a:endParaRPr>
+                    </a:p>
+                  </a:txBody>
+                  <a:tcPr marL="9525" marR="9525" marT="9525" marB="0" anchor="b"/>
+                </a:tc>
+                <a:tc>
+                  <a:txBody>
+                    <a:bodyPr/>
+                    <a:lstStyle/>
+                    <a:p>
+                      <a:pPr algn="ctr" fontAlgn="b"/>
+                      <a:r>
+                        <a:rPr lang="es-AR" sz="1600" u="none" strike="noStrike">
+                          <a:effectLst/>
+                        </a:rPr>
+                        <a:t>paginas</a:t>
+                      </a:r>
+                      <a:endParaRPr lang="es-AR" sz="1600" b="0" i="0" u="none" strike="noStrike">
+                        <a:solidFill>
+                          <a:srgbClr val="000000"/>
+                        </a:solidFill>
+                        <a:effectLst/>
+                        <a:latin typeface="Calibri" panose="020F0502020204030204" pitchFamily="34" charset="0"/>
+                      </a:endParaRPr>
+                    </a:p>
+                  </a:txBody>
+                  <a:tcPr marL="9525" marR="9525" marT="9525" marB="0" anchor="b"/>
+                </a:tc>
+                <a:tc>
+                  <a:txBody>
+                    <a:bodyPr/>
+                    <a:lstStyle/>
+                    <a:p>
+                      <a:pPr algn="ctr" fontAlgn="b"/>
+                      <a:r>
+                        <a:rPr lang="es-AR" sz="1600" u="none" strike="noStrike">
+                          <a:effectLst/>
+                        </a:rPr>
+                        <a:t>INT</a:t>
+                      </a:r>
+                      <a:endParaRPr lang="es-AR" sz="1600" b="0" i="0" u="none" strike="noStrike">
+                        <a:solidFill>
+                          <a:srgbClr val="000000"/>
+                        </a:solidFill>
+                        <a:effectLst/>
+                        <a:latin typeface="Calibri" panose="020F0502020204030204" pitchFamily="34" charset="0"/>
+                      </a:endParaRPr>
+                    </a:p>
+                  </a:txBody>
+                  <a:tcPr marL="9525" marR="9525" marT="9525" marB="0" anchor="b"/>
+                </a:tc>
+                <a:extLst>
+                  <a:ext uri="{0D108BD9-81ED-4DB2-BD59-A6C34878D82A}">
+                    <a16:rowId xmlns:a16="http://schemas.microsoft.com/office/drawing/2014/main" val="3580405414"/>
+                  </a:ext>
+                </a:extLst>
+              </a:tr>
+              <a:tr h="266700">
+                <a:tc>
+                  <a:txBody>
+                    <a:bodyPr/>
+                    <a:lstStyle/>
+                    <a:p>
+                      <a:pPr algn="ctr" fontAlgn="b"/>
+                      <a:r>
+                        <a:rPr lang="es-AR" sz="1600" u="none" strike="noStrike">
+                          <a:effectLst/>
+                        </a:rPr>
+                        <a:t>--</a:t>
+                      </a:r>
+                      <a:endParaRPr lang="es-AR" sz="1600" b="0" i="0" u="none" strike="noStrike">
+                        <a:solidFill>
+                          <a:srgbClr val="000000"/>
+                        </a:solidFill>
+                        <a:effectLst/>
+                        <a:latin typeface="Calibri" panose="020F0502020204030204" pitchFamily="34" charset="0"/>
+                      </a:endParaRPr>
+                    </a:p>
+                  </a:txBody>
+                  <a:tcPr marL="9525" marR="9525" marT="9525" marB="0" anchor="b"/>
+                </a:tc>
+                <a:tc>
+                  <a:txBody>
+                    <a:bodyPr/>
+                    <a:lstStyle/>
+                    <a:p>
+                      <a:pPr algn="ctr" fontAlgn="b"/>
+                      <a:r>
+                        <a:rPr lang="es-AR" sz="1600" u="none" strike="noStrike">
+                          <a:effectLst/>
+                        </a:rPr>
+                        <a:t>autor</a:t>
+                      </a:r>
+                      <a:endParaRPr lang="es-AR" sz="1600" b="0" i="0" u="none" strike="noStrike">
+                        <a:solidFill>
+                          <a:srgbClr val="000000"/>
+                        </a:solidFill>
+                        <a:effectLst/>
+                        <a:latin typeface="Calibri" panose="020F0502020204030204" pitchFamily="34" charset="0"/>
+                      </a:endParaRPr>
+                    </a:p>
+                  </a:txBody>
+                  <a:tcPr marL="9525" marR="9525" marT="9525" marB="0" anchor="b"/>
+                </a:tc>
+                <a:tc>
+                  <a:txBody>
+                    <a:bodyPr/>
+                    <a:lstStyle/>
+                    <a:p>
+                      <a:pPr algn="ctr" fontAlgn="b"/>
+                      <a:r>
+                        <a:rPr lang="es-AR" sz="1600" u="none" strike="noStrike" dirty="0">
+                          <a:effectLst/>
+                        </a:rPr>
+                        <a:t>VARCHAR(50)</a:t>
+                      </a:r>
+                      <a:endParaRPr lang="es-AR" sz="1600" b="0" i="0" u="none" strike="noStrike" dirty="0">
+                        <a:solidFill>
+                          <a:srgbClr val="000000"/>
+                        </a:solidFill>
+                        <a:effectLst/>
+                        <a:latin typeface="Calibri" panose="020F0502020204030204" pitchFamily="34" charset="0"/>
+                      </a:endParaRPr>
+                    </a:p>
+                  </a:txBody>
+                  <a:tcPr marL="9525" marR="9525" marT="9525" marB="0" anchor="b"/>
+                </a:tc>
+                <a:extLst>
+                  <a:ext uri="{0D108BD9-81ED-4DB2-BD59-A6C34878D82A}">
+                    <a16:rowId xmlns:a16="http://schemas.microsoft.com/office/drawing/2014/main" val="160212"/>
+                  </a:ext>
+                </a:extLst>
+              </a:tr>
+            </a:tbl>
+          </a:graphicData>
+        </a:graphic>
+      </p:graphicFrame>
+      <p:graphicFrame>
+        <p:nvGraphicFramePr>
+          <p:cNvPr id="5" name="Tabla 4">
+            <a:extLst>
+              <a:ext uri="{FF2B5EF4-FFF2-40B4-BE49-F238E27FC236}">
+                <a16:creationId xmlns:a16="http://schemas.microsoft.com/office/drawing/2014/main" id="{7F0C6E80-DAE2-35A8-ACD4-634889C50A4C}"/>
+              </a:ext>
+            </a:extLst>
+          </p:cNvPr>
+          <p:cNvGraphicFramePr>
+            <a:graphicFrameLocks noGrp="1"/>
+          </p:cNvGraphicFramePr>
+          <p:nvPr>
+            <p:extLst>
+              <p:ext uri="{D42A27DB-BD31-4B8C-83A1-F6EECF244321}">
+                <p14:modId xmlns:p14="http://schemas.microsoft.com/office/powerpoint/2010/main" val="2876686660"/>
+              </p:ext>
+            </p:extLst>
+          </p:nvPr>
+        </p:nvGraphicFramePr>
+        <p:xfrm>
+          <a:off x="717550" y="3761408"/>
+          <a:ext cx="4356100" cy="1879600"/>
+        </p:xfrm>
+        <a:graphic>
+          <a:graphicData uri="http://schemas.openxmlformats.org/drawingml/2006/table">
+            <a:tbl>
+              <a:tblPr>
+                <a:tableStyleId>{5C22544A-7EE6-4342-B048-85BDC9FD1C3A}</a:tableStyleId>
+              </a:tblPr>
+              <a:tblGrid>
+                <a:gridCol w="1077110">
+                  <a:extLst>
+                    <a:ext uri="{9D8B030D-6E8A-4147-A177-3AD203B41FA5}">
+                      <a16:colId xmlns:a16="http://schemas.microsoft.com/office/drawing/2014/main" val="1349763136"/>
+                    </a:ext>
+                  </a:extLst>
+                </a:gridCol>
+                <a:gridCol w="1563239">
+                  <a:extLst>
+                    <a:ext uri="{9D8B030D-6E8A-4147-A177-3AD203B41FA5}">
+                      <a16:colId xmlns:a16="http://schemas.microsoft.com/office/drawing/2014/main" val="1866692115"/>
+                    </a:ext>
+                  </a:extLst>
+                </a:gridCol>
+                <a:gridCol w="1715751">
+                  <a:extLst>
+                    <a:ext uri="{9D8B030D-6E8A-4147-A177-3AD203B41FA5}">
+                      <a16:colId xmlns:a16="http://schemas.microsoft.com/office/drawing/2014/main" val="2786006346"/>
+                    </a:ext>
+                  </a:extLst>
+                </a:gridCol>
+              </a:tblGrid>
+              <a:tr h="279400">
+                <a:tc gridSpan="3">
+                  <a:txBody>
+                    <a:bodyPr/>
+                    <a:lstStyle/>
+                    <a:p>
+                      <a:pPr algn="ctr" fontAlgn="b"/>
+                      <a:r>
+                        <a:rPr lang="es-AR" sz="1600" u="none" strike="noStrike">
+                          <a:effectLst/>
+                        </a:rPr>
+                        <a:t>TABLA - PRESTAMOS</a:t>
+                      </a:r>
+                      <a:endParaRPr lang="es-AR" sz="1600" b="1" i="0" u="none" strike="noStrike">
+                        <a:solidFill>
+                          <a:srgbClr val="FF0000"/>
+                        </a:solidFill>
+                        <a:effectLst/>
+                        <a:latin typeface="Calibri" panose="020F0502020204030204" pitchFamily="34" charset="0"/>
+                      </a:endParaRPr>
+                    </a:p>
+                  </a:txBody>
+                  <a:tcPr marL="9525" marR="9525" marT="9525" marB="0" anchor="b"/>
+                </a:tc>
+                <a:tc hMerge="1">
+                  <a:txBody>
+                    <a:bodyPr/>
+                    <a:lstStyle/>
+                    <a:p>
+                      <a:endParaRPr lang="es-AR"/>
+                    </a:p>
+                  </a:txBody>
+                  <a:tcPr/>
+                </a:tc>
+                <a:tc hMerge="1">
+                  <a:txBody>
+                    <a:bodyPr/>
+                    <a:lstStyle/>
+                    <a:p>
+                      <a:endParaRPr lang="es-AR"/>
+                    </a:p>
+                  </a:txBody>
+                  <a:tcPr/>
+                </a:tc>
+                <a:extLst>
+                  <a:ext uri="{0D108BD9-81ED-4DB2-BD59-A6C34878D82A}">
+                    <a16:rowId xmlns:a16="http://schemas.microsoft.com/office/drawing/2014/main" val="2786453407"/>
+                  </a:ext>
+                </a:extLst>
+              </a:tr>
+              <a:tr h="266700">
+                <a:tc>
+                  <a:txBody>
+                    <a:bodyPr/>
+                    <a:lstStyle/>
+                    <a:p>
+                      <a:pPr algn="ctr" fontAlgn="b"/>
+                      <a:endParaRPr lang="es-AR" sz="1600" b="0" i="0" u="none" strike="noStrike">
+                        <a:solidFill>
+                          <a:srgbClr val="000000"/>
+                        </a:solidFill>
+                        <a:effectLst/>
+                        <a:latin typeface="Calibri" panose="020F0502020204030204" pitchFamily="34" charset="0"/>
+                      </a:endParaRPr>
+                    </a:p>
+                  </a:txBody>
+                  <a:tcPr marL="9525" marR="9525" marT="9525" marB="0" anchor="b"/>
+                </a:tc>
+                <a:tc>
+                  <a:txBody>
+                    <a:bodyPr/>
+                    <a:lstStyle/>
+                    <a:p>
+                      <a:pPr algn="ctr" fontAlgn="b"/>
+                      <a:endParaRPr lang="es-AR" sz="1600" b="0" i="0" u="none" strike="noStrike">
+                        <a:solidFill>
+                          <a:srgbClr val="000000"/>
+                        </a:solidFill>
+                        <a:effectLst/>
+                        <a:latin typeface="Calibri" panose="020F0502020204030204" pitchFamily="34" charset="0"/>
+                      </a:endParaRPr>
+                    </a:p>
+                  </a:txBody>
+                  <a:tcPr marL="9525" marR="9525" marT="9525" marB="0" anchor="b"/>
+                </a:tc>
+                <a:tc>
+                  <a:txBody>
+                    <a:bodyPr/>
+                    <a:lstStyle/>
+                    <a:p>
+                      <a:pPr algn="ctr" fontAlgn="b"/>
+                      <a:endParaRPr lang="es-AR" sz="1600" b="0" i="0" u="none" strike="noStrike">
+                        <a:solidFill>
+                          <a:srgbClr val="000000"/>
+                        </a:solidFill>
+                        <a:effectLst/>
+                        <a:latin typeface="Calibri" panose="020F0502020204030204" pitchFamily="34" charset="0"/>
+                      </a:endParaRPr>
+                    </a:p>
+                  </a:txBody>
+                  <a:tcPr marL="9525" marR="9525" marT="9525" marB="0" anchor="b"/>
+                </a:tc>
+                <a:extLst>
+                  <a:ext uri="{0D108BD9-81ED-4DB2-BD59-A6C34878D82A}">
+                    <a16:rowId xmlns:a16="http://schemas.microsoft.com/office/drawing/2014/main" val="528001496"/>
+                  </a:ext>
+                </a:extLst>
+              </a:tr>
+              <a:tr h="266700">
+                <a:tc>
+                  <a:txBody>
+                    <a:bodyPr/>
+                    <a:lstStyle/>
+                    <a:p>
+                      <a:pPr algn="ctr" fontAlgn="b"/>
+                      <a:r>
+                        <a:rPr lang="es-AR" sz="1600" u="none" strike="noStrike">
+                          <a:effectLst/>
+                        </a:rPr>
+                        <a:t>TIPO CLAVE</a:t>
+                      </a:r>
+                      <a:endParaRPr lang="es-AR" sz="1600" b="1" i="0" u="none" strike="noStrike">
+                        <a:solidFill>
+                          <a:srgbClr val="000000"/>
+                        </a:solidFill>
+                        <a:effectLst/>
+                        <a:latin typeface="Calibri" panose="020F0502020204030204" pitchFamily="34" charset="0"/>
+                      </a:endParaRPr>
+                    </a:p>
+                  </a:txBody>
+                  <a:tcPr marL="9525" marR="9525" marT="9525" marB="0" anchor="b"/>
+                </a:tc>
+                <a:tc>
+                  <a:txBody>
+                    <a:bodyPr/>
+                    <a:lstStyle/>
+                    <a:p>
+                      <a:pPr algn="ctr" fontAlgn="b"/>
+                      <a:r>
+                        <a:rPr lang="es-AR" sz="1600" u="none" strike="noStrike">
+                          <a:effectLst/>
+                        </a:rPr>
+                        <a:t>CAMPO</a:t>
+                      </a:r>
+                      <a:endParaRPr lang="es-AR" sz="1600" b="1" i="0" u="none" strike="noStrike">
+                        <a:solidFill>
+                          <a:srgbClr val="000000"/>
+                        </a:solidFill>
+                        <a:effectLst/>
+                        <a:latin typeface="Calibri" panose="020F0502020204030204" pitchFamily="34" charset="0"/>
+                      </a:endParaRPr>
+                    </a:p>
+                  </a:txBody>
+                  <a:tcPr marL="9525" marR="9525" marT="9525" marB="0" anchor="b"/>
+                </a:tc>
+                <a:tc>
+                  <a:txBody>
+                    <a:bodyPr/>
+                    <a:lstStyle/>
+                    <a:p>
+                      <a:pPr algn="ctr" fontAlgn="b"/>
+                      <a:r>
+                        <a:rPr lang="es-AR" sz="1600" u="none" strike="noStrike">
+                          <a:effectLst/>
+                        </a:rPr>
+                        <a:t>TIPO CAMPO</a:t>
+                      </a:r>
+                      <a:endParaRPr lang="es-AR" sz="1600" b="1" i="0" u="none" strike="noStrike">
+                        <a:solidFill>
+                          <a:srgbClr val="000000"/>
+                        </a:solidFill>
+                        <a:effectLst/>
+                        <a:latin typeface="Calibri" panose="020F0502020204030204" pitchFamily="34" charset="0"/>
+                      </a:endParaRPr>
+                    </a:p>
+                  </a:txBody>
+                  <a:tcPr marL="9525" marR="9525" marT="9525" marB="0" anchor="b"/>
+                </a:tc>
+                <a:extLst>
+                  <a:ext uri="{0D108BD9-81ED-4DB2-BD59-A6C34878D82A}">
+                    <a16:rowId xmlns:a16="http://schemas.microsoft.com/office/drawing/2014/main" val="1685751934"/>
+                  </a:ext>
+                </a:extLst>
+              </a:tr>
+              <a:tr h="266700">
+                <a:tc>
+                  <a:txBody>
+                    <a:bodyPr/>
+                    <a:lstStyle/>
+                    <a:p>
+                      <a:pPr algn="ctr" fontAlgn="b"/>
+                      <a:r>
+                        <a:rPr lang="es-AR" sz="1600" u="none" strike="noStrike">
+                          <a:effectLst/>
+                        </a:rPr>
+                        <a:t>PK</a:t>
+                      </a:r>
+                      <a:endParaRPr lang="es-AR" sz="1600" b="0" i="0" u="none" strike="noStrike">
+                        <a:solidFill>
+                          <a:srgbClr val="000000"/>
+                        </a:solidFill>
+                        <a:effectLst/>
+                        <a:latin typeface="Calibri" panose="020F0502020204030204" pitchFamily="34" charset="0"/>
+                      </a:endParaRPr>
+                    </a:p>
+                  </a:txBody>
+                  <a:tcPr marL="9525" marR="9525" marT="9525" marB="0" anchor="b"/>
+                </a:tc>
+                <a:tc>
+                  <a:txBody>
+                    <a:bodyPr/>
+                    <a:lstStyle/>
+                    <a:p>
+                      <a:pPr algn="ctr" fontAlgn="b"/>
+                      <a:r>
+                        <a:rPr lang="es-AR" sz="1600" u="none" strike="noStrike">
+                          <a:effectLst/>
+                        </a:rPr>
+                        <a:t>prestamo_id</a:t>
+                      </a:r>
+                      <a:endParaRPr lang="es-AR" sz="1600" b="0" i="0" u="none" strike="noStrike">
+                        <a:solidFill>
+                          <a:srgbClr val="000000"/>
+                        </a:solidFill>
+                        <a:effectLst/>
+                        <a:latin typeface="Calibri" panose="020F0502020204030204" pitchFamily="34" charset="0"/>
+                      </a:endParaRPr>
+                    </a:p>
+                  </a:txBody>
+                  <a:tcPr marL="9525" marR="9525" marT="9525" marB="0" anchor="b"/>
+                </a:tc>
+                <a:tc>
+                  <a:txBody>
+                    <a:bodyPr/>
+                    <a:lstStyle/>
+                    <a:p>
+                      <a:pPr algn="ctr" fontAlgn="b"/>
+                      <a:r>
+                        <a:rPr lang="es-AR" sz="1600" u="none" strike="noStrike">
+                          <a:effectLst/>
+                        </a:rPr>
+                        <a:t>INT, NOT NULL, AI</a:t>
+                      </a:r>
+                      <a:endParaRPr lang="es-AR" sz="1600" b="0" i="0" u="none" strike="noStrike">
+                        <a:solidFill>
+                          <a:srgbClr val="000000"/>
+                        </a:solidFill>
+                        <a:effectLst/>
+                        <a:latin typeface="Calibri" panose="020F0502020204030204" pitchFamily="34" charset="0"/>
+                      </a:endParaRPr>
+                    </a:p>
+                  </a:txBody>
+                  <a:tcPr marL="9525" marR="9525" marT="9525" marB="0" anchor="b"/>
+                </a:tc>
+                <a:extLst>
+                  <a:ext uri="{0D108BD9-81ED-4DB2-BD59-A6C34878D82A}">
+                    <a16:rowId xmlns:a16="http://schemas.microsoft.com/office/drawing/2014/main" val="1869914752"/>
+                  </a:ext>
+                </a:extLst>
+              </a:tr>
+              <a:tr h="266700">
+                <a:tc>
+                  <a:txBody>
+                    <a:bodyPr/>
+                    <a:lstStyle/>
+                    <a:p>
+                      <a:pPr algn="ctr" fontAlgn="b"/>
+                      <a:r>
+                        <a:rPr lang="es-AR" sz="1600" u="none" strike="noStrike">
+                          <a:effectLst/>
+                        </a:rPr>
+                        <a:t>--</a:t>
+                      </a:r>
+                      <a:endParaRPr lang="es-AR" sz="1600" b="0" i="0" u="none" strike="noStrike">
+                        <a:solidFill>
+                          <a:srgbClr val="000000"/>
+                        </a:solidFill>
+                        <a:effectLst/>
+                        <a:latin typeface="Calibri" panose="020F0502020204030204" pitchFamily="34" charset="0"/>
+                      </a:endParaRPr>
+                    </a:p>
+                  </a:txBody>
+                  <a:tcPr marL="9525" marR="9525" marT="9525" marB="0" anchor="b"/>
+                </a:tc>
+                <a:tc>
+                  <a:txBody>
+                    <a:bodyPr/>
+                    <a:lstStyle/>
+                    <a:p>
+                      <a:pPr algn="ctr" fontAlgn="b"/>
+                      <a:r>
+                        <a:rPr lang="es-AR" sz="1600" u="none" strike="noStrike">
+                          <a:effectLst/>
+                        </a:rPr>
+                        <a:t>fecha_prestamo</a:t>
+                      </a:r>
+                      <a:endParaRPr lang="es-AR" sz="1600" b="0" i="0" u="none" strike="noStrike">
+                        <a:solidFill>
+                          <a:srgbClr val="000000"/>
+                        </a:solidFill>
+                        <a:effectLst/>
+                        <a:latin typeface="Calibri" panose="020F0502020204030204" pitchFamily="34" charset="0"/>
+                      </a:endParaRPr>
+                    </a:p>
+                  </a:txBody>
+                  <a:tcPr marL="9525" marR="9525" marT="9525" marB="0" anchor="b"/>
+                </a:tc>
+                <a:tc>
+                  <a:txBody>
+                    <a:bodyPr/>
+                    <a:lstStyle/>
+                    <a:p>
+                      <a:pPr algn="ctr" fontAlgn="b"/>
+                      <a:r>
+                        <a:rPr lang="es-AR" sz="1600" u="none" strike="noStrike">
+                          <a:effectLst/>
+                        </a:rPr>
+                        <a:t>DATE</a:t>
+                      </a:r>
+                      <a:endParaRPr lang="es-AR" sz="1600" b="0" i="0" u="none" strike="noStrike">
+                        <a:solidFill>
+                          <a:srgbClr val="000000"/>
+                        </a:solidFill>
+                        <a:effectLst/>
+                        <a:latin typeface="Calibri" panose="020F0502020204030204" pitchFamily="34" charset="0"/>
+                      </a:endParaRPr>
+                    </a:p>
+                  </a:txBody>
+                  <a:tcPr marL="9525" marR="9525" marT="9525" marB="0" anchor="b"/>
+                </a:tc>
+                <a:extLst>
+                  <a:ext uri="{0D108BD9-81ED-4DB2-BD59-A6C34878D82A}">
+                    <a16:rowId xmlns:a16="http://schemas.microsoft.com/office/drawing/2014/main" val="1580967600"/>
+                  </a:ext>
+                </a:extLst>
+              </a:tr>
+              <a:tr h="266700">
+                <a:tc>
+                  <a:txBody>
+                    <a:bodyPr/>
+                    <a:lstStyle/>
+                    <a:p>
+                      <a:pPr algn="ctr" fontAlgn="b"/>
+                      <a:r>
+                        <a:rPr lang="es-AR" sz="1600" u="none" strike="noStrike">
+                          <a:effectLst/>
+                        </a:rPr>
+                        <a:t>FK</a:t>
+                      </a:r>
+                      <a:endParaRPr lang="es-AR" sz="1600" b="0" i="0" u="none" strike="noStrike">
+                        <a:solidFill>
+                          <a:srgbClr val="000000"/>
+                        </a:solidFill>
+                        <a:effectLst/>
+                        <a:latin typeface="Calibri" panose="020F0502020204030204" pitchFamily="34" charset="0"/>
+                      </a:endParaRPr>
+                    </a:p>
+                  </a:txBody>
+                  <a:tcPr marL="9525" marR="9525" marT="9525" marB="0" anchor="b"/>
+                </a:tc>
+                <a:tc>
+                  <a:txBody>
+                    <a:bodyPr/>
+                    <a:lstStyle/>
+                    <a:p>
+                      <a:pPr algn="ctr" fontAlgn="b"/>
+                      <a:r>
+                        <a:rPr lang="es-AR" sz="1600" u="none" strike="noStrike">
+                          <a:effectLst/>
+                        </a:rPr>
+                        <a:t>libro_id</a:t>
+                      </a:r>
+                      <a:endParaRPr lang="es-AR" sz="1600" b="0" i="0" u="none" strike="noStrike">
+                        <a:solidFill>
+                          <a:srgbClr val="000000"/>
+                        </a:solidFill>
+                        <a:effectLst/>
+                        <a:latin typeface="Calibri" panose="020F0502020204030204" pitchFamily="34" charset="0"/>
+                      </a:endParaRPr>
+                    </a:p>
+                  </a:txBody>
+                  <a:tcPr marL="9525" marR="9525" marT="9525" marB="0" anchor="b"/>
+                </a:tc>
+                <a:tc>
+                  <a:txBody>
+                    <a:bodyPr/>
+                    <a:lstStyle/>
+                    <a:p>
+                      <a:pPr algn="ctr" fontAlgn="b"/>
+                      <a:r>
+                        <a:rPr lang="es-AR" sz="1600" u="none" strike="noStrike">
+                          <a:effectLst/>
+                        </a:rPr>
+                        <a:t>INT, NOT NULL</a:t>
+                      </a:r>
+                      <a:endParaRPr lang="es-AR" sz="1600" b="0" i="0" u="none" strike="noStrike">
+                        <a:solidFill>
+                          <a:srgbClr val="000000"/>
+                        </a:solidFill>
+                        <a:effectLst/>
+                        <a:latin typeface="Calibri" panose="020F0502020204030204" pitchFamily="34" charset="0"/>
+                      </a:endParaRPr>
+                    </a:p>
+                  </a:txBody>
+                  <a:tcPr marL="9525" marR="9525" marT="9525" marB="0" anchor="b"/>
+                </a:tc>
+                <a:extLst>
+                  <a:ext uri="{0D108BD9-81ED-4DB2-BD59-A6C34878D82A}">
+                    <a16:rowId xmlns:a16="http://schemas.microsoft.com/office/drawing/2014/main" val="295689626"/>
+                  </a:ext>
+                </a:extLst>
+              </a:tr>
+              <a:tr h="266700">
+                <a:tc>
+                  <a:txBody>
+                    <a:bodyPr/>
+                    <a:lstStyle/>
+                    <a:p>
+                      <a:pPr algn="ctr" fontAlgn="b"/>
+                      <a:r>
+                        <a:rPr lang="es-AR" sz="1600" u="none" strike="noStrike">
+                          <a:effectLst/>
+                        </a:rPr>
+                        <a:t>FK</a:t>
+                      </a:r>
+                      <a:endParaRPr lang="es-AR" sz="1600" b="0" i="0" u="none" strike="noStrike">
+                        <a:solidFill>
+                          <a:srgbClr val="000000"/>
+                        </a:solidFill>
+                        <a:effectLst/>
+                        <a:latin typeface="Calibri" panose="020F0502020204030204" pitchFamily="34" charset="0"/>
+                      </a:endParaRPr>
+                    </a:p>
+                  </a:txBody>
+                  <a:tcPr marL="9525" marR="9525" marT="9525" marB="0" anchor="b"/>
+                </a:tc>
+                <a:tc>
+                  <a:txBody>
+                    <a:bodyPr/>
+                    <a:lstStyle/>
+                    <a:p>
+                      <a:pPr algn="ctr" fontAlgn="b"/>
+                      <a:r>
+                        <a:rPr lang="es-AR" sz="1600" u="none" strike="noStrike">
+                          <a:effectLst/>
+                        </a:rPr>
+                        <a:t>alumno_id</a:t>
+                      </a:r>
+                      <a:endParaRPr lang="es-AR" sz="1600" b="0" i="0" u="none" strike="noStrike">
+                        <a:solidFill>
+                          <a:srgbClr val="000000"/>
+                        </a:solidFill>
+                        <a:effectLst/>
+                        <a:latin typeface="Calibri" panose="020F0502020204030204" pitchFamily="34" charset="0"/>
+                      </a:endParaRPr>
+                    </a:p>
+                  </a:txBody>
+                  <a:tcPr marL="9525" marR="9525" marT="9525" marB="0" anchor="b"/>
+                </a:tc>
+                <a:tc>
+                  <a:txBody>
+                    <a:bodyPr/>
+                    <a:lstStyle/>
+                    <a:p>
+                      <a:pPr algn="ctr" fontAlgn="b"/>
+                      <a:r>
+                        <a:rPr lang="es-AR" sz="1600" u="none" strike="noStrike" dirty="0">
+                          <a:effectLst/>
+                        </a:rPr>
+                        <a:t>INT, NOT NULL, AI</a:t>
+                      </a:r>
+                      <a:endParaRPr lang="es-AR" sz="1600" b="0" i="0" u="none" strike="noStrike" dirty="0">
+                        <a:solidFill>
+                          <a:srgbClr val="000000"/>
+                        </a:solidFill>
+                        <a:effectLst/>
+                        <a:latin typeface="Calibri" panose="020F0502020204030204" pitchFamily="34" charset="0"/>
+                      </a:endParaRPr>
+                    </a:p>
+                  </a:txBody>
+                  <a:tcPr marL="9525" marR="9525" marT="9525" marB="0" anchor="b"/>
+                </a:tc>
+                <a:extLst>
+                  <a:ext uri="{0D108BD9-81ED-4DB2-BD59-A6C34878D82A}">
+                    <a16:rowId xmlns:a16="http://schemas.microsoft.com/office/drawing/2014/main" val="3782011552"/>
+                  </a:ext>
+                </a:extLst>
+              </a:tr>
+            </a:tbl>
+          </a:graphicData>
+        </a:graphic>
+      </p:graphicFrame>
       <p:sp>
         <p:nvSpPr>
-          <p:cNvPr id="3" name="Marcador de contenido 2">
+          <p:cNvPr id="6" name="CuadroTexto 5">
             <a:extLst>
               <a:ext uri="{FF2B5EF4-FFF2-40B4-BE49-F238E27FC236}">
-                <a16:creationId xmlns:a16="http://schemas.microsoft.com/office/drawing/2014/main" id="{718D296A-FAF5-185C-9956-5BFC2F41F2A4}"/>
+                <a16:creationId xmlns:a16="http://schemas.microsoft.com/office/drawing/2014/main" id="{5C54CE3D-EB66-5044-A40E-6EEE50D3FD42}"/>
               </a:ext>
             </a:extLst>
           </p:cNvPr>
-          <p:cNvSpPr>
-            <a:spLocks noGrp="1"/>
-          </p:cNvSpPr>
-          <p:nvPr>
-            <p:ph idx="1"/>
-          </p:nvPr>
+          <p:cNvSpPr txBox="1"/>
+          <p:nvPr/>
         </p:nvSpPr>
         <p:spPr>
           <a:xfrm>
-            <a:off x="838200" y="1571658"/>
-            <a:ext cx="10515600" cy="4964389"/>
+            <a:off x="5496339" y="516283"/>
+            <a:ext cx="5446643" cy="1938992"/>
           </a:xfrm>
+          <a:prstGeom prst="rect">
+            <a:avLst/>
+          </a:prstGeom>
+          <a:noFill/>
         </p:spPr>
         <p:txBody>
-          <a:bodyPr>
-            <a:normAutofit/>
+          <a:bodyPr wrap="square" rtlCol="0">
+            <a:spAutoFit/>
           </a:bodyPr>
           <a:lstStyle/>
           <a:p>
-            <a:pPr marL="0" indent="0" algn="ctr">
-              <a:buNone/>
-            </a:pPr>
-            <a:r>
-              <a:rPr lang="es-AR" dirty="0"/>
-              <a:t>Primera tabla vista. </a:t>
-            </a:r>
-          </a:p>
-          <a:p>
-            <a:pPr marL="0" indent="0" algn="just">
-              <a:buNone/>
-            </a:pPr>
-            <a:r>
-              <a:rPr lang="es-AR" dirty="0"/>
-              <a:t>Hago un join para guardar una tabla vista con los nombres de los padres de los alumnos. Esta tabla vista utiliza las tablas "padres" y "alumnos" y su objetivo es mostrar el nombre del padre de un determinado alumno evitando la manipulación de tablas por personas no idóneas en el campo.</a:t>
-            </a:r>
-          </a:p>
-          <a:p>
-            <a:pPr marL="0" indent="0">
-              <a:buNone/>
-            </a:pPr>
-            <a:endParaRPr lang="es-AR" dirty="0"/>
-          </a:p>
-          <a:p>
-            <a:pPr marL="0" indent="0">
-              <a:buNone/>
-            </a:pPr>
-            <a:r>
-              <a:rPr lang="es-AR" b="1" i="1" dirty="0"/>
-              <a:t>create or replace view padres_de_alumnos as</a:t>
-            </a:r>
-          </a:p>
-          <a:p>
-            <a:pPr marL="0" indent="0">
-              <a:buNone/>
-            </a:pPr>
-            <a:r>
-              <a:rPr lang="es-AR" b="1" i="1" dirty="0"/>
-              <a:t>select t1.alumno_id, t1.nombre, t1.apellido, t1.padre_id, t2.nombre as nombre_padre, t2.apellido as </a:t>
-            </a:r>
-            <a:r>
-              <a:rPr lang="es-AR" b="1" i="1" dirty="0" err="1"/>
-              <a:t>apellido_padre</a:t>
-            </a:r>
-            <a:r>
-              <a:rPr lang="es-AR" b="1" i="1" dirty="0"/>
-              <a:t> from alumnos as t1 </a:t>
-            </a:r>
-          </a:p>
-          <a:p>
-            <a:pPr marL="0" indent="0">
-              <a:buNone/>
-            </a:pPr>
-            <a:r>
-              <a:rPr lang="es-AR" b="1" i="1" dirty="0"/>
-              <a:t>left join padres as t2 on t1.padre_id=t2.padre_id;</a:t>
+            <a:pPr algn="just"/>
+            <a:r>
+              <a:rPr lang="es-AR" sz="2000" dirty="0"/>
+              <a:t>La tabla “biblioteca” servirá para albergar los libros con los que cuenta el instituto y que posteriormente van a ser prestados a los alumnos para llevar a cabo los trabajos prácticos propuestos por los profesores. Se relaciona con las tablas “prestamos”.</a:t>
             </a:r>
           </a:p>
         </p:txBody>
       </p:sp>
       <p:sp>
         <p:nvSpPr>
-          <p:cNvPr id="4" name="Título 1">
+          <p:cNvPr id="7" name="CuadroTexto 6">
             <a:extLst>
               <a:ext uri="{FF2B5EF4-FFF2-40B4-BE49-F238E27FC236}">
-                <a16:creationId xmlns:a16="http://schemas.microsoft.com/office/drawing/2014/main" id="{5386E36E-38CE-AD52-0498-D34FBFFA6CC8}"/>
+                <a16:creationId xmlns:a16="http://schemas.microsoft.com/office/drawing/2014/main" id="{519D0CD3-24D7-A4BB-206D-CC6B3A6FD241}"/>
               </a:ext>
             </a:extLst>
           </p:cNvPr>
-          <p:cNvSpPr>
-            <a:spLocks noGrp="1"/>
-          </p:cNvSpPr>
-          <p:nvPr>
-            <p:ph type="title"/>
-          </p:nvPr>
+          <p:cNvSpPr txBox="1"/>
+          <p:nvPr/>
         </p:nvSpPr>
         <p:spPr>
           <a:xfrm>
-            <a:off x="838200" y="120211"/>
-            <a:ext cx="10515600" cy="1129494"/>
+            <a:off x="5496339" y="3761408"/>
+            <a:ext cx="5446643" cy="1631216"/>
           </a:xfrm>
+          <a:prstGeom prst="rect">
+            <a:avLst/>
+          </a:prstGeom>
+          <a:noFill/>
         </p:spPr>
         <p:txBody>
-          <a:bodyPr>
-            <a:normAutofit fontScale="90000"/>
+          <a:bodyPr wrap="square" rtlCol="0">
+            <a:spAutoFit/>
           </a:bodyPr>
           <a:lstStyle/>
           <a:p>
-            <a:pPr algn="ctr"/>
-            <a:r>
-              <a:rPr lang="es-AR" b="1" dirty="0"/>
-              <a:t>Scripts de creación de objetos.</a:t>
-            </a:r>
-            <a:br>
-              <a:rPr lang="es-AR" b="1" dirty="0"/>
-            </a:br>
-            <a:r>
-              <a:rPr lang="es-AR" b="1" dirty="0">
-                <a:highlight>
-                  <a:srgbClr val="FFFF00"/>
-                </a:highlight>
-              </a:rPr>
-              <a:t>Tablas Vista</a:t>
-            </a:r>
-            <a:endParaRPr lang="es-AR" dirty="0">
-              <a:highlight>
-                <a:srgbClr val="FFFF00"/>
-              </a:highlight>
-            </a:endParaRPr>
+            <a:pPr algn="just"/>
+            <a:r>
+              <a:rPr lang="es-AR" sz="2000" dirty="0"/>
+              <a:t>La tabla “prestamos” servirá para llevar el control de los prestamos de los libros que los alumnos necesiten para realizar las actividades que sus profesores les pidan. Se relaciona con las tablas “biblioteca”.</a:t>
+            </a:r>
           </a:p>
         </p:txBody>
       </p:sp>
       <p:pic>
         <p:nvPicPr>
-          <p:cNvPr id="5" name="Imagen 4">
+          <p:cNvPr id="8" name="Imagen 7">
             <a:extLst>
               <a:ext uri="{FF2B5EF4-FFF2-40B4-BE49-F238E27FC236}">
-                <a16:creationId xmlns:a16="http://schemas.microsoft.com/office/drawing/2014/main" id="{2ECD3207-59C9-6561-5A99-7F78D470B8F9}"/>
+                <a16:creationId xmlns:a16="http://schemas.microsoft.com/office/drawing/2014/main" id="{43A46B93-CB77-5D37-853C-A72D6A5A9F5D}"/>
               </a:ext>
             </a:extLst>
           </p:cNvPr>
@@ -5081,7 +6256,7 @@
     </p:spTree>
     <p:extLst>
       <p:ext uri="{BB962C8B-B14F-4D97-AF65-F5344CB8AC3E}">
-        <p14:creationId xmlns:p14="http://schemas.microsoft.com/office/powerpoint/2010/main" val="168475201"/>
+        <p14:creationId xmlns:p14="http://schemas.microsoft.com/office/powerpoint/2010/main" val="1236093469"/>
       </p:ext>
     </p:extLst>
   </p:cSld>
@@ -5113,7 +6288,7 @@
           <p:cNvPr id="3" name="Marcador de contenido 2">
             <a:extLst>
               <a:ext uri="{FF2B5EF4-FFF2-40B4-BE49-F238E27FC236}">
-                <a16:creationId xmlns:a16="http://schemas.microsoft.com/office/drawing/2014/main" id="{5E03D8B4-10D9-7A67-C117-D6E3A082B801}"/>
+                <a16:creationId xmlns:a16="http://schemas.microsoft.com/office/drawing/2014/main" id="{718D296A-FAF5-185C-9956-5BFC2F41F2A4}"/>
               </a:ext>
             </a:extLst>
           </p:cNvPr>
@@ -5126,13 +6301,13 @@
         </p:nvSpPr>
         <p:spPr>
           <a:xfrm>
-            <a:off x="838200" y="874643"/>
-            <a:ext cx="10515600" cy="5302320"/>
+            <a:off x="838200" y="1571658"/>
+            <a:ext cx="10515600" cy="4964389"/>
           </a:xfrm>
         </p:spPr>
         <p:txBody>
           <a:bodyPr>
-            <a:normAutofit lnSpcReduction="10000"/>
+            <a:normAutofit/>
           </a:bodyPr>
           <a:lstStyle/>
           <a:p>
@@ -5141,7 +6316,7 @@
             </a:pPr>
             <a:r>
               <a:rPr lang="es-AR" dirty="0"/>
-              <a:t>Segunda tabla vista</a:t>
+              <a:t>Primera tabla vista. </a:t>
             </a:r>
           </a:p>
           <a:p>
@@ -5150,7 +6325,7 @@
             </a:pPr>
             <a:r>
               <a:rPr lang="es-AR" dirty="0"/>
-              <a:t>Hago un join para guardar que profesores dictan cada materia y sus respectivos datos. Esta tabla vista utiliza las tablas "profesores" y "materias" y su objetivo es mostrar el nombre del profesor que dicta una determinada materia evitando la manipulación de tablas por personas no idóneas.</a:t>
+              <a:t>Hago un join para guardar una tabla vista con los nombres de los padres de los alumnos. Esta tabla vista utiliza las tablas "padres" y "alumnos" y su objetivo es mostrar el nombre del padre de un determinado alumno evitando la manipulación de tablas por personas no idóneas en el campo.</a:t>
             </a:r>
           </a:p>
           <a:p>
@@ -5165,7 +6340,7 @@
             </a:pPr>
             <a:r>
               <a:rPr lang="es-AR" b="1" i="1" dirty="0"/>
-              <a:t>create or replace view dictado_materias as</a:t>
+              <a:t>create or replace view padres_de_alumnos as</a:t>
             </a:r>
           </a:p>
           <a:p>
@@ -5174,7 +6349,15 @@
             </a:pPr>
             <a:r>
               <a:rPr lang="es-AR" b="1" i="1" dirty="0"/>
-              <a:t>select t1.materia_id, t1.nombre_materia, t1.profesor_id, t2.nombre, t2.apellido, t2.telefono </a:t>
+              <a:t>select t1.alumno_id, t1.nombre, t1.apellido, t1.padre_id, t2.nombre as nombre_padre, t2.apellido as </a:t>
+            </a:r>
+            <a:r>
+              <a:rPr lang="es-AR" b="1" i="1" dirty="0" err="1"/>
+              <a:t>apellido_padre</a:t>
+            </a:r>
+            <a:r>
+              <a:rPr lang="es-AR" b="1" i="1" dirty="0"/>
+              <a:t> from alumnos as t1 </a:t>
             </a:r>
           </a:p>
           <a:p>
@@ -5183,26 +6366,69 @@
             </a:pPr>
             <a:r>
               <a:rPr lang="es-AR" b="1" i="1" dirty="0"/>
-              <a:t>from materias as t1</a:t>
-            </a:r>
-          </a:p>
-          <a:p>
-            <a:pPr marL="0" indent="0">
-              <a:buNone/>
-            </a:pPr>
-            <a:r>
-              <a:rPr lang="es-AR" b="1" i="1" dirty="0"/>
-              <a:t>left join profesores as t2 on t1.profesor_id = t2.profesor_id;</a:t>
-            </a:r>
+              <a:t>left join padres as t2 on t1.padre_id=t2.padre_id;</a:t>
+            </a:r>
+          </a:p>
+        </p:txBody>
+      </p:sp>
+      <p:sp>
+        <p:nvSpPr>
+          <p:cNvPr id="4" name="Título 1">
+            <a:extLst>
+              <a:ext uri="{FF2B5EF4-FFF2-40B4-BE49-F238E27FC236}">
+                <a16:creationId xmlns:a16="http://schemas.microsoft.com/office/drawing/2014/main" id="{5386E36E-38CE-AD52-0498-D34FBFFA6CC8}"/>
+              </a:ext>
+            </a:extLst>
+          </p:cNvPr>
+          <p:cNvSpPr>
+            <a:spLocks noGrp="1"/>
+          </p:cNvSpPr>
+          <p:nvPr>
+            <p:ph type="title"/>
+          </p:nvPr>
+        </p:nvSpPr>
+        <p:spPr>
+          <a:xfrm>
+            <a:off x="838200" y="120211"/>
+            <a:ext cx="10515600" cy="1129494"/>
+          </a:xfrm>
+        </p:spPr>
+        <p:txBody>
+          <a:bodyPr>
+            <a:normAutofit fontScale="90000"/>
+          </a:bodyPr>
+          <a:lstStyle/>
+          <a:p>
+            <a:pPr algn="ctr"/>
+            <a:r>
+              <a:rPr lang="es-AR" b="1" dirty="0"/>
+              <a:t>Scripts de creación de objetos.</a:t>
+            </a:r>
+            <a:br>
+              <a:rPr lang="es-AR" b="1" dirty="0"/>
+            </a:br>
+            <a:r>
+              <a:rPr lang="es-AR" b="1" dirty="0">
+                <a:highlight>
+                  <a:srgbClr val="FFFF00"/>
+                </a:highlight>
+              </a:rPr>
+              <a:t>Tablas Vista</a:t>
+            </a:r>
+            <a:endParaRPr lang="es-AR" dirty="0">
+              <a:highlight>
+                <a:srgbClr val="FFFF00"/>
+              </a:highlight>
+            </a:endParaRPr>
           </a:p>
         </p:txBody>
       </p:sp>
       <p:pic>
         <p:nvPicPr>
-          <p:cNvPr id="4" name="Imagen 3">
+          <p:cNvPr id="5" name="Imagen 4">
             <a:extLst>
               <a:ext uri="{FF2B5EF4-FFF2-40B4-BE49-F238E27FC236}">
-                <a16:creationId xmlns:a16="http://schemas.microsoft.com/office/drawing/2014/main" id="{8C954559-365A-53A5-7729-AAF2F124B92A}"/>
+                <a16:creationId xmlns:a16="http://schemas.microsoft.com/office/drawing/2014/main" id="{2ECD3207-59C9-6561-5A99-7F78D470B8F9}"/>
               </a:ext>
             </a:extLst>
           </p:cNvPr>
@@ -5236,7 +6462,7 @@
     </p:spTree>
     <p:extLst>
       <p:ext uri="{BB962C8B-B14F-4D97-AF65-F5344CB8AC3E}">
-        <p14:creationId xmlns:p14="http://schemas.microsoft.com/office/powerpoint/2010/main" val="216027140"/>
+        <p14:creationId xmlns:p14="http://schemas.microsoft.com/office/powerpoint/2010/main" val="168475201"/>
       </p:ext>
     </p:extLst>
   </p:cSld>
@@ -5265,10 +6491,10 @@
       </p:grpSpPr>
       <p:sp>
         <p:nvSpPr>
-          <p:cNvPr id="4" name="Marcador de contenido 2">
+          <p:cNvPr id="3" name="Marcador de contenido 2">
             <a:extLst>
               <a:ext uri="{FF2B5EF4-FFF2-40B4-BE49-F238E27FC236}">
-                <a16:creationId xmlns:a16="http://schemas.microsoft.com/office/drawing/2014/main" id="{8C2822DF-F3E4-FEED-7A91-42E54DCF97E5}"/>
+                <a16:creationId xmlns:a16="http://schemas.microsoft.com/office/drawing/2014/main" id="{5E03D8B4-10D9-7A67-C117-D6E3A082B801}"/>
               </a:ext>
             </a:extLst>
           </p:cNvPr>
@@ -5296,7 +6522,7 @@
             </a:pPr>
             <a:r>
               <a:rPr lang="es-AR" dirty="0"/>
-              <a:t>Tercera tabla vista</a:t>
+              <a:t>Segunda tabla vista</a:t>
             </a:r>
           </a:p>
           <a:p>
@@ -5305,14 +6531,14 @@
             </a:pPr>
             <a:r>
               <a:rPr lang="es-AR" dirty="0"/>
-              <a:t>Hago un join para guardar que profesores dictan cada actividad extracurricular y sus respectivos datos. Esta tabla vista utiliza las tablas "profesores" y "actividades" y su objetivo es mostrar el nombre del profesor que dicta una determinada actividad extracurricular evitando la manipulación de tablas por personas no idóneas.</a:t>
+              <a:t>Hago un join para guardar que profesores dictan cada materia y sus respectivos datos. Esta tabla vista utiliza las tablas "profesores" y "materias" y su objetivo es mostrar el nombre del profesor que dicta una determinada materia evitando la manipulación de tablas por personas no idóneas.</a:t>
             </a:r>
           </a:p>
           <a:p>
             <a:pPr marL="0" indent="0">
               <a:buNone/>
             </a:pPr>
-            <a:endParaRPr lang="es-AR" b="1" i="1" dirty="0"/>
+            <a:endParaRPr lang="es-AR" dirty="0"/>
           </a:p>
           <a:p>
             <a:pPr marL="0" indent="0">
@@ -5320,15 +6546,16 @@
             </a:pPr>
             <a:r>
               <a:rPr lang="es-AR" b="1" i="1" dirty="0"/>
-              <a:t>create or replace view </a:t>
-            </a:r>
-            <a:r>
-              <a:rPr lang="es-AR" b="1" i="1" dirty="0" err="1"/>
-              <a:t>dictado_actividades</a:t>
-            </a:r>
+              <a:t>create or replace view dictado_materias as</a:t>
+            </a:r>
+          </a:p>
+          <a:p>
+            <a:pPr marL="0" indent="0">
+              <a:buNone/>
+            </a:pPr>
             <a:r>
               <a:rPr lang="es-AR" b="1" i="1" dirty="0"/>
-              <a:t> as</a:t>
+              <a:t>select t1.materia_id, t1.nombre_materia, t1.profesor_id, t2.nombre, t2.apellido, t2.telefono </a:t>
             </a:r>
           </a:p>
           <a:p>
@@ -5337,16 +6564,7 @@
             </a:pPr>
             <a:r>
               <a:rPr lang="es-AR" b="1" i="1" dirty="0"/>
-              <a:t>select t1.actividad_id, t1.descripcion, t1.profesor_id, t2.nombre, t2.apellido, t2.telefono </a:t>
-            </a:r>
-          </a:p>
-          <a:p>
-            <a:pPr marL="0" indent="0">
-              <a:buNone/>
-            </a:pPr>
-            <a:r>
-              <a:rPr lang="es-AR" b="1" i="1" dirty="0"/>
-              <a:t>from actividades as t1</a:t>
+              <a:t>from materias as t1</a:t>
             </a:r>
           </a:p>
           <a:p>
@@ -5362,10 +6580,10 @@
       </p:sp>
       <p:pic>
         <p:nvPicPr>
-          <p:cNvPr id="5" name="Imagen 4">
+          <p:cNvPr id="4" name="Imagen 3">
             <a:extLst>
               <a:ext uri="{FF2B5EF4-FFF2-40B4-BE49-F238E27FC236}">
-                <a16:creationId xmlns:a16="http://schemas.microsoft.com/office/drawing/2014/main" id="{2D738854-BDA9-B8DE-8111-D8B47E744E2C}"/>
+                <a16:creationId xmlns:a16="http://schemas.microsoft.com/office/drawing/2014/main" id="{8C954559-365A-53A5-7729-AAF2F124B92A}"/>
               </a:ext>
             </a:extLst>
           </p:cNvPr>
@@ -5399,7 +6617,7 @@
     </p:spTree>
     <p:extLst>
       <p:ext uri="{BB962C8B-B14F-4D97-AF65-F5344CB8AC3E}">
-        <p14:creationId xmlns:p14="http://schemas.microsoft.com/office/powerpoint/2010/main" val="3753088648"/>
+        <p14:creationId xmlns:p14="http://schemas.microsoft.com/office/powerpoint/2010/main" val="216027140"/>
       </p:ext>
     </p:extLst>
   </p:cSld>
@@ -5431,6 +6649,169 @@
           <p:cNvPr id="4" name="Marcador de contenido 2">
             <a:extLst>
               <a:ext uri="{FF2B5EF4-FFF2-40B4-BE49-F238E27FC236}">
+                <a16:creationId xmlns:a16="http://schemas.microsoft.com/office/drawing/2014/main" id="{8C2822DF-F3E4-FEED-7A91-42E54DCF97E5}"/>
+              </a:ext>
+            </a:extLst>
+          </p:cNvPr>
+          <p:cNvSpPr>
+            <a:spLocks noGrp="1"/>
+          </p:cNvSpPr>
+          <p:nvPr>
+            <p:ph idx="1"/>
+          </p:nvPr>
+        </p:nvSpPr>
+        <p:spPr>
+          <a:xfrm>
+            <a:off x="838200" y="874643"/>
+            <a:ext cx="10515600" cy="5302320"/>
+          </a:xfrm>
+        </p:spPr>
+        <p:txBody>
+          <a:bodyPr>
+            <a:normAutofit lnSpcReduction="10000"/>
+          </a:bodyPr>
+          <a:lstStyle/>
+          <a:p>
+            <a:pPr marL="0" indent="0" algn="ctr">
+              <a:buNone/>
+            </a:pPr>
+            <a:r>
+              <a:rPr lang="es-AR" dirty="0"/>
+              <a:t>Tercera tabla vista</a:t>
+            </a:r>
+          </a:p>
+          <a:p>
+            <a:pPr marL="0" indent="0" algn="just">
+              <a:buNone/>
+            </a:pPr>
+            <a:r>
+              <a:rPr lang="es-AR" dirty="0"/>
+              <a:t>Hago un join para guardar que profesores dictan cada actividad extracurricular y sus respectivos datos. Esta tabla vista utiliza las tablas "profesores" y "actividades" y su objetivo es mostrar el nombre del profesor que dicta una determinada actividad extracurricular evitando la manipulación de tablas por personas no idóneas.</a:t>
+            </a:r>
+          </a:p>
+          <a:p>
+            <a:pPr marL="0" indent="0">
+              <a:buNone/>
+            </a:pPr>
+            <a:endParaRPr lang="es-AR" b="1" i="1" dirty="0"/>
+          </a:p>
+          <a:p>
+            <a:pPr marL="0" indent="0">
+              <a:buNone/>
+            </a:pPr>
+            <a:r>
+              <a:rPr lang="es-AR" b="1" i="1" dirty="0"/>
+              <a:t>create or replace view </a:t>
+            </a:r>
+            <a:r>
+              <a:rPr lang="es-AR" b="1" i="1" dirty="0" err="1"/>
+              <a:t>dictado_actividades</a:t>
+            </a:r>
+            <a:r>
+              <a:rPr lang="es-AR" b="1" i="1" dirty="0"/>
+              <a:t> as</a:t>
+            </a:r>
+          </a:p>
+          <a:p>
+            <a:pPr marL="0" indent="0">
+              <a:buNone/>
+            </a:pPr>
+            <a:r>
+              <a:rPr lang="es-AR" b="1" i="1" dirty="0"/>
+              <a:t>select t1.actividad_id, t1.descripcion, t1.profesor_id, t2.nombre, t2.apellido, t2.telefono </a:t>
+            </a:r>
+          </a:p>
+          <a:p>
+            <a:pPr marL="0" indent="0">
+              <a:buNone/>
+            </a:pPr>
+            <a:r>
+              <a:rPr lang="es-AR" b="1" i="1" dirty="0"/>
+              <a:t>from actividades as t1</a:t>
+            </a:r>
+          </a:p>
+          <a:p>
+            <a:pPr marL="0" indent="0">
+              <a:buNone/>
+            </a:pPr>
+            <a:r>
+              <a:rPr lang="es-AR" b="1" i="1" dirty="0"/>
+              <a:t>left join profesores as t2 on t1.profesor_id = t2.profesor_id;</a:t>
+            </a:r>
+          </a:p>
+        </p:txBody>
+      </p:sp>
+      <p:pic>
+        <p:nvPicPr>
+          <p:cNvPr id="5" name="Imagen 4">
+            <a:extLst>
+              <a:ext uri="{FF2B5EF4-FFF2-40B4-BE49-F238E27FC236}">
+                <a16:creationId xmlns:a16="http://schemas.microsoft.com/office/drawing/2014/main" id="{2D738854-BDA9-B8DE-8111-D8B47E744E2C}"/>
+              </a:ext>
+            </a:extLst>
+          </p:cNvPr>
+          <p:cNvPicPr>
+            <a:picLocks noChangeAspect="1"/>
+          </p:cNvPicPr>
+          <p:nvPr/>
+        </p:nvPicPr>
+        <p:blipFill>
+          <a:blip r:embed="rId2">
+            <a:extLst>
+              <a:ext uri="{28A0092B-C50C-407E-A947-70E740481C1C}">
+                <a14:useLocalDpi xmlns:a14="http://schemas.microsoft.com/office/drawing/2010/main" val="0"/>
+              </a:ext>
+            </a:extLst>
+          </a:blip>
+          <a:stretch>
+            <a:fillRect/>
+          </a:stretch>
+        </p:blipFill>
+        <p:spPr>
+          <a:xfrm>
+            <a:off x="11014849" y="6214095"/>
+            <a:ext cx="1080157" cy="643905"/>
+          </a:xfrm>
+          <a:prstGeom prst="rect">
+            <a:avLst/>
+          </a:prstGeom>
+        </p:spPr>
+      </p:pic>
+    </p:spTree>
+    <p:extLst>
+      <p:ext uri="{BB962C8B-B14F-4D97-AF65-F5344CB8AC3E}">
+        <p14:creationId xmlns:p14="http://schemas.microsoft.com/office/powerpoint/2010/main" val="3753088648"/>
+      </p:ext>
+    </p:extLst>
+  </p:cSld>
+  <p:clrMapOvr>
+    <a:masterClrMapping/>
+  </p:clrMapOvr>
+</p:sld>
+</file>
+
+<file path=ppt/slides/slide15.xml><?xml version="1.0" encoding="utf-8"?>
+<p:sld xmlns:a="http://schemas.openxmlformats.org/drawingml/2006/main" xmlns:r="http://schemas.openxmlformats.org/officeDocument/2006/relationships" xmlns:p="http://schemas.openxmlformats.org/presentationml/2006/main">
+  <p:cSld>
+    <p:spTree>
+      <p:nvGrpSpPr>
+        <p:cNvPr id="1" name=""/>
+        <p:cNvGrpSpPr/>
+        <p:nvPr/>
+      </p:nvGrpSpPr>
+      <p:grpSpPr>
+        <a:xfrm>
+          <a:off x="0" y="0"/>
+          <a:ext cx="0" cy="0"/>
+          <a:chOff x="0" y="0"/>
+          <a:chExt cx="0" cy="0"/>
+        </a:xfrm>
+      </p:grpSpPr>
+      <p:sp>
+        <p:nvSpPr>
+          <p:cNvPr id="4" name="Marcador de contenido 2">
+            <a:extLst>
+              <a:ext uri="{FF2B5EF4-FFF2-40B4-BE49-F238E27FC236}">
                 <a16:creationId xmlns:a16="http://schemas.microsoft.com/office/drawing/2014/main" id="{3D2E4DE4-581B-0D6C-EEF7-AEA1C36F200C}"/>
               </a:ext>
             </a:extLst>
@@ -5600,7 +6981,7 @@
 </p:sld>
 </file>
 
-<file path=ppt/slides/slide15.xml><?xml version="1.0" encoding="utf-8"?>
+<file path=ppt/slides/slide16.xml><?xml version="1.0" encoding="utf-8"?>
 <p:sld xmlns:a="http://schemas.openxmlformats.org/drawingml/2006/main" xmlns:r="http://schemas.openxmlformats.org/officeDocument/2006/relationships" xmlns:p="http://schemas.openxmlformats.org/presentationml/2006/main">
   <p:cSld>
     <p:spTree>
@@ -5782,7 +7163,7 @@
 </p:sld>
 </file>
 
-<file path=ppt/slides/slide16.xml><?xml version="1.0" encoding="utf-8"?>
+<file path=ppt/slides/slide17.xml><?xml version="1.0" encoding="utf-8"?>
 <p:sld xmlns:a="http://schemas.openxmlformats.org/drawingml/2006/main" xmlns:r="http://schemas.openxmlformats.org/officeDocument/2006/relationships" xmlns:p="http://schemas.openxmlformats.org/presentationml/2006/main">
   <p:cSld>
     <p:spTree>
@@ -6075,7 +7456,7 @@
 </p:sld>
 </file>
 
-<file path=ppt/slides/slide17.xml><?xml version="1.0" encoding="utf-8"?>
+<file path=ppt/slides/slide18.xml><?xml version="1.0" encoding="utf-8"?>
 <p:sld xmlns:a="http://schemas.openxmlformats.org/drawingml/2006/main" xmlns:r="http://schemas.openxmlformats.org/officeDocument/2006/relationships" xmlns:p="http://schemas.openxmlformats.org/presentationml/2006/main">
   <p:cSld>
     <p:spTree>
@@ -6370,7 +7751,7 @@
 </p:sld>
 </file>
 
-<file path=ppt/slides/slide18.xml><?xml version="1.0" encoding="utf-8"?>
+<file path=ppt/slides/slide19.xml><?xml version="1.0" encoding="utf-8"?>
 <p:sld xmlns:a="http://schemas.openxmlformats.org/drawingml/2006/main" xmlns:r="http://schemas.openxmlformats.org/officeDocument/2006/relationships" xmlns:p="http://schemas.openxmlformats.org/presentationml/2006/main">
   <p:cSld>
     <p:spTree>
@@ -6688,304 +8069,6 @@
     <p:extLst>
       <p:ext uri="{BB962C8B-B14F-4D97-AF65-F5344CB8AC3E}">
         <p14:creationId xmlns:p14="http://schemas.microsoft.com/office/powerpoint/2010/main" val="180566018"/>
-      </p:ext>
-    </p:extLst>
-  </p:cSld>
-  <p:clrMapOvr>
-    <a:masterClrMapping/>
-  </p:clrMapOvr>
-</p:sld>
-</file>
-
-<file path=ppt/slides/slide19.xml><?xml version="1.0" encoding="utf-8"?>
-<p:sld xmlns:a="http://schemas.openxmlformats.org/drawingml/2006/main" xmlns:r="http://schemas.openxmlformats.org/officeDocument/2006/relationships" xmlns:p="http://schemas.openxmlformats.org/presentationml/2006/main">
-  <p:cSld>
-    <p:spTree>
-      <p:nvGrpSpPr>
-        <p:cNvPr id="1" name=""/>
-        <p:cNvGrpSpPr/>
-        <p:nvPr/>
-      </p:nvGrpSpPr>
-      <p:grpSpPr>
-        <a:xfrm>
-          <a:off x="0" y="0"/>
-          <a:ext cx="0" cy="0"/>
-          <a:chOff x="0" y="0"/>
-          <a:chExt cx="0" cy="0"/>
-        </a:xfrm>
-      </p:grpSpPr>
-      <p:sp>
-        <p:nvSpPr>
-          <p:cNvPr id="4" name="Marcador de contenido 2">
-            <a:extLst>
-              <a:ext uri="{FF2B5EF4-FFF2-40B4-BE49-F238E27FC236}">
-                <a16:creationId xmlns:a16="http://schemas.microsoft.com/office/drawing/2014/main" id="{EB61B042-EB71-0D28-1A17-3C18F6B09593}"/>
-              </a:ext>
-            </a:extLst>
-          </p:cNvPr>
-          <p:cNvSpPr>
-            <a:spLocks noGrp="1"/>
-          </p:cNvSpPr>
-          <p:nvPr>
-            <p:ph idx="1"/>
-          </p:nvPr>
-        </p:nvSpPr>
-        <p:spPr>
-          <a:xfrm>
-            <a:off x="838200" y="427383"/>
-            <a:ext cx="10515600" cy="6112565"/>
-          </a:xfrm>
-        </p:spPr>
-        <p:txBody>
-          <a:bodyPr>
-            <a:normAutofit fontScale="32500" lnSpcReduction="20000"/>
-          </a:bodyPr>
-          <a:lstStyle/>
-          <a:p>
-            <a:pPr marL="0" indent="0" algn="ctr">
-              <a:buNone/>
-            </a:pPr>
-            <a:r>
-              <a:rPr lang="es-AR" sz="8600" dirty="0"/>
-              <a:t>Segunda Store Procedure</a:t>
-            </a:r>
-          </a:p>
-          <a:p>
-            <a:pPr marL="0" indent="0" algn="just">
-              <a:buNone/>
-            </a:pPr>
-            <a:endParaRPr lang="es-AR" sz="8600" dirty="0"/>
-          </a:p>
-          <a:p>
-            <a:pPr marL="0" indent="0" algn="just">
-              <a:buNone/>
-            </a:pPr>
-            <a:r>
-              <a:rPr lang="es-AR" sz="8600" dirty="0"/>
-              <a:t>Creo un procedimiento almacenado para insertar nuevos padres en su correspondiente tabla y no se pierda tiempo innecesariamente ingresando uno por uno los registros. El beneficio es mayor cuando se tienen muchos registros para ingresar, ya que los inserta  todos de una vez. </a:t>
-            </a:r>
-          </a:p>
-          <a:p>
-            <a:pPr marL="0" indent="0" algn="ctr">
-              <a:buNone/>
-            </a:pPr>
-            <a:endParaRPr lang="es-AR" sz="7000" dirty="0"/>
-          </a:p>
-          <a:p>
-            <a:pPr marL="0" indent="0" algn="ctr">
-              <a:buNone/>
-            </a:pPr>
-            <a:endParaRPr lang="es-AR" sz="7000" dirty="0"/>
-          </a:p>
-          <a:p>
-            <a:pPr marL="0" indent="0">
-              <a:buNone/>
-            </a:pPr>
-            <a:r>
-              <a:rPr lang="es-AR" sz="7000" b="1" i="1" dirty="0"/>
-              <a:t>delimiter //</a:t>
-            </a:r>
-          </a:p>
-          <a:p>
-            <a:pPr marL="0" indent="0">
-              <a:buNone/>
-            </a:pPr>
-            <a:r>
-              <a:rPr lang="es-AR" sz="7000" b="1" i="1" dirty="0"/>
-              <a:t>create </a:t>
-            </a:r>
-            <a:r>
-              <a:rPr lang="es-AR" sz="7000" b="1" i="1" dirty="0" err="1"/>
-              <a:t>procedure</a:t>
-            </a:r>
-            <a:r>
-              <a:rPr lang="es-AR" sz="7000" b="1" i="1" dirty="0"/>
-              <a:t> </a:t>
-            </a:r>
-            <a:r>
-              <a:rPr lang="es-AR" sz="7000" b="1" i="1" dirty="0" err="1"/>
-              <a:t>ingresar_padre</a:t>
-            </a:r>
-            <a:r>
-              <a:rPr lang="es-AR" sz="7000" b="1" i="1" dirty="0"/>
-              <a:t> (IN nombre </a:t>
-            </a:r>
-            <a:r>
-              <a:rPr lang="es-AR" sz="7000" b="1" i="1" dirty="0" err="1"/>
-              <a:t>varchar</a:t>
-            </a:r>
-            <a:r>
-              <a:rPr lang="es-AR" sz="7000" b="1" i="1" dirty="0"/>
-              <a:t>(50), IN apellido </a:t>
-            </a:r>
-            <a:r>
-              <a:rPr lang="es-AR" sz="7000" b="1" i="1" dirty="0" err="1"/>
-              <a:t>varchar</a:t>
-            </a:r>
-            <a:r>
-              <a:rPr lang="es-AR" sz="7000" b="1" i="1" dirty="0"/>
-              <a:t>(50), IN </a:t>
-            </a:r>
-            <a:r>
-              <a:rPr lang="es-AR" sz="7000" b="1" i="1" dirty="0" err="1"/>
-              <a:t>telefono</a:t>
-            </a:r>
-            <a:r>
-              <a:rPr lang="es-AR" sz="7000" b="1" i="1" dirty="0"/>
-              <a:t> </a:t>
-            </a:r>
-            <a:r>
-              <a:rPr lang="es-AR" sz="7000" b="1" i="1" dirty="0" err="1"/>
-              <a:t>varchar</a:t>
-            </a:r>
-            <a:r>
-              <a:rPr lang="es-AR" sz="7000" b="1" i="1" dirty="0"/>
-              <a:t>(15), IN </a:t>
-            </a:r>
-            <a:r>
-              <a:rPr lang="es-AR" sz="7000" b="1" i="1" dirty="0" err="1"/>
-              <a:t>direccion</a:t>
-            </a:r>
-            <a:r>
-              <a:rPr lang="es-AR" sz="7000" b="1" i="1" dirty="0"/>
-              <a:t> </a:t>
-            </a:r>
-            <a:r>
-              <a:rPr lang="es-AR" sz="7000" b="1" i="1" dirty="0" err="1"/>
-              <a:t>varchar</a:t>
-            </a:r>
-            <a:r>
-              <a:rPr lang="es-AR" sz="7000" b="1" i="1" dirty="0"/>
-              <a:t>(50), IN localidad </a:t>
-            </a:r>
-            <a:r>
-              <a:rPr lang="es-AR" sz="7000" b="1" i="1" dirty="0" err="1"/>
-              <a:t>varchar</a:t>
-            </a:r>
-            <a:r>
-              <a:rPr lang="es-AR" sz="7000" b="1" i="1" dirty="0"/>
-              <a:t>(50))</a:t>
-            </a:r>
-          </a:p>
-          <a:p>
-            <a:pPr marL="0" indent="0">
-              <a:buNone/>
-            </a:pPr>
-            <a:r>
-              <a:rPr lang="es-AR" sz="7000" b="1" i="1" dirty="0"/>
-              <a:t>begin</a:t>
-            </a:r>
-          </a:p>
-          <a:p>
-            <a:pPr marL="0" indent="0">
-              <a:buNone/>
-            </a:pPr>
-            <a:r>
-              <a:rPr lang="es-AR" sz="7000" b="1" i="1" dirty="0"/>
-              <a:t>	</a:t>
-            </a:r>
-            <a:r>
-              <a:rPr lang="es-AR" sz="7000" b="1" i="1" dirty="0" err="1"/>
-              <a:t>insert</a:t>
-            </a:r>
-            <a:r>
-              <a:rPr lang="es-AR" sz="7000" b="1" i="1" dirty="0"/>
-              <a:t> </a:t>
-            </a:r>
-            <a:r>
-              <a:rPr lang="es-AR" sz="7000" b="1" i="1" dirty="0" err="1"/>
-              <a:t>into</a:t>
-            </a:r>
-            <a:r>
-              <a:rPr lang="es-AR" sz="7000" b="1" i="1" dirty="0"/>
-              <a:t> padres </a:t>
-            </a:r>
-            <a:r>
-              <a:rPr lang="es-AR" sz="7000" b="1" i="1" dirty="0" err="1"/>
-              <a:t>values</a:t>
-            </a:r>
-            <a:r>
-              <a:rPr lang="es-AR" sz="7000" b="1" i="1" dirty="0"/>
-              <a:t> (nombre, apellido, </a:t>
-            </a:r>
-            <a:r>
-              <a:rPr lang="es-AR" sz="7000" b="1" i="1" dirty="0" err="1"/>
-              <a:t>telefono</a:t>
-            </a:r>
-            <a:r>
-              <a:rPr lang="es-AR" sz="7000" b="1" i="1" dirty="0"/>
-              <a:t>, </a:t>
-            </a:r>
-            <a:r>
-              <a:rPr lang="es-AR" sz="7000" b="1" i="1" dirty="0" err="1"/>
-              <a:t>direccion</a:t>
-            </a:r>
-            <a:r>
-              <a:rPr lang="es-AR" sz="7000" b="1" i="1" dirty="0"/>
-              <a:t>, localidad);</a:t>
-            </a:r>
-          </a:p>
-          <a:p>
-            <a:pPr marL="0" indent="0">
-              <a:buNone/>
-            </a:pPr>
-            <a:r>
-              <a:rPr lang="es-AR" sz="7000" b="1" i="1" dirty="0" err="1"/>
-              <a:t>end</a:t>
-            </a:r>
-            <a:endParaRPr lang="es-AR" sz="7000" b="1" i="1" dirty="0"/>
-          </a:p>
-          <a:p>
-            <a:pPr marL="0" indent="0">
-              <a:buNone/>
-            </a:pPr>
-            <a:r>
-              <a:rPr lang="es-AR" sz="7000" b="1" i="1" dirty="0"/>
-              <a:t>//</a:t>
-            </a:r>
-          </a:p>
-        </p:txBody>
-      </p:sp>
-      <p:pic>
-        <p:nvPicPr>
-          <p:cNvPr id="5" name="Imagen 4">
-            <a:extLst>
-              <a:ext uri="{FF2B5EF4-FFF2-40B4-BE49-F238E27FC236}">
-                <a16:creationId xmlns:a16="http://schemas.microsoft.com/office/drawing/2014/main" id="{925C2B20-E100-1B16-AF18-D79884EFE816}"/>
-              </a:ext>
-            </a:extLst>
-          </p:cNvPr>
-          <p:cNvPicPr>
-            <a:picLocks noChangeAspect="1"/>
-          </p:cNvPicPr>
-          <p:nvPr/>
-        </p:nvPicPr>
-        <p:blipFill>
-          <a:blip r:embed="rId2">
-            <a:extLst>
-              <a:ext uri="{28A0092B-C50C-407E-A947-70E740481C1C}">
-                <a14:useLocalDpi xmlns:a14="http://schemas.microsoft.com/office/drawing/2010/main" val="0"/>
-              </a:ext>
-            </a:extLst>
-          </a:blip>
-          <a:stretch>
-            <a:fillRect/>
-          </a:stretch>
-        </p:blipFill>
-        <p:spPr>
-          <a:xfrm>
-            <a:off x="11014849" y="6214095"/>
-            <a:ext cx="1080157" cy="643905"/>
-          </a:xfrm>
-          <a:prstGeom prst="rect">
-            <a:avLst/>
-          </a:prstGeom>
-        </p:spPr>
-      </p:pic>
-    </p:spTree>
-    <p:extLst>
-      <p:ext uri="{BB962C8B-B14F-4D97-AF65-F5344CB8AC3E}">
-        <p14:creationId xmlns:p14="http://schemas.microsoft.com/office/powerpoint/2010/main" val="3921412622"/>
       </p:ext>
     </p:extLst>
   </p:cSld>
@@ -7190,6 +8273,304 @@
       </p:grpSpPr>
       <p:sp>
         <p:nvSpPr>
+          <p:cNvPr id="4" name="Marcador de contenido 2">
+            <a:extLst>
+              <a:ext uri="{FF2B5EF4-FFF2-40B4-BE49-F238E27FC236}">
+                <a16:creationId xmlns:a16="http://schemas.microsoft.com/office/drawing/2014/main" id="{EB61B042-EB71-0D28-1A17-3C18F6B09593}"/>
+              </a:ext>
+            </a:extLst>
+          </p:cNvPr>
+          <p:cNvSpPr>
+            <a:spLocks noGrp="1"/>
+          </p:cNvSpPr>
+          <p:nvPr>
+            <p:ph idx="1"/>
+          </p:nvPr>
+        </p:nvSpPr>
+        <p:spPr>
+          <a:xfrm>
+            <a:off x="838200" y="427383"/>
+            <a:ext cx="10515600" cy="6112565"/>
+          </a:xfrm>
+        </p:spPr>
+        <p:txBody>
+          <a:bodyPr>
+            <a:normAutofit fontScale="32500" lnSpcReduction="20000"/>
+          </a:bodyPr>
+          <a:lstStyle/>
+          <a:p>
+            <a:pPr marL="0" indent="0" algn="ctr">
+              <a:buNone/>
+            </a:pPr>
+            <a:r>
+              <a:rPr lang="es-AR" sz="8600" dirty="0"/>
+              <a:t>Segunda Store Procedure</a:t>
+            </a:r>
+          </a:p>
+          <a:p>
+            <a:pPr marL="0" indent="0" algn="just">
+              <a:buNone/>
+            </a:pPr>
+            <a:endParaRPr lang="es-AR" sz="8600" dirty="0"/>
+          </a:p>
+          <a:p>
+            <a:pPr marL="0" indent="0" algn="just">
+              <a:buNone/>
+            </a:pPr>
+            <a:r>
+              <a:rPr lang="es-AR" sz="8600" dirty="0"/>
+              <a:t>Creo un procedimiento almacenado para insertar nuevos padres en su correspondiente tabla y no se pierda tiempo innecesariamente ingresando uno por uno los registros. El beneficio es mayor cuando se tienen muchos registros para ingresar, ya que los inserta  todos de una vez. </a:t>
+            </a:r>
+          </a:p>
+          <a:p>
+            <a:pPr marL="0" indent="0" algn="ctr">
+              <a:buNone/>
+            </a:pPr>
+            <a:endParaRPr lang="es-AR" sz="7000" dirty="0"/>
+          </a:p>
+          <a:p>
+            <a:pPr marL="0" indent="0" algn="ctr">
+              <a:buNone/>
+            </a:pPr>
+            <a:endParaRPr lang="es-AR" sz="7000" dirty="0"/>
+          </a:p>
+          <a:p>
+            <a:pPr marL="0" indent="0">
+              <a:buNone/>
+            </a:pPr>
+            <a:r>
+              <a:rPr lang="es-AR" sz="7000" b="1" i="1" dirty="0"/>
+              <a:t>delimiter //</a:t>
+            </a:r>
+          </a:p>
+          <a:p>
+            <a:pPr marL="0" indent="0">
+              <a:buNone/>
+            </a:pPr>
+            <a:r>
+              <a:rPr lang="es-AR" sz="7000" b="1" i="1" dirty="0"/>
+              <a:t>create </a:t>
+            </a:r>
+            <a:r>
+              <a:rPr lang="es-AR" sz="7000" b="1" i="1" dirty="0" err="1"/>
+              <a:t>procedure</a:t>
+            </a:r>
+            <a:r>
+              <a:rPr lang="es-AR" sz="7000" b="1" i="1" dirty="0"/>
+              <a:t> </a:t>
+            </a:r>
+            <a:r>
+              <a:rPr lang="es-AR" sz="7000" b="1" i="1" dirty="0" err="1"/>
+              <a:t>ingresar_padre</a:t>
+            </a:r>
+            <a:r>
+              <a:rPr lang="es-AR" sz="7000" b="1" i="1" dirty="0"/>
+              <a:t> (IN nombre </a:t>
+            </a:r>
+            <a:r>
+              <a:rPr lang="es-AR" sz="7000" b="1" i="1" dirty="0" err="1"/>
+              <a:t>varchar</a:t>
+            </a:r>
+            <a:r>
+              <a:rPr lang="es-AR" sz="7000" b="1" i="1" dirty="0"/>
+              <a:t>(50), IN apellido </a:t>
+            </a:r>
+            <a:r>
+              <a:rPr lang="es-AR" sz="7000" b="1" i="1" dirty="0" err="1"/>
+              <a:t>varchar</a:t>
+            </a:r>
+            <a:r>
+              <a:rPr lang="es-AR" sz="7000" b="1" i="1" dirty="0"/>
+              <a:t>(50), IN </a:t>
+            </a:r>
+            <a:r>
+              <a:rPr lang="es-AR" sz="7000" b="1" i="1" dirty="0" err="1"/>
+              <a:t>telefono</a:t>
+            </a:r>
+            <a:r>
+              <a:rPr lang="es-AR" sz="7000" b="1" i="1" dirty="0"/>
+              <a:t> </a:t>
+            </a:r>
+            <a:r>
+              <a:rPr lang="es-AR" sz="7000" b="1" i="1" dirty="0" err="1"/>
+              <a:t>varchar</a:t>
+            </a:r>
+            <a:r>
+              <a:rPr lang="es-AR" sz="7000" b="1" i="1" dirty="0"/>
+              <a:t>(15), IN </a:t>
+            </a:r>
+            <a:r>
+              <a:rPr lang="es-AR" sz="7000" b="1" i="1" dirty="0" err="1"/>
+              <a:t>direccion</a:t>
+            </a:r>
+            <a:r>
+              <a:rPr lang="es-AR" sz="7000" b="1" i="1" dirty="0"/>
+              <a:t> </a:t>
+            </a:r>
+            <a:r>
+              <a:rPr lang="es-AR" sz="7000" b="1" i="1" dirty="0" err="1"/>
+              <a:t>varchar</a:t>
+            </a:r>
+            <a:r>
+              <a:rPr lang="es-AR" sz="7000" b="1" i="1" dirty="0"/>
+              <a:t>(50), IN localidad </a:t>
+            </a:r>
+            <a:r>
+              <a:rPr lang="es-AR" sz="7000" b="1" i="1" dirty="0" err="1"/>
+              <a:t>varchar</a:t>
+            </a:r>
+            <a:r>
+              <a:rPr lang="es-AR" sz="7000" b="1" i="1" dirty="0"/>
+              <a:t>(50))</a:t>
+            </a:r>
+          </a:p>
+          <a:p>
+            <a:pPr marL="0" indent="0">
+              <a:buNone/>
+            </a:pPr>
+            <a:r>
+              <a:rPr lang="es-AR" sz="7000" b="1" i="1" dirty="0"/>
+              <a:t>begin</a:t>
+            </a:r>
+          </a:p>
+          <a:p>
+            <a:pPr marL="0" indent="0">
+              <a:buNone/>
+            </a:pPr>
+            <a:r>
+              <a:rPr lang="es-AR" sz="7000" b="1" i="1" dirty="0"/>
+              <a:t>	</a:t>
+            </a:r>
+            <a:r>
+              <a:rPr lang="es-AR" sz="7000" b="1" i="1" dirty="0" err="1"/>
+              <a:t>insert</a:t>
+            </a:r>
+            <a:r>
+              <a:rPr lang="es-AR" sz="7000" b="1" i="1" dirty="0"/>
+              <a:t> </a:t>
+            </a:r>
+            <a:r>
+              <a:rPr lang="es-AR" sz="7000" b="1" i="1" dirty="0" err="1"/>
+              <a:t>into</a:t>
+            </a:r>
+            <a:r>
+              <a:rPr lang="es-AR" sz="7000" b="1" i="1" dirty="0"/>
+              <a:t> padres </a:t>
+            </a:r>
+            <a:r>
+              <a:rPr lang="es-AR" sz="7000" b="1" i="1" dirty="0" err="1"/>
+              <a:t>values</a:t>
+            </a:r>
+            <a:r>
+              <a:rPr lang="es-AR" sz="7000" b="1" i="1" dirty="0"/>
+              <a:t> (nombre, apellido, </a:t>
+            </a:r>
+            <a:r>
+              <a:rPr lang="es-AR" sz="7000" b="1" i="1" dirty="0" err="1"/>
+              <a:t>telefono</a:t>
+            </a:r>
+            <a:r>
+              <a:rPr lang="es-AR" sz="7000" b="1" i="1" dirty="0"/>
+              <a:t>, </a:t>
+            </a:r>
+            <a:r>
+              <a:rPr lang="es-AR" sz="7000" b="1" i="1" dirty="0" err="1"/>
+              <a:t>direccion</a:t>
+            </a:r>
+            <a:r>
+              <a:rPr lang="es-AR" sz="7000" b="1" i="1" dirty="0"/>
+              <a:t>, localidad);</a:t>
+            </a:r>
+          </a:p>
+          <a:p>
+            <a:pPr marL="0" indent="0">
+              <a:buNone/>
+            </a:pPr>
+            <a:r>
+              <a:rPr lang="es-AR" sz="7000" b="1" i="1" dirty="0" err="1"/>
+              <a:t>end</a:t>
+            </a:r>
+            <a:endParaRPr lang="es-AR" sz="7000" b="1" i="1" dirty="0"/>
+          </a:p>
+          <a:p>
+            <a:pPr marL="0" indent="0">
+              <a:buNone/>
+            </a:pPr>
+            <a:r>
+              <a:rPr lang="es-AR" sz="7000" b="1" i="1" dirty="0"/>
+              <a:t>//</a:t>
+            </a:r>
+          </a:p>
+        </p:txBody>
+      </p:sp>
+      <p:pic>
+        <p:nvPicPr>
+          <p:cNvPr id="5" name="Imagen 4">
+            <a:extLst>
+              <a:ext uri="{FF2B5EF4-FFF2-40B4-BE49-F238E27FC236}">
+                <a16:creationId xmlns:a16="http://schemas.microsoft.com/office/drawing/2014/main" id="{925C2B20-E100-1B16-AF18-D79884EFE816}"/>
+              </a:ext>
+            </a:extLst>
+          </p:cNvPr>
+          <p:cNvPicPr>
+            <a:picLocks noChangeAspect="1"/>
+          </p:cNvPicPr>
+          <p:nvPr/>
+        </p:nvPicPr>
+        <p:blipFill>
+          <a:blip r:embed="rId2">
+            <a:extLst>
+              <a:ext uri="{28A0092B-C50C-407E-A947-70E740481C1C}">
+                <a14:useLocalDpi xmlns:a14="http://schemas.microsoft.com/office/drawing/2010/main" val="0"/>
+              </a:ext>
+            </a:extLst>
+          </a:blip>
+          <a:stretch>
+            <a:fillRect/>
+          </a:stretch>
+        </p:blipFill>
+        <p:spPr>
+          <a:xfrm>
+            <a:off x="11014849" y="6214095"/>
+            <a:ext cx="1080157" cy="643905"/>
+          </a:xfrm>
+          <a:prstGeom prst="rect">
+            <a:avLst/>
+          </a:prstGeom>
+        </p:spPr>
+      </p:pic>
+    </p:spTree>
+    <p:extLst>
+      <p:ext uri="{BB962C8B-B14F-4D97-AF65-F5344CB8AC3E}">
+        <p14:creationId xmlns:p14="http://schemas.microsoft.com/office/powerpoint/2010/main" val="3921412622"/>
+      </p:ext>
+    </p:extLst>
+  </p:cSld>
+  <p:clrMapOvr>
+    <a:masterClrMapping/>
+  </p:clrMapOvr>
+</p:sld>
+</file>
+
+<file path=ppt/slides/slide21.xml><?xml version="1.0" encoding="utf-8"?>
+<p:sld xmlns:a="http://schemas.openxmlformats.org/drawingml/2006/main" xmlns:r="http://schemas.openxmlformats.org/officeDocument/2006/relationships" xmlns:p="http://schemas.openxmlformats.org/presentationml/2006/main">
+  <p:cSld>
+    <p:spTree>
+      <p:nvGrpSpPr>
+        <p:cNvPr id="1" name=""/>
+        <p:cNvGrpSpPr/>
+        <p:nvPr/>
+      </p:nvGrpSpPr>
+      <p:grpSpPr>
+        <a:xfrm>
+          <a:off x="0" y="0"/>
+          <a:ext cx="0" cy="0"/>
+          <a:chOff x="0" y="0"/>
+          <a:chExt cx="0" cy="0"/>
+        </a:xfrm>
+      </p:grpSpPr>
+      <p:sp>
+        <p:nvSpPr>
           <p:cNvPr id="4" name="Título 1">
             <a:extLst>
               <a:ext uri="{FF2B5EF4-FFF2-40B4-BE49-F238E27FC236}">
@@ -7546,7 +8927,7 @@
 </p:sld>
 </file>
 
-<file path=ppt/slides/slide21.xml><?xml version="1.0" encoding="utf-8"?>
+<file path=ppt/slides/slide22.xml><?xml version="1.0" encoding="utf-8"?>
 <p:sld xmlns:a="http://schemas.openxmlformats.org/drawingml/2006/main" xmlns:r="http://schemas.openxmlformats.org/officeDocument/2006/relationships" xmlns:p="http://schemas.openxmlformats.org/presentationml/2006/main">
   <p:cSld>
     <p:spTree>
@@ -7880,574 +9261,6 @@
     <p:extLst>
       <p:ext uri="{BB962C8B-B14F-4D97-AF65-F5344CB8AC3E}">
         <p14:creationId xmlns:p14="http://schemas.microsoft.com/office/powerpoint/2010/main" val="4141480441"/>
-      </p:ext>
-    </p:extLst>
-  </p:cSld>
-  <p:clrMapOvr>
-    <a:masterClrMapping/>
-  </p:clrMapOvr>
-</p:sld>
-</file>
-
-<file path=ppt/slides/slide22.xml><?xml version="1.0" encoding="utf-8"?>
-<p:sld xmlns:a="http://schemas.openxmlformats.org/drawingml/2006/main" xmlns:r="http://schemas.openxmlformats.org/officeDocument/2006/relationships" xmlns:p="http://schemas.openxmlformats.org/presentationml/2006/main">
-  <p:cSld>
-    <p:spTree>
-      <p:nvGrpSpPr>
-        <p:cNvPr id="1" name=""/>
-        <p:cNvGrpSpPr/>
-        <p:nvPr/>
-      </p:nvGrpSpPr>
-      <p:grpSpPr>
-        <a:xfrm>
-          <a:off x="0" y="0"/>
-          <a:ext cx="0" cy="0"/>
-          <a:chOff x="0" y="0"/>
-          <a:chExt cx="0" cy="0"/>
-        </a:xfrm>
-      </p:grpSpPr>
-      <p:sp>
-        <p:nvSpPr>
-          <p:cNvPr id="4" name="Título 1">
-            <a:extLst>
-              <a:ext uri="{FF2B5EF4-FFF2-40B4-BE49-F238E27FC236}">
-                <a16:creationId xmlns:a16="http://schemas.microsoft.com/office/drawing/2014/main" id="{9B123833-C5C8-8AE3-4499-6CBDA7A11032}"/>
-              </a:ext>
-            </a:extLst>
-          </p:cNvPr>
-          <p:cNvSpPr>
-            <a:spLocks noGrp="1"/>
-          </p:cNvSpPr>
-          <p:nvPr>
-            <p:ph type="title"/>
-          </p:nvPr>
-        </p:nvSpPr>
-        <p:spPr>
-          <a:xfrm>
-            <a:off x="838200" y="-157242"/>
-            <a:ext cx="10515600" cy="1129494"/>
-          </a:xfrm>
-        </p:spPr>
-        <p:txBody>
-          <a:bodyPr>
-            <a:normAutofit/>
-          </a:bodyPr>
-          <a:lstStyle/>
-          <a:p>
-            <a:pPr algn="ctr"/>
-            <a:r>
-              <a:rPr lang="es-AR" b="1" dirty="0"/>
-              <a:t>Script de inserción de datos.</a:t>
-            </a:r>
-            <a:endParaRPr lang="es-AR" dirty="0">
-              <a:highlight>
-                <a:srgbClr val="FFFF00"/>
-              </a:highlight>
-            </a:endParaRPr>
-          </a:p>
-        </p:txBody>
-      </p:sp>
-      <p:sp>
-        <p:nvSpPr>
-          <p:cNvPr id="6" name="Marcador de contenido 5">
-            <a:extLst>
-              <a:ext uri="{FF2B5EF4-FFF2-40B4-BE49-F238E27FC236}">
-                <a16:creationId xmlns:a16="http://schemas.microsoft.com/office/drawing/2014/main" id="{9FBE3200-F105-8905-7453-E4E43B461FDB}"/>
-              </a:ext>
-            </a:extLst>
-          </p:cNvPr>
-          <p:cNvSpPr>
-            <a:spLocks noGrp="1"/>
-          </p:cNvSpPr>
-          <p:nvPr>
-            <p:ph idx="1"/>
-          </p:nvPr>
-        </p:nvSpPr>
-        <p:spPr>
-          <a:xfrm>
-            <a:off x="838200" y="972252"/>
-            <a:ext cx="10515600" cy="5204711"/>
-          </a:xfrm>
-        </p:spPr>
-        <p:txBody>
-          <a:bodyPr>
-            <a:normAutofit fontScale="47500" lnSpcReduction="20000"/>
-          </a:bodyPr>
-          <a:lstStyle/>
-          <a:p>
-            <a:pPr marL="0" indent="0">
-              <a:buNone/>
-            </a:pPr>
-            <a:r>
-              <a:rPr lang="es-AR" sz="3800" dirty="0"/>
-              <a:t>Este es un ejemplo de inserción de datos que se puede apreciar en el archivo .</a:t>
-            </a:r>
-            <a:r>
-              <a:rPr lang="es-AR" sz="3800" dirty="0" err="1"/>
-              <a:t>sql</a:t>
-            </a:r>
-            <a:r>
-              <a:rPr lang="es-AR" sz="3800" dirty="0"/>
-              <a:t> que va adjunto a este documento. Por motivos de espacio los invito a revisar el archivo mencionado.</a:t>
-            </a:r>
-          </a:p>
-          <a:p>
-            <a:pPr marL="0" indent="0">
-              <a:buNone/>
-            </a:pPr>
-            <a:endParaRPr lang="es-AR" dirty="0"/>
-          </a:p>
-          <a:p>
-            <a:pPr marL="0" indent="0" algn="ctr">
-              <a:buNone/>
-            </a:pPr>
-            <a:r>
-              <a:rPr lang="es-AR" b="1" dirty="0" err="1">
-                <a:solidFill>
-                  <a:srgbClr val="C00000"/>
-                </a:solidFill>
-              </a:rPr>
-              <a:t>insert</a:t>
-            </a:r>
-            <a:r>
-              <a:rPr lang="es-AR" b="1" dirty="0">
-                <a:solidFill>
-                  <a:srgbClr val="C00000"/>
-                </a:solidFill>
-              </a:rPr>
-              <a:t> </a:t>
-            </a:r>
-            <a:r>
-              <a:rPr lang="es-AR" b="1" dirty="0" err="1">
-                <a:solidFill>
-                  <a:srgbClr val="C00000"/>
-                </a:solidFill>
-              </a:rPr>
-              <a:t>into</a:t>
-            </a:r>
-            <a:r>
-              <a:rPr lang="es-AR" b="1" dirty="0">
-                <a:solidFill>
-                  <a:srgbClr val="C00000"/>
-                </a:solidFill>
-              </a:rPr>
-              <a:t> profesores (nombre, apellido, email, </a:t>
-            </a:r>
-            <a:r>
-              <a:rPr lang="es-AR" b="1" dirty="0" err="1">
-                <a:solidFill>
-                  <a:srgbClr val="C00000"/>
-                </a:solidFill>
-              </a:rPr>
-              <a:t>telefono</a:t>
-            </a:r>
-            <a:r>
-              <a:rPr lang="es-AR" b="1" dirty="0">
-                <a:solidFill>
-                  <a:srgbClr val="C00000"/>
-                </a:solidFill>
-              </a:rPr>
-              <a:t>) </a:t>
-            </a:r>
-            <a:r>
-              <a:rPr lang="es-AR" b="1" dirty="0" err="1">
-                <a:solidFill>
-                  <a:srgbClr val="C00000"/>
-                </a:solidFill>
-              </a:rPr>
-              <a:t>values</a:t>
-            </a:r>
-            <a:endParaRPr lang="es-AR" b="1" dirty="0">
-              <a:solidFill>
-                <a:srgbClr val="C00000"/>
-              </a:solidFill>
-            </a:endParaRPr>
-          </a:p>
-          <a:p>
-            <a:pPr marL="0" indent="0" algn="ctr">
-              <a:buNone/>
-            </a:pPr>
-            <a:r>
-              <a:rPr lang="es-AR" b="1" dirty="0"/>
-              <a:t>('Cristina', 'Besada', '</a:t>
-            </a:r>
-            <a:r>
-              <a:rPr lang="es-AR" b="1" dirty="0" err="1"/>
-              <a:t>cbesada@gmail.com</a:t>
-            </a:r>
-            <a:r>
-              <a:rPr lang="es-AR" b="1" dirty="0"/>
-              <a:t>', 11-38729732),</a:t>
-            </a:r>
-          </a:p>
-          <a:p>
-            <a:pPr marL="0" indent="0" algn="ctr">
-              <a:buNone/>
-            </a:pPr>
-            <a:r>
-              <a:rPr lang="es-AR" b="1" dirty="0"/>
-              <a:t>('Mario', 'Mansilla', '</a:t>
-            </a:r>
-            <a:r>
-              <a:rPr lang="es-AR" b="1" dirty="0" err="1"/>
-              <a:t>mmansilla@hotmail.com</a:t>
-            </a:r>
-            <a:r>
-              <a:rPr lang="es-AR" b="1" dirty="0"/>
-              <a:t>', 11-21979733),</a:t>
-            </a:r>
-          </a:p>
-          <a:p>
-            <a:pPr marL="0" indent="0" algn="ctr">
-              <a:buNone/>
-            </a:pPr>
-            <a:r>
-              <a:rPr lang="es-AR" b="1" dirty="0"/>
-              <a:t>('</a:t>
-            </a:r>
-            <a:r>
-              <a:rPr lang="es-AR" b="1" dirty="0" err="1"/>
-              <a:t>Dario</a:t>
-            </a:r>
-            <a:r>
-              <a:rPr lang="es-AR" b="1" dirty="0"/>
-              <a:t>', 'Albornoz', '</a:t>
-            </a:r>
-            <a:r>
-              <a:rPr lang="es-AR" b="1" dirty="0" err="1"/>
-              <a:t>dalbornoz@gmail.com</a:t>
-            </a:r>
-            <a:r>
-              <a:rPr lang="es-AR" b="1" dirty="0"/>
-              <a:t>', 11-31149344),</a:t>
-            </a:r>
-          </a:p>
-          <a:p>
-            <a:pPr marL="0" indent="0" algn="ctr">
-              <a:buNone/>
-            </a:pPr>
-            <a:r>
-              <a:rPr lang="es-AR" b="1" dirty="0"/>
-              <a:t>('Pablo', '</a:t>
-            </a:r>
-            <a:r>
-              <a:rPr lang="es-AR" b="1" dirty="0" err="1"/>
-              <a:t>Gimenez</a:t>
-            </a:r>
-            <a:r>
-              <a:rPr lang="es-AR" b="1" dirty="0"/>
-              <a:t>', '</a:t>
-            </a:r>
-            <a:r>
-              <a:rPr lang="es-AR" b="1" dirty="0" err="1"/>
-              <a:t>pgimenez@outlook.com</a:t>
-            </a:r>
-            <a:r>
-              <a:rPr lang="es-AR" b="1" dirty="0"/>
-              <a:t>', 11-38336231),</a:t>
-            </a:r>
-          </a:p>
-          <a:p>
-            <a:pPr marL="0" indent="0" algn="ctr">
-              <a:buNone/>
-            </a:pPr>
-            <a:r>
-              <a:rPr lang="es-AR" b="1" dirty="0"/>
-              <a:t>('</a:t>
-            </a:r>
-            <a:r>
-              <a:rPr lang="es-AR" b="1" dirty="0" err="1"/>
-              <a:t>Belen</a:t>
-            </a:r>
-            <a:r>
-              <a:rPr lang="es-AR" b="1" dirty="0"/>
-              <a:t>', '</a:t>
-            </a:r>
-            <a:r>
-              <a:rPr lang="es-AR" b="1" dirty="0" err="1"/>
-              <a:t>Aguero</a:t>
-            </a:r>
-            <a:r>
-              <a:rPr lang="es-AR" b="1" dirty="0"/>
-              <a:t>', '</a:t>
-            </a:r>
-            <a:r>
-              <a:rPr lang="es-AR" b="1" dirty="0" err="1"/>
-              <a:t>baguero@yahoo.com</a:t>
-            </a:r>
-            <a:r>
-              <a:rPr lang="es-AR" b="1" dirty="0"/>
-              <a:t>', 11-18887122),</a:t>
-            </a:r>
-          </a:p>
-          <a:p>
-            <a:pPr marL="0" indent="0" algn="ctr">
-              <a:buNone/>
-            </a:pPr>
-            <a:r>
-              <a:rPr lang="es-AR" b="1" dirty="0"/>
-              <a:t>('Mariano', '</a:t>
-            </a:r>
-            <a:r>
-              <a:rPr lang="es-AR" b="1" dirty="0" err="1"/>
-              <a:t>Martinez</a:t>
-            </a:r>
-            <a:r>
-              <a:rPr lang="es-AR" b="1" dirty="0"/>
-              <a:t>', '</a:t>
-            </a:r>
-            <a:r>
-              <a:rPr lang="es-AR" b="1" dirty="0" err="1"/>
-              <a:t>mmartinez@gmail.com</a:t>
-            </a:r>
-            <a:r>
-              <a:rPr lang="es-AR" b="1" dirty="0"/>
-              <a:t>', 11-22299988),</a:t>
-            </a:r>
-          </a:p>
-          <a:p>
-            <a:pPr marL="0" indent="0" algn="ctr">
-              <a:buNone/>
-            </a:pPr>
-            <a:r>
-              <a:rPr lang="es-AR" b="1" dirty="0"/>
-              <a:t>('Carlos', 'Rico', '</a:t>
-            </a:r>
-            <a:r>
-              <a:rPr lang="es-AR" b="1" dirty="0" err="1"/>
-              <a:t>crico@yahoo.com</a:t>
-            </a:r>
-            <a:r>
-              <a:rPr lang="es-AR" b="1" dirty="0"/>
-              <a:t>', 11-45551122),</a:t>
-            </a:r>
-          </a:p>
-          <a:p>
-            <a:pPr marL="0" indent="0" algn="ctr">
-              <a:buNone/>
-            </a:pPr>
-            <a:r>
-              <a:rPr lang="es-AR" b="1" dirty="0"/>
-              <a:t>('Cristina', 'Cernadas', '</a:t>
-            </a:r>
-            <a:r>
-              <a:rPr lang="es-AR" b="1" dirty="0" err="1"/>
-              <a:t>ccernadas@outllok.com</a:t>
-            </a:r>
-            <a:r>
-              <a:rPr lang="es-AR" b="1" dirty="0"/>
-              <a:t>', 11-38743298),</a:t>
-            </a:r>
-          </a:p>
-          <a:p>
-            <a:pPr marL="0" indent="0" algn="ctr">
-              <a:buNone/>
-            </a:pPr>
-            <a:r>
-              <a:rPr lang="es-AR" b="1" dirty="0"/>
-              <a:t>('Mariela', '</a:t>
-            </a:r>
-            <a:r>
-              <a:rPr lang="es-AR" b="1" dirty="0" err="1"/>
-              <a:t>Darchivio</a:t>
-            </a:r>
-            <a:r>
-              <a:rPr lang="es-AR" b="1" dirty="0"/>
-              <a:t>', '</a:t>
-            </a:r>
-            <a:r>
-              <a:rPr lang="es-AR" b="1" dirty="0" err="1"/>
-              <a:t>mdarchivio@hotmail.com</a:t>
-            </a:r>
-            <a:r>
-              <a:rPr lang="es-AR" b="1" dirty="0"/>
-              <a:t>', 11-91123961),</a:t>
-            </a:r>
-          </a:p>
-          <a:p>
-            <a:pPr marL="0" indent="0" algn="ctr">
-              <a:buNone/>
-            </a:pPr>
-            <a:r>
-              <a:rPr lang="es-AR" b="1" dirty="0"/>
-              <a:t>('Juan Pedro', 'Rosa Alves', '</a:t>
-            </a:r>
-            <a:r>
-              <a:rPr lang="es-AR" b="1" dirty="0" err="1"/>
-              <a:t>jpralves@gmail.com</a:t>
-            </a:r>
-            <a:r>
-              <a:rPr lang="es-AR" b="1" dirty="0"/>
-              <a:t>', 11-21299832),</a:t>
-            </a:r>
-          </a:p>
-          <a:p>
-            <a:pPr marL="0" indent="0" algn="ctr">
-              <a:buNone/>
-            </a:pPr>
-            <a:r>
-              <a:rPr lang="es-AR" b="1" dirty="0"/>
-              <a:t>('Cristina', 'Besada', '</a:t>
-            </a:r>
-            <a:r>
-              <a:rPr lang="es-AR" b="1" dirty="0" err="1"/>
-              <a:t>cbesada@gmail.com</a:t>
-            </a:r>
-            <a:r>
-              <a:rPr lang="es-AR" b="1" dirty="0"/>
-              <a:t>', 11-21294349),</a:t>
-            </a:r>
-          </a:p>
-          <a:p>
-            <a:pPr marL="0" indent="0" algn="ctr">
-              <a:buNone/>
-            </a:pPr>
-            <a:r>
-              <a:rPr lang="es-AR" b="1" dirty="0"/>
-              <a:t>('</a:t>
-            </a:r>
-            <a:r>
-              <a:rPr lang="es-AR" b="1" dirty="0" err="1"/>
-              <a:t>Jose</a:t>
-            </a:r>
-            <a:r>
-              <a:rPr lang="es-AR" b="1" dirty="0"/>
-              <a:t>', '</a:t>
-            </a:r>
-            <a:r>
-              <a:rPr lang="es-AR" b="1" dirty="0" err="1"/>
-              <a:t>Gorini</a:t>
-            </a:r>
-            <a:r>
-              <a:rPr lang="es-AR" b="1" dirty="0"/>
-              <a:t>', '</a:t>
-            </a:r>
-            <a:r>
-              <a:rPr lang="es-AR" b="1" dirty="0" err="1"/>
-              <a:t>jgorini@masterweb.com</a:t>
-            </a:r>
-            <a:r>
-              <a:rPr lang="es-AR" b="1" dirty="0"/>
-              <a:t>', 11-62300301),</a:t>
-            </a:r>
-          </a:p>
-          <a:p>
-            <a:pPr marL="0" indent="0" algn="ctr">
-              <a:buNone/>
-            </a:pPr>
-            <a:r>
-              <a:rPr lang="es-AR" b="1" dirty="0"/>
-              <a:t>('Mariano', '</a:t>
-            </a:r>
-            <a:r>
-              <a:rPr lang="es-AR" b="1" dirty="0" err="1"/>
-              <a:t>Galvan</a:t>
-            </a:r>
-            <a:r>
-              <a:rPr lang="es-AR" b="1" dirty="0"/>
-              <a:t>', '</a:t>
-            </a:r>
-            <a:r>
-              <a:rPr lang="es-AR" b="1" dirty="0" err="1"/>
-              <a:t>mgalvan@hotmail.com</a:t>
-            </a:r>
-            <a:r>
-              <a:rPr lang="es-AR" b="1" dirty="0"/>
-              <a:t>', 11-91294923),</a:t>
-            </a:r>
-          </a:p>
-          <a:p>
-            <a:pPr marL="0" indent="0" algn="ctr">
-              <a:buNone/>
-            </a:pPr>
-            <a:r>
-              <a:rPr lang="es-AR" b="1" dirty="0"/>
-              <a:t>('Daniela', '</a:t>
-            </a:r>
-            <a:r>
-              <a:rPr lang="es-AR" b="1" dirty="0" err="1"/>
-              <a:t>Rezzonico</a:t>
-            </a:r>
-            <a:r>
-              <a:rPr lang="es-AR" b="1" dirty="0"/>
-              <a:t>', '</a:t>
-            </a:r>
-            <a:r>
-              <a:rPr lang="es-AR" b="1" dirty="0" err="1"/>
-              <a:t>drezzonico@gmail.com</a:t>
-            </a:r>
-            <a:r>
-              <a:rPr lang="es-AR" b="1" dirty="0"/>
-              <a:t>', 11-21002399),</a:t>
-            </a:r>
-          </a:p>
-          <a:p>
-            <a:pPr marL="0" indent="0" algn="ctr">
-              <a:buNone/>
-            </a:pPr>
-            <a:r>
-              <a:rPr lang="es-AR" b="1" dirty="0"/>
-              <a:t>('Gaspar', '</a:t>
-            </a:r>
-            <a:r>
-              <a:rPr lang="es-AR" b="1" dirty="0" err="1"/>
-              <a:t>Geraghty</a:t>
-            </a:r>
-            <a:r>
-              <a:rPr lang="es-AR" b="1" dirty="0"/>
-              <a:t>', '</a:t>
-            </a:r>
-            <a:r>
-              <a:rPr lang="es-AR" b="1" dirty="0" err="1"/>
-              <a:t>ggeraghty@yahoo.com</a:t>
-            </a:r>
-            <a:r>
-              <a:rPr lang="es-AR" b="1" dirty="0"/>
-              <a:t>', 11-22291010);</a:t>
-            </a:r>
-          </a:p>
-        </p:txBody>
-      </p:sp>
-      <p:pic>
-        <p:nvPicPr>
-          <p:cNvPr id="7" name="Imagen 6">
-            <a:extLst>
-              <a:ext uri="{FF2B5EF4-FFF2-40B4-BE49-F238E27FC236}">
-                <a16:creationId xmlns:a16="http://schemas.microsoft.com/office/drawing/2014/main" id="{9B77B61D-DA00-D29A-A9F9-584CA85E62BC}"/>
-              </a:ext>
-            </a:extLst>
-          </p:cNvPr>
-          <p:cNvPicPr>
-            <a:picLocks noChangeAspect="1"/>
-          </p:cNvPicPr>
-          <p:nvPr/>
-        </p:nvPicPr>
-        <p:blipFill>
-          <a:blip r:embed="rId2">
-            <a:extLst>
-              <a:ext uri="{28A0092B-C50C-407E-A947-70E740481C1C}">
-                <a14:useLocalDpi xmlns:a14="http://schemas.microsoft.com/office/drawing/2010/main" val="0"/>
-              </a:ext>
-            </a:extLst>
-          </a:blip>
-          <a:stretch>
-            <a:fillRect/>
-          </a:stretch>
-        </p:blipFill>
-        <p:spPr>
-          <a:xfrm>
-            <a:off x="11014849" y="6214095"/>
-            <a:ext cx="1080157" cy="643905"/>
-          </a:xfrm>
-          <a:prstGeom prst="rect">
-            <a:avLst/>
-          </a:prstGeom>
-        </p:spPr>
-      </p:pic>
-    </p:spTree>
-    <p:extLst>
-      <p:ext uri="{BB962C8B-B14F-4D97-AF65-F5344CB8AC3E}">
-        <p14:creationId xmlns:p14="http://schemas.microsoft.com/office/powerpoint/2010/main" val="795873802"/>
       </p:ext>
     </p:extLst>
   </p:cSld>
@@ -8479,7 +9292,7 @@
           <p:cNvPr id="4" name="Título 1">
             <a:extLst>
               <a:ext uri="{FF2B5EF4-FFF2-40B4-BE49-F238E27FC236}">
-                <a16:creationId xmlns:a16="http://schemas.microsoft.com/office/drawing/2014/main" id="{97132279-6C70-A3B9-178C-B49C7050EB4D}"/>
+                <a16:creationId xmlns:a16="http://schemas.microsoft.com/office/drawing/2014/main" id="{9B123833-C5C8-8AE3-4499-6CBDA7A11032}"/>
               </a:ext>
             </a:extLst>
           </p:cNvPr>
@@ -8492,20 +9305,20 @@
         </p:nvSpPr>
         <p:spPr>
           <a:xfrm>
-            <a:off x="838200" y="0"/>
+            <a:off x="838200" y="-157242"/>
             <a:ext cx="10515600" cy="1129494"/>
           </a:xfrm>
         </p:spPr>
         <p:txBody>
           <a:bodyPr>
-            <a:normAutofit fontScale="90000"/>
+            <a:normAutofit/>
           </a:bodyPr>
           <a:lstStyle/>
           <a:p>
             <a:pPr algn="ctr"/>
             <a:r>
               <a:rPr lang="es-AR" b="1" dirty="0"/>
-              <a:t>Informes generados en base a la información obtenida por la BB.DD</a:t>
+              <a:t>Script de inserción de datos.</a:t>
             </a:r>
             <a:endParaRPr lang="es-AR" dirty="0">
               <a:highlight>
@@ -8515,12 +9328,473 @@
           </a:p>
         </p:txBody>
       </p:sp>
+      <p:sp>
+        <p:nvSpPr>
+          <p:cNvPr id="6" name="Marcador de contenido 5">
+            <a:extLst>
+              <a:ext uri="{FF2B5EF4-FFF2-40B4-BE49-F238E27FC236}">
+                <a16:creationId xmlns:a16="http://schemas.microsoft.com/office/drawing/2014/main" id="{9FBE3200-F105-8905-7453-E4E43B461FDB}"/>
+              </a:ext>
+            </a:extLst>
+          </p:cNvPr>
+          <p:cNvSpPr>
+            <a:spLocks noGrp="1"/>
+          </p:cNvSpPr>
+          <p:nvPr>
+            <p:ph idx="1"/>
+          </p:nvPr>
+        </p:nvSpPr>
+        <p:spPr>
+          <a:xfrm>
+            <a:off x="838200" y="972252"/>
+            <a:ext cx="10515600" cy="5204711"/>
+          </a:xfrm>
+        </p:spPr>
+        <p:txBody>
+          <a:bodyPr>
+            <a:normAutofit fontScale="47500" lnSpcReduction="20000"/>
+          </a:bodyPr>
+          <a:lstStyle/>
+          <a:p>
+            <a:pPr marL="0" indent="0">
+              <a:buNone/>
+            </a:pPr>
+            <a:r>
+              <a:rPr lang="es-AR" sz="3800" dirty="0"/>
+              <a:t>Este es un ejemplo de inserción de datos que se puede apreciar en el archivo .</a:t>
+            </a:r>
+            <a:r>
+              <a:rPr lang="es-AR" sz="3800" dirty="0" err="1"/>
+              <a:t>sql</a:t>
+            </a:r>
+            <a:r>
+              <a:rPr lang="es-AR" sz="3800" dirty="0"/>
+              <a:t> que va adjunto a este documento. Por motivos de espacio los invito a revisar el archivo mencionado.</a:t>
+            </a:r>
+          </a:p>
+          <a:p>
+            <a:pPr marL="0" indent="0">
+              <a:buNone/>
+            </a:pPr>
+            <a:endParaRPr lang="es-AR" dirty="0"/>
+          </a:p>
+          <a:p>
+            <a:pPr marL="0" indent="0" algn="ctr">
+              <a:buNone/>
+            </a:pPr>
+            <a:r>
+              <a:rPr lang="es-AR" b="1" dirty="0" err="1">
+                <a:solidFill>
+                  <a:srgbClr val="C00000"/>
+                </a:solidFill>
+              </a:rPr>
+              <a:t>insert</a:t>
+            </a:r>
+            <a:r>
+              <a:rPr lang="es-AR" b="1" dirty="0">
+                <a:solidFill>
+                  <a:srgbClr val="C00000"/>
+                </a:solidFill>
+              </a:rPr>
+              <a:t> </a:t>
+            </a:r>
+            <a:r>
+              <a:rPr lang="es-AR" b="1" dirty="0" err="1">
+                <a:solidFill>
+                  <a:srgbClr val="C00000"/>
+                </a:solidFill>
+              </a:rPr>
+              <a:t>into</a:t>
+            </a:r>
+            <a:r>
+              <a:rPr lang="es-AR" b="1" dirty="0">
+                <a:solidFill>
+                  <a:srgbClr val="C00000"/>
+                </a:solidFill>
+              </a:rPr>
+              <a:t> profesores (nombre, apellido, email, </a:t>
+            </a:r>
+            <a:r>
+              <a:rPr lang="es-AR" b="1" dirty="0" err="1">
+                <a:solidFill>
+                  <a:srgbClr val="C00000"/>
+                </a:solidFill>
+              </a:rPr>
+              <a:t>telefono</a:t>
+            </a:r>
+            <a:r>
+              <a:rPr lang="es-AR" b="1" dirty="0">
+                <a:solidFill>
+                  <a:srgbClr val="C00000"/>
+                </a:solidFill>
+              </a:rPr>
+              <a:t>) </a:t>
+            </a:r>
+            <a:r>
+              <a:rPr lang="es-AR" b="1" dirty="0" err="1">
+                <a:solidFill>
+                  <a:srgbClr val="C00000"/>
+                </a:solidFill>
+              </a:rPr>
+              <a:t>values</a:t>
+            </a:r>
+            <a:endParaRPr lang="es-AR" b="1" dirty="0">
+              <a:solidFill>
+                <a:srgbClr val="C00000"/>
+              </a:solidFill>
+            </a:endParaRPr>
+          </a:p>
+          <a:p>
+            <a:pPr marL="0" indent="0" algn="ctr">
+              <a:buNone/>
+            </a:pPr>
+            <a:r>
+              <a:rPr lang="es-AR" b="1" dirty="0"/>
+              <a:t>('Cristina', 'Besada', '</a:t>
+            </a:r>
+            <a:r>
+              <a:rPr lang="es-AR" b="1" dirty="0" err="1"/>
+              <a:t>cbesada@gmail.com</a:t>
+            </a:r>
+            <a:r>
+              <a:rPr lang="es-AR" b="1" dirty="0"/>
+              <a:t>', 11-38729732),</a:t>
+            </a:r>
+          </a:p>
+          <a:p>
+            <a:pPr marL="0" indent="0" algn="ctr">
+              <a:buNone/>
+            </a:pPr>
+            <a:r>
+              <a:rPr lang="es-AR" b="1" dirty="0"/>
+              <a:t>('Mario', 'Mansilla', '</a:t>
+            </a:r>
+            <a:r>
+              <a:rPr lang="es-AR" b="1" dirty="0" err="1"/>
+              <a:t>mmansilla@hotmail.com</a:t>
+            </a:r>
+            <a:r>
+              <a:rPr lang="es-AR" b="1" dirty="0"/>
+              <a:t>', 11-21979733),</a:t>
+            </a:r>
+          </a:p>
+          <a:p>
+            <a:pPr marL="0" indent="0" algn="ctr">
+              <a:buNone/>
+            </a:pPr>
+            <a:r>
+              <a:rPr lang="es-AR" b="1" dirty="0"/>
+              <a:t>('</a:t>
+            </a:r>
+            <a:r>
+              <a:rPr lang="es-AR" b="1" dirty="0" err="1"/>
+              <a:t>Dario</a:t>
+            </a:r>
+            <a:r>
+              <a:rPr lang="es-AR" b="1" dirty="0"/>
+              <a:t>', 'Albornoz', '</a:t>
+            </a:r>
+            <a:r>
+              <a:rPr lang="es-AR" b="1" dirty="0" err="1"/>
+              <a:t>dalbornoz@gmail.com</a:t>
+            </a:r>
+            <a:r>
+              <a:rPr lang="es-AR" b="1" dirty="0"/>
+              <a:t>', 11-31149344),</a:t>
+            </a:r>
+          </a:p>
+          <a:p>
+            <a:pPr marL="0" indent="0" algn="ctr">
+              <a:buNone/>
+            </a:pPr>
+            <a:r>
+              <a:rPr lang="es-AR" b="1" dirty="0"/>
+              <a:t>('Pablo', '</a:t>
+            </a:r>
+            <a:r>
+              <a:rPr lang="es-AR" b="1" dirty="0" err="1"/>
+              <a:t>Gimenez</a:t>
+            </a:r>
+            <a:r>
+              <a:rPr lang="es-AR" b="1" dirty="0"/>
+              <a:t>', '</a:t>
+            </a:r>
+            <a:r>
+              <a:rPr lang="es-AR" b="1" dirty="0" err="1"/>
+              <a:t>pgimenez@outlook.com</a:t>
+            </a:r>
+            <a:r>
+              <a:rPr lang="es-AR" b="1" dirty="0"/>
+              <a:t>', 11-38336231),</a:t>
+            </a:r>
+          </a:p>
+          <a:p>
+            <a:pPr marL="0" indent="0" algn="ctr">
+              <a:buNone/>
+            </a:pPr>
+            <a:r>
+              <a:rPr lang="es-AR" b="1" dirty="0"/>
+              <a:t>('</a:t>
+            </a:r>
+            <a:r>
+              <a:rPr lang="es-AR" b="1" dirty="0" err="1"/>
+              <a:t>Belen</a:t>
+            </a:r>
+            <a:r>
+              <a:rPr lang="es-AR" b="1" dirty="0"/>
+              <a:t>', '</a:t>
+            </a:r>
+            <a:r>
+              <a:rPr lang="es-AR" b="1" dirty="0" err="1"/>
+              <a:t>Aguero</a:t>
+            </a:r>
+            <a:r>
+              <a:rPr lang="es-AR" b="1" dirty="0"/>
+              <a:t>', '</a:t>
+            </a:r>
+            <a:r>
+              <a:rPr lang="es-AR" b="1" dirty="0" err="1"/>
+              <a:t>baguero@yahoo.com</a:t>
+            </a:r>
+            <a:r>
+              <a:rPr lang="es-AR" b="1" dirty="0"/>
+              <a:t>', 11-18887122),</a:t>
+            </a:r>
+          </a:p>
+          <a:p>
+            <a:pPr marL="0" indent="0" algn="ctr">
+              <a:buNone/>
+            </a:pPr>
+            <a:r>
+              <a:rPr lang="es-AR" b="1" dirty="0"/>
+              <a:t>('Mariano', '</a:t>
+            </a:r>
+            <a:r>
+              <a:rPr lang="es-AR" b="1" dirty="0" err="1"/>
+              <a:t>Martinez</a:t>
+            </a:r>
+            <a:r>
+              <a:rPr lang="es-AR" b="1" dirty="0"/>
+              <a:t>', '</a:t>
+            </a:r>
+            <a:r>
+              <a:rPr lang="es-AR" b="1" dirty="0" err="1"/>
+              <a:t>mmartinez@gmail.com</a:t>
+            </a:r>
+            <a:r>
+              <a:rPr lang="es-AR" b="1" dirty="0"/>
+              <a:t>', 11-22299988),</a:t>
+            </a:r>
+          </a:p>
+          <a:p>
+            <a:pPr marL="0" indent="0" algn="ctr">
+              <a:buNone/>
+            </a:pPr>
+            <a:r>
+              <a:rPr lang="es-AR" b="1" dirty="0"/>
+              <a:t>('Carlos', 'Rico', '</a:t>
+            </a:r>
+            <a:r>
+              <a:rPr lang="es-AR" b="1" dirty="0" err="1"/>
+              <a:t>crico@yahoo.com</a:t>
+            </a:r>
+            <a:r>
+              <a:rPr lang="es-AR" b="1" dirty="0"/>
+              <a:t>', 11-45551122),</a:t>
+            </a:r>
+          </a:p>
+          <a:p>
+            <a:pPr marL="0" indent="0" algn="ctr">
+              <a:buNone/>
+            </a:pPr>
+            <a:r>
+              <a:rPr lang="es-AR" b="1" dirty="0"/>
+              <a:t>('Cristina', 'Cernadas', '</a:t>
+            </a:r>
+            <a:r>
+              <a:rPr lang="es-AR" b="1" dirty="0" err="1"/>
+              <a:t>ccernadas@outllok.com</a:t>
+            </a:r>
+            <a:r>
+              <a:rPr lang="es-AR" b="1" dirty="0"/>
+              <a:t>', 11-38743298),</a:t>
+            </a:r>
+          </a:p>
+          <a:p>
+            <a:pPr marL="0" indent="0" algn="ctr">
+              <a:buNone/>
+            </a:pPr>
+            <a:r>
+              <a:rPr lang="es-AR" b="1" dirty="0"/>
+              <a:t>('Mariela', '</a:t>
+            </a:r>
+            <a:r>
+              <a:rPr lang="es-AR" b="1" dirty="0" err="1"/>
+              <a:t>Darchivio</a:t>
+            </a:r>
+            <a:r>
+              <a:rPr lang="es-AR" b="1" dirty="0"/>
+              <a:t>', '</a:t>
+            </a:r>
+            <a:r>
+              <a:rPr lang="es-AR" b="1" dirty="0" err="1"/>
+              <a:t>mdarchivio@hotmail.com</a:t>
+            </a:r>
+            <a:r>
+              <a:rPr lang="es-AR" b="1" dirty="0"/>
+              <a:t>', 11-91123961),</a:t>
+            </a:r>
+          </a:p>
+          <a:p>
+            <a:pPr marL="0" indent="0" algn="ctr">
+              <a:buNone/>
+            </a:pPr>
+            <a:r>
+              <a:rPr lang="es-AR" b="1" dirty="0"/>
+              <a:t>('Juan Pedro', 'Rosa Alves', '</a:t>
+            </a:r>
+            <a:r>
+              <a:rPr lang="es-AR" b="1" dirty="0" err="1"/>
+              <a:t>jpralves@gmail.com</a:t>
+            </a:r>
+            <a:r>
+              <a:rPr lang="es-AR" b="1" dirty="0"/>
+              <a:t>', 11-21299832),</a:t>
+            </a:r>
+          </a:p>
+          <a:p>
+            <a:pPr marL="0" indent="0" algn="ctr">
+              <a:buNone/>
+            </a:pPr>
+            <a:r>
+              <a:rPr lang="es-AR" b="1" dirty="0"/>
+              <a:t>('Cristina', 'Besada', '</a:t>
+            </a:r>
+            <a:r>
+              <a:rPr lang="es-AR" b="1" dirty="0" err="1"/>
+              <a:t>cbesada@gmail.com</a:t>
+            </a:r>
+            <a:r>
+              <a:rPr lang="es-AR" b="1" dirty="0"/>
+              <a:t>', 11-21294349),</a:t>
+            </a:r>
+          </a:p>
+          <a:p>
+            <a:pPr marL="0" indent="0" algn="ctr">
+              <a:buNone/>
+            </a:pPr>
+            <a:r>
+              <a:rPr lang="es-AR" b="1" dirty="0"/>
+              <a:t>('</a:t>
+            </a:r>
+            <a:r>
+              <a:rPr lang="es-AR" b="1" dirty="0" err="1"/>
+              <a:t>Jose</a:t>
+            </a:r>
+            <a:r>
+              <a:rPr lang="es-AR" b="1" dirty="0"/>
+              <a:t>', '</a:t>
+            </a:r>
+            <a:r>
+              <a:rPr lang="es-AR" b="1" dirty="0" err="1"/>
+              <a:t>Gorini</a:t>
+            </a:r>
+            <a:r>
+              <a:rPr lang="es-AR" b="1" dirty="0"/>
+              <a:t>', '</a:t>
+            </a:r>
+            <a:r>
+              <a:rPr lang="es-AR" b="1" dirty="0" err="1"/>
+              <a:t>jgorini@masterweb.com</a:t>
+            </a:r>
+            <a:r>
+              <a:rPr lang="es-AR" b="1" dirty="0"/>
+              <a:t>', 11-62300301),</a:t>
+            </a:r>
+          </a:p>
+          <a:p>
+            <a:pPr marL="0" indent="0" algn="ctr">
+              <a:buNone/>
+            </a:pPr>
+            <a:r>
+              <a:rPr lang="es-AR" b="1" dirty="0"/>
+              <a:t>('Mariano', '</a:t>
+            </a:r>
+            <a:r>
+              <a:rPr lang="es-AR" b="1" dirty="0" err="1"/>
+              <a:t>Galvan</a:t>
+            </a:r>
+            <a:r>
+              <a:rPr lang="es-AR" b="1" dirty="0"/>
+              <a:t>', '</a:t>
+            </a:r>
+            <a:r>
+              <a:rPr lang="es-AR" b="1" dirty="0" err="1"/>
+              <a:t>mgalvan@hotmail.com</a:t>
+            </a:r>
+            <a:r>
+              <a:rPr lang="es-AR" b="1" dirty="0"/>
+              <a:t>', 11-91294923),</a:t>
+            </a:r>
+          </a:p>
+          <a:p>
+            <a:pPr marL="0" indent="0" algn="ctr">
+              <a:buNone/>
+            </a:pPr>
+            <a:r>
+              <a:rPr lang="es-AR" b="1" dirty="0"/>
+              <a:t>('Daniela', '</a:t>
+            </a:r>
+            <a:r>
+              <a:rPr lang="es-AR" b="1" dirty="0" err="1"/>
+              <a:t>Rezzonico</a:t>
+            </a:r>
+            <a:r>
+              <a:rPr lang="es-AR" b="1" dirty="0"/>
+              <a:t>', '</a:t>
+            </a:r>
+            <a:r>
+              <a:rPr lang="es-AR" b="1" dirty="0" err="1"/>
+              <a:t>drezzonico@gmail.com</a:t>
+            </a:r>
+            <a:r>
+              <a:rPr lang="es-AR" b="1" dirty="0"/>
+              <a:t>', 11-21002399),</a:t>
+            </a:r>
+          </a:p>
+          <a:p>
+            <a:pPr marL="0" indent="0" algn="ctr">
+              <a:buNone/>
+            </a:pPr>
+            <a:r>
+              <a:rPr lang="es-AR" b="1" dirty="0"/>
+              <a:t>('Gaspar', '</a:t>
+            </a:r>
+            <a:r>
+              <a:rPr lang="es-AR" b="1" dirty="0" err="1"/>
+              <a:t>Geraghty</a:t>
+            </a:r>
+            <a:r>
+              <a:rPr lang="es-AR" b="1" dirty="0"/>
+              <a:t>', '</a:t>
+            </a:r>
+            <a:r>
+              <a:rPr lang="es-AR" b="1" dirty="0" err="1"/>
+              <a:t>ggeraghty@yahoo.com</a:t>
+            </a:r>
+            <a:r>
+              <a:rPr lang="es-AR" b="1" dirty="0"/>
+              <a:t>', 11-22291010);</a:t>
+            </a:r>
+          </a:p>
+        </p:txBody>
+      </p:sp>
       <p:pic>
         <p:nvPicPr>
-          <p:cNvPr id="6" name="Imagen 5">
+          <p:cNvPr id="7" name="Imagen 6">
             <a:extLst>
               <a:ext uri="{FF2B5EF4-FFF2-40B4-BE49-F238E27FC236}">
-                <a16:creationId xmlns:a16="http://schemas.microsoft.com/office/drawing/2014/main" id="{C5656020-5727-2102-B58A-E81665590485}"/>
+                <a16:creationId xmlns:a16="http://schemas.microsoft.com/office/drawing/2014/main" id="{9B77B61D-DA00-D29A-A9F9-584CA85E62BC}"/>
               </a:ext>
             </a:extLst>
           </p:cNvPr>
@@ -8543,147 +9817,8 @@
         </p:blipFill>
         <p:spPr>
           <a:xfrm>
-            <a:off x="2146852" y="2162919"/>
-            <a:ext cx="7345018" cy="3676112"/>
-          </a:xfrm>
-          <a:prstGeom prst="rect">
-            <a:avLst/>
-          </a:prstGeom>
-        </p:spPr>
-      </p:pic>
-      <p:sp>
-        <p:nvSpPr>
-          <p:cNvPr id="7" name="CuadroTexto 6">
-            <a:extLst>
-              <a:ext uri="{FF2B5EF4-FFF2-40B4-BE49-F238E27FC236}">
-                <a16:creationId xmlns:a16="http://schemas.microsoft.com/office/drawing/2014/main" id="{71D072F1-F30F-8448-BD63-9C1DEA717A21}"/>
-              </a:ext>
-            </a:extLst>
-          </p:cNvPr>
-          <p:cNvSpPr txBox="1"/>
-          <p:nvPr/>
-        </p:nvSpPr>
-        <p:spPr>
-          <a:xfrm>
-            <a:off x="817422" y="5983070"/>
-            <a:ext cx="10841109" cy="646331"/>
-          </a:xfrm>
-          <a:prstGeom prst="rect">
-            <a:avLst/>
-          </a:prstGeom>
-          <a:noFill/>
-        </p:spPr>
-        <p:txBody>
-          <a:bodyPr wrap="none" rtlCol="0">
-            <a:spAutoFit/>
-          </a:bodyPr>
-          <a:lstStyle/>
-          <a:p>
-            <a:r>
-              <a:rPr lang="es-AR" dirty="0"/>
-              <a:t>Esta es una tabla vista que se utiliza para cruzar datos de la tabla “alumnos” con la tabla “padres”, con la finalidad </a:t>
-            </a:r>
-          </a:p>
-          <a:p>
-            <a:r>
-              <a:rPr lang="es-AR" dirty="0"/>
-              <a:t>de mostrar datos de una manera mas rápida y sencilla.</a:t>
-            </a:r>
-          </a:p>
-        </p:txBody>
-      </p:sp>
-      <p:sp>
-        <p:nvSpPr>
-          <p:cNvPr id="9" name="CuadroTexto 8">
-            <a:extLst>
-              <a:ext uri="{FF2B5EF4-FFF2-40B4-BE49-F238E27FC236}">
-                <a16:creationId xmlns:a16="http://schemas.microsoft.com/office/drawing/2014/main" id="{08031711-AE3B-CC4C-B0E9-E1679E80B313}"/>
-              </a:ext>
-            </a:extLst>
-          </p:cNvPr>
-          <p:cNvSpPr txBox="1"/>
-          <p:nvPr/>
-        </p:nvSpPr>
-        <p:spPr>
-          <a:xfrm>
-            <a:off x="367748" y="1129494"/>
-            <a:ext cx="11740458" cy="1200329"/>
-          </a:xfrm>
-          <a:prstGeom prst="rect">
-            <a:avLst/>
-          </a:prstGeom>
-          <a:noFill/>
-        </p:spPr>
-        <p:txBody>
-          <a:bodyPr wrap="none" rtlCol="0">
-            <a:spAutoFit/>
-          </a:bodyPr>
-          <a:lstStyle/>
-          <a:p>
-            <a:r>
-              <a:rPr lang="es-AR" sz="1800" dirty="0"/>
-              <a:t>Este es un ejemplo de informes generados por la BB.DD, que se puede apreciar en el archivo .</a:t>
-            </a:r>
-            <a:r>
-              <a:rPr lang="es-AR" sz="1800" dirty="0" err="1"/>
-              <a:t>sql</a:t>
-            </a:r>
-            <a:r>
-              <a:rPr lang="es-AR" sz="1800" dirty="0"/>
-              <a:t> que va adjunto a este </a:t>
-            </a:r>
-          </a:p>
-          <a:p>
-            <a:r>
-              <a:rPr lang="es-AR" sz="1800" dirty="0"/>
-              <a:t>documento. Por motivos de espacio solo mostraré algunos ejemplos y los invito a revisar el archivo mencionado para poder</a:t>
-            </a:r>
-          </a:p>
-          <a:p>
-            <a:r>
-              <a:rPr lang="es-AR" dirty="0"/>
-              <a:t>apreciarlos en su totalidad</a:t>
-            </a:r>
-            <a:r>
-              <a:rPr lang="es-AR" sz="1800" dirty="0"/>
-              <a:t>.</a:t>
-            </a:r>
-          </a:p>
-          <a:p>
-            <a:endParaRPr lang="es-AR" dirty="0"/>
-          </a:p>
-        </p:txBody>
-      </p:sp>
-      <p:pic>
-        <p:nvPicPr>
-          <p:cNvPr id="10" name="Imagen 9">
-            <a:extLst>
-              <a:ext uri="{FF2B5EF4-FFF2-40B4-BE49-F238E27FC236}">
-                <a16:creationId xmlns:a16="http://schemas.microsoft.com/office/drawing/2014/main" id="{0C4FAB66-100D-6C62-072A-65A2A1EDC420}"/>
-              </a:ext>
-            </a:extLst>
-          </p:cNvPr>
-          <p:cNvPicPr>
-            <a:picLocks noChangeAspect="1"/>
-          </p:cNvPicPr>
-          <p:nvPr/>
-        </p:nvPicPr>
-        <p:blipFill>
-          <a:blip r:embed="rId3">
-            <a:extLst>
-              <a:ext uri="{28A0092B-C50C-407E-A947-70E740481C1C}">
-                <a14:useLocalDpi xmlns:a14="http://schemas.microsoft.com/office/drawing/2010/main" val="0"/>
-              </a:ext>
-            </a:extLst>
-          </a:blip>
-          <a:stretch>
-            <a:fillRect/>
-          </a:stretch>
-        </p:blipFill>
-        <p:spPr>
-          <a:xfrm>
-            <a:off x="11092070" y="6260128"/>
-            <a:ext cx="1002936" cy="597872"/>
+            <a:off x="11014849" y="6214095"/>
+            <a:ext cx="1080157" cy="643905"/>
           </a:xfrm>
           <a:prstGeom prst="rect">
             <a:avLst/>
@@ -8693,7 +9828,7 @@
     </p:spTree>
     <p:extLst>
       <p:ext uri="{BB962C8B-B14F-4D97-AF65-F5344CB8AC3E}">
-        <p14:creationId xmlns:p14="http://schemas.microsoft.com/office/powerpoint/2010/main" val="2930685144"/>
+        <p14:creationId xmlns:p14="http://schemas.microsoft.com/office/powerpoint/2010/main" val="795873802"/>
       </p:ext>
     </p:extLst>
   </p:cSld>
@@ -8720,12 +9855,53 @@
           <a:chExt cx="0" cy="0"/>
         </a:xfrm>
       </p:grpSpPr>
+      <p:sp>
+        <p:nvSpPr>
+          <p:cNvPr id="4" name="Título 1">
+            <a:extLst>
+              <a:ext uri="{FF2B5EF4-FFF2-40B4-BE49-F238E27FC236}">
+                <a16:creationId xmlns:a16="http://schemas.microsoft.com/office/drawing/2014/main" id="{97132279-6C70-A3B9-178C-B49C7050EB4D}"/>
+              </a:ext>
+            </a:extLst>
+          </p:cNvPr>
+          <p:cNvSpPr>
+            <a:spLocks noGrp="1"/>
+          </p:cNvSpPr>
+          <p:nvPr>
+            <p:ph type="title"/>
+          </p:nvPr>
+        </p:nvSpPr>
+        <p:spPr>
+          <a:xfrm>
+            <a:off x="838200" y="0"/>
+            <a:ext cx="10515600" cy="1129494"/>
+          </a:xfrm>
+        </p:spPr>
+        <p:txBody>
+          <a:bodyPr>
+            <a:normAutofit fontScale="90000"/>
+          </a:bodyPr>
+          <a:lstStyle/>
+          <a:p>
+            <a:pPr algn="ctr"/>
+            <a:r>
+              <a:rPr lang="es-AR" b="1" dirty="0"/>
+              <a:t>Informes generados en base a la información obtenida por la BB.DD</a:t>
+            </a:r>
+            <a:endParaRPr lang="es-AR" dirty="0">
+              <a:highlight>
+                <a:srgbClr val="FFFF00"/>
+              </a:highlight>
+            </a:endParaRPr>
+          </a:p>
+        </p:txBody>
+      </p:sp>
       <p:pic>
         <p:nvPicPr>
-          <p:cNvPr id="5" name="Imagen 4">
+          <p:cNvPr id="6" name="Imagen 5">
             <a:extLst>
               <a:ext uri="{FF2B5EF4-FFF2-40B4-BE49-F238E27FC236}">
-                <a16:creationId xmlns:a16="http://schemas.microsoft.com/office/drawing/2014/main" id="{A915DDD9-E2D4-EDA5-5D02-F0D74EF5AB5C}"/>
+                <a16:creationId xmlns:a16="http://schemas.microsoft.com/office/drawing/2014/main" id="{C5656020-5727-2102-B58A-E81665590485}"/>
               </a:ext>
             </a:extLst>
           </p:cNvPr>
@@ -8748,8 +9924,8 @@
         </p:blipFill>
         <p:spPr>
           <a:xfrm>
-            <a:off x="2209800" y="954479"/>
-            <a:ext cx="7772400" cy="3890013"/>
+            <a:off x="2146852" y="2162919"/>
+            <a:ext cx="7345018" cy="3676112"/>
           </a:xfrm>
           <a:prstGeom prst="rect">
             <a:avLst/>
@@ -8758,10 +9934,10 @@
       </p:pic>
       <p:sp>
         <p:nvSpPr>
-          <p:cNvPr id="6" name="CuadroTexto 5">
+          <p:cNvPr id="7" name="CuadroTexto 6">
             <a:extLst>
               <a:ext uri="{FF2B5EF4-FFF2-40B4-BE49-F238E27FC236}">
-                <a16:creationId xmlns:a16="http://schemas.microsoft.com/office/drawing/2014/main" id="{A5F9909A-915B-0589-4511-630ACEE4F616}"/>
+                <a16:creationId xmlns:a16="http://schemas.microsoft.com/office/drawing/2014/main" id="{71D072F1-F30F-8448-BD63-9C1DEA717A21}"/>
               </a:ext>
             </a:extLst>
           </p:cNvPr>
@@ -8770,8 +9946,8 @@
         </p:nvSpPr>
         <p:spPr>
           <a:xfrm>
-            <a:off x="847239" y="5257190"/>
-            <a:ext cx="11127598" cy="646331"/>
+            <a:off x="817422" y="5983070"/>
+            <a:ext cx="10841109" cy="646331"/>
           </a:xfrm>
           <a:prstGeom prst="rect">
             <a:avLst/>
@@ -8786,7 +9962,7 @@
           <a:p>
             <a:r>
               <a:rPr lang="es-AR" dirty="0"/>
-              <a:t>Esta es una tabla vista que se utiliza para cruzar datos de la tabla “profesores” con la tabla “materias”, con la finalidad </a:t>
+              <a:t>Esta es una tabla vista que se utiliza para cruzar datos de la tabla “alumnos” con la tabla “padres”, con la finalidad </a:t>
             </a:r>
           </a:p>
           <a:p>
@@ -8794,15 +9970,77 @@
               <a:rPr lang="es-AR" dirty="0"/>
               <a:t>de mostrar datos de una manera mas rápida y sencilla.</a:t>
             </a:r>
+          </a:p>
+        </p:txBody>
+      </p:sp>
+      <p:sp>
+        <p:nvSpPr>
+          <p:cNvPr id="9" name="CuadroTexto 8">
+            <a:extLst>
+              <a:ext uri="{FF2B5EF4-FFF2-40B4-BE49-F238E27FC236}">
+                <a16:creationId xmlns:a16="http://schemas.microsoft.com/office/drawing/2014/main" id="{08031711-AE3B-CC4C-B0E9-E1679E80B313}"/>
+              </a:ext>
+            </a:extLst>
+          </p:cNvPr>
+          <p:cNvSpPr txBox="1"/>
+          <p:nvPr/>
+        </p:nvSpPr>
+        <p:spPr>
+          <a:xfrm>
+            <a:off x="367748" y="1129494"/>
+            <a:ext cx="11740458" cy="1200329"/>
+          </a:xfrm>
+          <a:prstGeom prst="rect">
+            <a:avLst/>
+          </a:prstGeom>
+          <a:noFill/>
+        </p:spPr>
+        <p:txBody>
+          <a:bodyPr wrap="none" rtlCol="0">
+            <a:spAutoFit/>
+          </a:bodyPr>
+          <a:lstStyle/>
+          <a:p>
+            <a:r>
+              <a:rPr lang="es-AR" sz="1800" dirty="0"/>
+              <a:t>Este es un ejemplo de informes generados por la BB.DD, que se puede apreciar en el archivo .</a:t>
+            </a:r>
+            <a:r>
+              <a:rPr lang="es-AR" sz="1800" dirty="0" err="1"/>
+              <a:t>sql</a:t>
+            </a:r>
+            <a:r>
+              <a:rPr lang="es-AR" sz="1800" dirty="0"/>
+              <a:t> que va adjunto a este </a:t>
+            </a:r>
+          </a:p>
+          <a:p>
+            <a:r>
+              <a:rPr lang="es-AR" sz="1800" dirty="0"/>
+              <a:t>documento. Por motivos de espacio solo mostraré algunos ejemplos y los invito a revisar el archivo mencionado para poder</a:t>
+            </a:r>
+          </a:p>
+          <a:p>
+            <a:r>
+              <a:rPr lang="es-AR" dirty="0"/>
+              <a:t>apreciarlos en su totalidad</a:t>
+            </a:r>
+            <a:r>
+              <a:rPr lang="es-AR" sz="1800" dirty="0"/>
+              <a:t>.</a:t>
+            </a:r>
+          </a:p>
+          <a:p>
+            <a:endParaRPr lang="es-AR" dirty="0"/>
           </a:p>
         </p:txBody>
       </p:sp>
       <p:pic>
         <p:nvPicPr>
-          <p:cNvPr id="7" name="Imagen 6">
+          <p:cNvPr id="10" name="Imagen 9">
             <a:extLst>
               <a:ext uri="{FF2B5EF4-FFF2-40B4-BE49-F238E27FC236}">
-                <a16:creationId xmlns:a16="http://schemas.microsoft.com/office/drawing/2014/main" id="{5C93F91E-F397-E232-B133-742CD1E450D1}"/>
+                <a16:creationId xmlns:a16="http://schemas.microsoft.com/office/drawing/2014/main" id="{0C4FAB66-100D-6C62-072A-65A2A1EDC420}"/>
               </a:ext>
             </a:extLst>
           </p:cNvPr>
@@ -8836,7 +10074,7 @@
     </p:spTree>
     <p:extLst>
       <p:ext uri="{BB962C8B-B14F-4D97-AF65-F5344CB8AC3E}">
-        <p14:creationId xmlns:p14="http://schemas.microsoft.com/office/powerpoint/2010/main" val="762341097"/>
+        <p14:creationId xmlns:p14="http://schemas.microsoft.com/office/powerpoint/2010/main" val="2930685144"/>
       </p:ext>
     </p:extLst>
   </p:cSld>
@@ -8868,7 +10106,7 @@
           <p:cNvPr id="5" name="Imagen 4">
             <a:extLst>
               <a:ext uri="{FF2B5EF4-FFF2-40B4-BE49-F238E27FC236}">
-                <a16:creationId xmlns:a16="http://schemas.microsoft.com/office/drawing/2014/main" id="{D4EAE1FC-6B43-E760-2AE4-8C07C1355174}"/>
+                <a16:creationId xmlns:a16="http://schemas.microsoft.com/office/drawing/2014/main" id="{A915DDD9-E2D4-EDA5-5D02-F0D74EF5AB5C}"/>
               </a:ext>
             </a:extLst>
           </p:cNvPr>
@@ -8891,8 +10129,8 @@
         </p:blipFill>
         <p:spPr>
           <a:xfrm>
-            <a:off x="1172817" y="954479"/>
-            <a:ext cx="9322904" cy="2718946"/>
+            <a:off x="2209800" y="954479"/>
+            <a:ext cx="7772400" cy="3890013"/>
           </a:xfrm>
           <a:prstGeom prst="rect">
             <a:avLst/>
@@ -8904,7 +10142,7 @@
           <p:cNvPr id="6" name="CuadroTexto 5">
             <a:extLst>
               <a:ext uri="{FF2B5EF4-FFF2-40B4-BE49-F238E27FC236}">
-                <a16:creationId xmlns:a16="http://schemas.microsoft.com/office/drawing/2014/main" id="{83975D13-6DB7-FB5A-869B-2C7A2242A592}"/>
+                <a16:creationId xmlns:a16="http://schemas.microsoft.com/office/drawing/2014/main" id="{A5F9909A-915B-0589-4511-630ACEE4F616}"/>
               </a:ext>
             </a:extLst>
           </p:cNvPr>
@@ -8913,8 +10151,8 @@
         </p:nvSpPr>
         <p:spPr>
           <a:xfrm>
-            <a:off x="444231" y="4283156"/>
-            <a:ext cx="11477298" cy="923330"/>
+            <a:off x="847239" y="5257190"/>
+            <a:ext cx="11127598" cy="646331"/>
           </a:xfrm>
           <a:prstGeom prst="rect">
             <a:avLst/>
@@ -8922,15 +10160,20 @@
           <a:noFill/>
         </p:spPr>
         <p:txBody>
-          <a:bodyPr wrap="square" rtlCol="0">
+          <a:bodyPr wrap="none" rtlCol="0">
             <a:spAutoFit/>
           </a:bodyPr>
           <a:lstStyle/>
           <a:p>
-            <a:pPr algn="just"/>
             <a:r>
               <a:rPr lang="es-AR" dirty="0"/>
-              <a:t>Esta es una tabla vista que se utiliza para cruzar datos de la tabla “profesores” con la tabla “alumnos”, y así controlar los profesores que sancionan a los alumnos por cuestiones que van en contra del buen comportamiento en una institución educativa. La misma se creó con la finalidad  de mostrar datos de una manera mas rápida y sencilla.</a:t>
+              <a:t>Esta es una tabla vista que se utiliza para cruzar datos de la tabla “profesores” con la tabla “materias”, con la finalidad </a:t>
+            </a:r>
+          </a:p>
+          <a:p>
+            <a:r>
+              <a:rPr lang="es-AR" dirty="0"/>
+              <a:t>de mostrar datos de una manera mas rápida y sencilla.</a:t>
             </a:r>
           </a:p>
         </p:txBody>
@@ -8940,7 +10183,7 @@
           <p:cNvPr id="7" name="Imagen 6">
             <a:extLst>
               <a:ext uri="{FF2B5EF4-FFF2-40B4-BE49-F238E27FC236}">
-                <a16:creationId xmlns:a16="http://schemas.microsoft.com/office/drawing/2014/main" id="{49BDE410-F40E-B855-A231-9E83C6207648}"/>
+                <a16:creationId xmlns:a16="http://schemas.microsoft.com/office/drawing/2014/main" id="{5C93F91E-F397-E232-B133-742CD1E450D1}"/>
               </a:ext>
             </a:extLst>
           </p:cNvPr>
@@ -8974,7 +10217,7 @@
     </p:spTree>
     <p:extLst>
       <p:ext uri="{BB962C8B-B14F-4D97-AF65-F5344CB8AC3E}">
-        <p14:creationId xmlns:p14="http://schemas.microsoft.com/office/powerpoint/2010/main" val="2560849683"/>
+        <p14:creationId xmlns:p14="http://schemas.microsoft.com/office/powerpoint/2010/main" val="762341097"/>
       </p:ext>
     </p:extLst>
   </p:cSld>
@@ -9001,51 +10244,118 @@
           <a:chExt cx="0" cy="0"/>
         </a:xfrm>
       </p:grpSpPr>
+      <p:pic>
+        <p:nvPicPr>
+          <p:cNvPr id="5" name="Imagen 4">
+            <a:extLst>
+              <a:ext uri="{FF2B5EF4-FFF2-40B4-BE49-F238E27FC236}">
+                <a16:creationId xmlns:a16="http://schemas.microsoft.com/office/drawing/2014/main" id="{D4EAE1FC-6B43-E760-2AE4-8C07C1355174}"/>
+              </a:ext>
+            </a:extLst>
+          </p:cNvPr>
+          <p:cNvPicPr>
+            <a:picLocks noChangeAspect="1"/>
+          </p:cNvPicPr>
+          <p:nvPr/>
+        </p:nvPicPr>
+        <p:blipFill>
+          <a:blip r:embed="rId2">
+            <a:extLst>
+              <a:ext uri="{28A0092B-C50C-407E-A947-70E740481C1C}">
+                <a14:useLocalDpi xmlns:a14="http://schemas.microsoft.com/office/drawing/2010/main" val="0"/>
+              </a:ext>
+            </a:extLst>
+          </a:blip>
+          <a:stretch>
+            <a:fillRect/>
+          </a:stretch>
+        </p:blipFill>
+        <p:spPr>
+          <a:xfrm>
+            <a:off x="1172817" y="954479"/>
+            <a:ext cx="9322904" cy="2718946"/>
+          </a:xfrm>
+          <a:prstGeom prst="rect">
+            <a:avLst/>
+          </a:prstGeom>
+        </p:spPr>
+      </p:pic>
       <p:sp>
         <p:nvSpPr>
-          <p:cNvPr id="4" name="Título 1">
+          <p:cNvPr id="6" name="CuadroTexto 5">
             <a:extLst>
               <a:ext uri="{FF2B5EF4-FFF2-40B4-BE49-F238E27FC236}">
-                <a16:creationId xmlns:a16="http://schemas.microsoft.com/office/drawing/2014/main" id="{A05BD83C-6333-A967-3F24-AB4CE4F0F3E7}"/>
+                <a16:creationId xmlns:a16="http://schemas.microsoft.com/office/drawing/2014/main" id="{83975D13-6DB7-FB5A-869B-2C7A2242A592}"/>
               </a:ext>
             </a:extLst>
           </p:cNvPr>
-          <p:cNvSpPr>
-            <a:spLocks noGrp="1"/>
-          </p:cNvSpPr>
-          <p:nvPr>
-            <p:ph type="title"/>
-          </p:nvPr>
+          <p:cNvSpPr txBox="1"/>
+          <p:nvPr/>
         </p:nvSpPr>
         <p:spPr>
           <a:xfrm>
-            <a:off x="838200" y="0"/>
-            <a:ext cx="10515600" cy="1129494"/>
+            <a:off x="444231" y="4283156"/>
+            <a:ext cx="11477298" cy="923330"/>
           </a:xfrm>
+          <a:prstGeom prst="rect">
+            <a:avLst/>
+          </a:prstGeom>
+          <a:noFill/>
         </p:spPr>
         <p:txBody>
-          <a:bodyPr>
-            <a:normAutofit/>
+          <a:bodyPr wrap="square" rtlCol="0">
+            <a:spAutoFit/>
           </a:bodyPr>
           <a:lstStyle/>
           <a:p>
-            <a:pPr algn="ctr"/>
-            <a:r>
-              <a:rPr lang="es-AR" b="1" dirty="0"/>
-              <a:t>Herramientas y tecnologías usadas.</a:t>
-            </a:r>
-            <a:endParaRPr lang="es-AR" dirty="0">
-              <a:highlight>
-                <a:srgbClr val="FFFF00"/>
-              </a:highlight>
-            </a:endParaRPr>
+            <a:pPr algn="just"/>
+            <a:r>
+              <a:rPr lang="es-AR" dirty="0"/>
+              <a:t>Esta es una tabla vista que se utiliza para cruzar datos de la tabla “profesores” con la tabla “alumnos”, y así controlar los profesores que sancionan a los alumnos por cuestiones que van en contra del buen comportamiento en una institución educativa. La misma se creó con la finalidad  de mostrar datos de una manera mas rápida y sencilla.</a:t>
+            </a:r>
           </a:p>
         </p:txBody>
       </p:sp>
+      <p:pic>
+        <p:nvPicPr>
+          <p:cNvPr id="7" name="Imagen 6">
+            <a:extLst>
+              <a:ext uri="{FF2B5EF4-FFF2-40B4-BE49-F238E27FC236}">
+                <a16:creationId xmlns:a16="http://schemas.microsoft.com/office/drawing/2014/main" id="{49BDE410-F40E-B855-A231-9E83C6207648}"/>
+              </a:ext>
+            </a:extLst>
+          </p:cNvPr>
+          <p:cNvPicPr>
+            <a:picLocks noChangeAspect="1"/>
+          </p:cNvPicPr>
+          <p:nvPr/>
+        </p:nvPicPr>
+        <p:blipFill>
+          <a:blip r:embed="rId3">
+            <a:extLst>
+              <a:ext uri="{28A0092B-C50C-407E-A947-70E740481C1C}">
+                <a14:useLocalDpi xmlns:a14="http://schemas.microsoft.com/office/drawing/2010/main" val="0"/>
+              </a:ext>
+            </a:extLst>
+          </a:blip>
+          <a:stretch>
+            <a:fillRect/>
+          </a:stretch>
+        </p:blipFill>
+        <p:spPr>
+          <a:xfrm>
+            <a:off x="11092070" y="6260128"/>
+            <a:ext cx="1002936" cy="597872"/>
+          </a:xfrm>
+          <a:prstGeom prst="rect">
+            <a:avLst/>
+          </a:prstGeom>
+        </p:spPr>
+      </p:pic>
     </p:spTree>
     <p:extLst>
       <p:ext uri="{BB962C8B-B14F-4D97-AF65-F5344CB8AC3E}">
-        <p14:creationId xmlns:p14="http://schemas.microsoft.com/office/powerpoint/2010/main" val="3123342498"/>
+        <p14:creationId xmlns:p14="http://schemas.microsoft.com/office/powerpoint/2010/main" val="2560849683"/>
       </p:ext>
     </p:extLst>
   </p:cSld>
@@ -9077,7 +10387,7 @@
           <p:cNvPr id="4" name="Título 1">
             <a:extLst>
               <a:ext uri="{FF2B5EF4-FFF2-40B4-BE49-F238E27FC236}">
-                <a16:creationId xmlns:a16="http://schemas.microsoft.com/office/drawing/2014/main" id="{6D8D0538-B569-2BDA-3A8F-F526D77721BE}"/>
+                <a16:creationId xmlns:a16="http://schemas.microsoft.com/office/drawing/2014/main" id="{A05BD83C-6333-A967-3F24-AB4CE4F0F3E7}"/>
               </a:ext>
             </a:extLst>
           </p:cNvPr>
@@ -9103,17 +10413,439 @@
             <a:pPr algn="ctr"/>
             <a:r>
               <a:rPr lang="es-AR" b="1" dirty="0"/>
-              <a:t>Futuras </a:t>
-            </a:r>
-            <a:r>
-              <a:rPr lang="es-AR" b="1" dirty="0" err="1"/>
-              <a:t>lineas</a:t>
+              <a:t>Herramientas y tecnologías usadas.</a:t>
             </a:r>
             <a:endParaRPr lang="es-AR" dirty="0">
               <a:highlight>
                 <a:srgbClr val="FFFF00"/>
               </a:highlight>
             </a:endParaRPr>
+          </a:p>
+        </p:txBody>
+      </p:sp>
+      <p:pic>
+        <p:nvPicPr>
+          <p:cNvPr id="3" name="Imagen 2">
+            <a:extLst>
+              <a:ext uri="{FF2B5EF4-FFF2-40B4-BE49-F238E27FC236}">
+                <a16:creationId xmlns:a16="http://schemas.microsoft.com/office/drawing/2014/main" id="{7306AEB6-5BAF-7D69-293C-73A6097F188D}"/>
+              </a:ext>
+            </a:extLst>
+          </p:cNvPr>
+          <p:cNvPicPr>
+            <a:picLocks noChangeAspect="1"/>
+          </p:cNvPicPr>
+          <p:nvPr/>
+        </p:nvPicPr>
+        <p:blipFill>
+          <a:blip r:embed="rId2">
+            <a:extLst>
+              <a:ext uri="{28A0092B-C50C-407E-A947-70E740481C1C}">
+                <a14:useLocalDpi xmlns:a14="http://schemas.microsoft.com/office/drawing/2010/main" val="0"/>
+              </a:ext>
+            </a:extLst>
+          </a:blip>
+          <a:stretch>
+            <a:fillRect/>
+          </a:stretch>
+        </p:blipFill>
+        <p:spPr>
+          <a:xfrm>
+            <a:off x="771800" y="1229139"/>
+            <a:ext cx="2033931" cy="2033931"/>
+          </a:xfrm>
+          <a:prstGeom prst="rect">
+            <a:avLst/>
+          </a:prstGeom>
+        </p:spPr>
+      </p:pic>
+      <p:pic>
+        <p:nvPicPr>
+          <p:cNvPr id="6" name="Imagen 5">
+            <a:extLst>
+              <a:ext uri="{FF2B5EF4-FFF2-40B4-BE49-F238E27FC236}">
+                <a16:creationId xmlns:a16="http://schemas.microsoft.com/office/drawing/2014/main" id="{CB1994D4-82E6-E976-457A-ACA60AF3C9E4}"/>
+              </a:ext>
+            </a:extLst>
+          </p:cNvPr>
+          <p:cNvPicPr>
+            <a:picLocks noChangeAspect="1"/>
+          </p:cNvPicPr>
+          <p:nvPr/>
+        </p:nvPicPr>
+        <p:blipFill>
+          <a:blip r:embed="rId3">
+            <a:extLst>
+              <a:ext uri="{28A0092B-C50C-407E-A947-70E740481C1C}">
+                <a14:useLocalDpi xmlns:a14="http://schemas.microsoft.com/office/drawing/2010/main" val="0"/>
+              </a:ext>
+            </a:extLst>
+          </a:blip>
+          <a:stretch>
+            <a:fillRect/>
+          </a:stretch>
+        </p:blipFill>
+        <p:spPr>
+          <a:xfrm>
+            <a:off x="6271868" y="1229138"/>
+            <a:ext cx="2033931" cy="2033931"/>
+          </a:xfrm>
+          <a:prstGeom prst="rect">
+            <a:avLst/>
+          </a:prstGeom>
+        </p:spPr>
+      </p:pic>
+      <p:pic>
+        <p:nvPicPr>
+          <p:cNvPr id="8" name="Imagen 7">
+            <a:extLst>
+              <a:ext uri="{FF2B5EF4-FFF2-40B4-BE49-F238E27FC236}">
+                <a16:creationId xmlns:a16="http://schemas.microsoft.com/office/drawing/2014/main" id="{EB16A33F-7293-A7B4-608A-900D2BD33A2D}"/>
+              </a:ext>
+            </a:extLst>
+          </p:cNvPr>
+          <p:cNvPicPr>
+            <a:picLocks noChangeAspect="1"/>
+          </p:cNvPicPr>
+          <p:nvPr/>
+        </p:nvPicPr>
+        <p:blipFill>
+          <a:blip r:embed="rId4">
+            <a:extLst>
+              <a:ext uri="{28A0092B-C50C-407E-A947-70E740481C1C}">
+                <a14:useLocalDpi xmlns:a14="http://schemas.microsoft.com/office/drawing/2010/main" val="0"/>
+              </a:ext>
+            </a:extLst>
+          </a:blip>
+          <a:stretch>
+            <a:fillRect/>
+          </a:stretch>
+        </p:blipFill>
+        <p:spPr>
+          <a:xfrm>
+            <a:off x="9445678" y="1288547"/>
+            <a:ext cx="1974522" cy="1974522"/>
+          </a:xfrm>
+          <a:prstGeom prst="rect">
+            <a:avLst/>
+          </a:prstGeom>
+        </p:spPr>
+      </p:pic>
+      <p:pic>
+        <p:nvPicPr>
+          <p:cNvPr id="10" name="Imagen 9">
+            <a:extLst>
+              <a:ext uri="{FF2B5EF4-FFF2-40B4-BE49-F238E27FC236}">
+                <a16:creationId xmlns:a16="http://schemas.microsoft.com/office/drawing/2014/main" id="{782D161F-9CDB-2153-8433-D2D017D1CE60}"/>
+              </a:ext>
+            </a:extLst>
+          </p:cNvPr>
+          <p:cNvPicPr>
+            <a:picLocks noChangeAspect="1"/>
+          </p:cNvPicPr>
+          <p:nvPr/>
+        </p:nvPicPr>
+        <p:blipFill>
+          <a:blip r:embed="rId5">
+            <a:extLst>
+              <a:ext uri="{28A0092B-C50C-407E-A947-70E740481C1C}">
+                <a14:useLocalDpi xmlns:a14="http://schemas.microsoft.com/office/drawing/2010/main" val="0"/>
+              </a:ext>
+            </a:extLst>
+          </a:blip>
+          <a:stretch>
+            <a:fillRect/>
+          </a:stretch>
+        </p:blipFill>
+        <p:spPr>
+          <a:xfrm>
+            <a:off x="3563592" y="1433304"/>
+            <a:ext cx="1625600" cy="1625600"/>
+          </a:xfrm>
+          <a:prstGeom prst="rect">
+            <a:avLst/>
+          </a:prstGeom>
+        </p:spPr>
+      </p:pic>
+      <p:pic>
+        <p:nvPicPr>
+          <p:cNvPr id="12" name="Imagen 11">
+            <a:extLst>
+              <a:ext uri="{FF2B5EF4-FFF2-40B4-BE49-F238E27FC236}">
+                <a16:creationId xmlns:a16="http://schemas.microsoft.com/office/drawing/2014/main" id="{5FB14A80-B48A-9189-0B8A-737AE53ED5AB}"/>
+              </a:ext>
+            </a:extLst>
+          </p:cNvPr>
+          <p:cNvPicPr>
+            <a:picLocks noChangeAspect="1"/>
+          </p:cNvPicPr>
+          <p:nvPr/>
+        </p:nvPicPr>
+        <p:blipFill>
+          <a:blip r:embed="rId6">
+            <a:extLst>
+              <a:ext uri="{28A0092B-C50C-407E-A947-70E740481C1C}">
+                <a14:useLocalDpi xmlns:a14="http://schemas.microsoft.com/office/drawing/2010/main" val="0"/>
+              </a:ext>
+            </a:extLst>
+          </a:blip>
+          <a:stretch>
+            <a:fillRect/>
+          </a:stretch>
+        </p:blipFill>
+        <p:spPr>
+          <a:xfrm>
+            <a:off x="2805731" y="3799097"/>
+            <a:ext cx="5995645" cy="2529954"/>
+          </a:xfrm>
+          <a:prstGeom prst="rect">
+            <a:avLst/>
+          </a:prstGeom>
+        </p:spPr>
+      </p:pic>
+      <p:pic>
+        <p:nvPicPr>
+          <p:cNvPr id="13" name="Imagen 12">
+            <a:extLst>
+              <a:ext uri="{FF2B5EF4-FFF2-40B4-BE49-F238E27FC236}">
+                <a16:creationId xmlns:a16="http://schemas.microsoft.com/office/drawing/2014/main" id="{4C8E0E51-0E76-5EE5-722E-762E67192F7E}"/>
+              </a:ext>
+            </a:extLst>
+          </p:cNvPr>
+          <p:cNvPicPr>
+            <a:picLocks noChangeAspect="1"/>
+          </p:cNvPicPr>
+          <p:nvPr/>
+        </p:nvPicPr>
+        <p:blipFill>
+          <a:blip r:embed="rId7">
+            <a:extLst>
+              <a:ext uri="{28A0092B-C50C-407E-A947-70E740481C1C}">
+                <a14:useLocalDpi xmlns:a14="http://schemas.microsoft.com/office/drawing/2010/main" val="0"/>
+              </a:ext>
+            </a:extLst>
+          </a:blip>
+          <a:stretch>
+            <a:fillRect/>
+          </a:stretch>
+        </p:blipFill>
+        <p:spPr>
+          <a:xfrm>
+            <a:off x="11014849" y="6214095"/>
+            <a:ext cx="1080157" cy="643905"/>
+          </a:xfrm>
+          <a:prstGeom prst="rect">
+            <a:avLst/>
+          </a:prstGeom>
+        </p:spPr>
+      </p:pic>
+    </p:spTree>
+    <p:extLst>
+      <p:ext uri="{BB962C8B-B14F-4D97-AF65-F5344CB8AC3E}">
+        <p14:creationId xmlns:p14="http://schemas.microsoft.com/office/powerpoint/2010/main" val="3123342498"/>
+      </p:ext>
+    </p:extLst>
+  </p:cSld>
+  <p:clrMapOvr>
+    <a:masterClrMapping/>
+  </p:clrMapOvr>
+</p:sld>
+</file>
+
+<file path=ppt/slides/slide28.xml><?xml version="1.0" encoding="utf-8"?>
+<p:sld xmlns:a="http://schemas.openxmlformats.org/drawingml/2006/main" xmlns:r="http://schemas.openxmlformats.org/officeDocument/2006/relationships" xmlns:p="http://schemas.openxmlformats.org/presentationml/2006/main">
+  <p:cSld>
+    <p:spTree>
+      <p:nvGrpSpPr>
+        <p:cNvPr id="1" name=""/>
+        <p:cNvGrpSpPr/>
+        <p:nvPr/>
+      </p:nvGrpSpPr>
+      <p:grpSpPr>
+        <a:xfrm>
+          <a:off x="0" y="0"/>
+          <a:ext cx="0" cy="0"/>
+          <a:chOff x="0" y="0"/>
+          <a:chExt cx="0" cy="0"/>
+        </a:xfrm>
+      </p:grpSpPr>
+      <p:sp>
+        <p:nvSpPr>
+          <p:cNvPr id="4" name="Título 1">
+            <a:extLst>
+              <a:ext uri="{FF2B5EF4-FFF2-40B4-BE49-F238E27FC236}">
+                <a16:creationId xmlns:a16="http://schemas.microsoft.com/office/drawing/2014/main" id="{6D8D0538-B569-2BDA-3A8F-F526D77721BE}"/>
+              </a:ext>
+            </a:extLst>
+          </p:cNvPr>
+          <p:cNvSpPr>
+            <a:spLocks noGrp="1"/>
+          </p:cNvSpPr>
+          <p:nvPr>
+            <p:ph type="title"/>
+          </p:nvPr>
+        </p:nvSpPr>
+        <p:spPr>
+          <a:xfrm>
+            <a:off x="838200" y="0"/>
+            <a:ext cx="10515600" cy="1129494"/>
+          </a:xfrm>
+        </p:spPr>
+        <p:txBody>
+          <a:bodyPr>
+            <a:normAutofit/>
+          </a:bodyPr>
+          <a:lstStyle/>
+          <a:p>
+            <a:pPr algn="ctr"/>
+            <a:r>
+              <a:rPr lang="es-AR" b="1" dirty="0"/>
+              <a:t>Futuras líneas</a:t>
+            </a:r>
+            <a:endParaRPr lang="es-AR" dirty="0">
+              <a:highlight>
+                <a:srgbClr val="FFFF00"/>
+              </a:highlight>
+            </a:endParaRPr>
+          </a:p>
+        </p:txBody>
+      </p:sp>
+      <p:pic>
+        <p:nvPicPr>
+          <p:cNvPr id="2" name="Imagen 1">
+            <a:extLst>
+              <a:ext uri="{FF2B5EF4-FFF2-40B4-BE49-F238E27FC236}">
+                <a16:creationId xmlns:a16="http://schemas.microsoft.com/office/drawing/2014/main" id="{EDF5FF11-63E6-AE4E-FFEC-AAABDD715F86}"/>
+              </a:ext>
+            </a:extLst>
+          </p:cNvPr>
+          <p:cNvPicPr>
+            <a:picLocks noChangeAspect="1"/>
+          </p:cNvPicPr>
+          <p:nvPr/>
+        </p:nvPicPr>
+        <p:blipFill>
+          <a:blip r:embed="rId2">
+            <a:extLst>
+              <a:ext uri="{28A0092B-C50C-407E-A947-70E740481C1C}">
+                <a14:useLocalDpi xmlns:a14="http://schemas.microsoft.com/office/drawing/2010/main" val="0"/>
+              </a:ext>
+            </a:extLst>
+          </a:blip>
+          <a:stretch>
+            <a:fillRect/>
+          </a:stretch>
+        </p:blipFill>
+        <p:spPr>
+          <a:xfrm>
+            <a:off x="11014849" y="6214095"/>
+            <a:ext cx="1080157" cy="643905"/>
+          </a:xfrm>
+          <a:prstGeom prst="rect">
+            <a:avLst/>
+          </a:prstGeom>
+        </p:spPr>
+      </p:pic>
+      <p:sp>
+        <p:nvSpPr>
+          <p:cNvPr id="3" name="CuadroTexto 2">
+            <a:extLst>
+              <a:ext uri="{FF2B5EF4-FFF2-40B4-BE49-F238E27FC236}">
+                <a16:creationId xmlns:a16="http://schemas.microsoft.com/office/drawing/2014/main" id="{74377D96-58C1-B016-FFC1-53A70BDDD4CA}"/>
+              </a:ext>
+            </a:extLst>
+          </p:cNvPr>
+          <p:cNvSpPr txBox="1"/>
+          <p:nvPr/>
+        </p:nvSpPr>
+        <p:spPr>
+          <a:xfrm>
+            <a:off x="238539" y="1363470"/>
+            <a:ext cx="11529391" cy="4801314"/>
+          </a:xfrm>
+          <a:prstGeom prst="rect">
+            <a:avLst/>
+          </a:prstGeom>
+          <a:noFill/>
+        </p:spPr>
+        <p:txBody>
+          <a:bodyPr wrap="square" rtlCol="0">
+            <a:spAutoFit/>
+          </a:bodyPr>
+          <a:lstStyle/>
+          <a:p>
+            <a:r>
+              <a:rPr lang="es-AR" sz="2400" dirty="0"/>
+              <a:t>A futuro se podrían mejorar las siguientes cuestiones:</a:t>
+            </a:r>
+          </a:p>
+          <a:p>
+            <a:endParaRPr lang="es-AR" sz="2400" dirty="0"/>
+          </a:p>
+          <a:p>
+            <a:pPr algn="l">
+              <a:buFont typeface="+mj-lt"/>
+              <a:buAutoNum type="arabicPeriod"/>
+            </a:pPr>
+            <a:r>
+              <a:rPr lang="es-AR" sz="2400" b="0" i="0" dirty="0">
+                <a:effectLst/>
+                <a:latin typeface="Söhne"/>
+              </a:rPr>
+              <a:t> Se podría agregar una tabla para el registro de los horarios de los profesores, preceptores y demás empleados del instituto, con sus horarios de llegada y partida.</a:t>
+            </a:r>
+          </a:p>
+          <a:p>
+            <a:pPr algn="l">
+              <a:buFont typeface="+mj-lt"/>
+              <a:buAutoNum type="arabicPeriod"/>
+            </a:pPr>
+            <a:r>
+              <a:rPr lang="es-AR" sz="2400" b="0" i="0" dirty="0">
+                <a:effectLst/>
+                <a:latin typeface="Söhne"/>
+              </a:rPr>
+              <a:t> Incrementa la seguridad de la base de datos y evalúa si hay medidas adicionales que puedas agregar. Por ejemplo, se podría implementar autenticación de dos factores o restringir el acceso basado en roles.</a:t>
+            </a:r>
+          </a:p>
+          <a:p>
+            <a:pPr>
+              <a:buFont typeface="+mj-lt"/>
+              <a:buAutoNum type="arabicPeriod"/>
+            </a:pPr>
+            <a:r>
+              <a:rPr lang="es-AR" sz="2400" b="0" i="0" dirty="0">
+                <a:effectLst/>
+                <a:latin typeface="Söhne"/>
+              </a:rPr>
+              <a:t> También se debería analizar la eficiencia de la base de datos una vez que el proyecto vaya escalando, evaluando la eficiencia de la base de datos para determinar si hay áreas que podrían ser mejoradas, como </a:t>
+            </a:r>
+            <a:r>
+              <a:rPr lang="es-AR" sz="2400" dirty="0">
+                <a:latin typeface="Söhne"/>
+              </a:rPr>
+              <a:t>p</a:t>
+            </a:r>
+            <a:r>
+              <a:rPr lang="es-AR" sz="2400" b="0" i="0" dirty="0">
+                <a:effectLst/>
+                <a:latin typeface="Söhne"/>
+              </a:rPr>
+              <a:t>or ejemplo, identificar consultas lentas o tablas demasiado grandes que estén afectando el rendimiento y trabajar en optimizarlas.</a:t>
+            </a:r>
+          </a:p>
+          <a:p>
+            <a:pPr algn="l">
+              <a:buFont typeface="+mj-lt"/>
+              <a:buAutoNum type="arabicPeriod"/>
+            </a:pPr>
+            <a:endParaRPr lang="es-AR" sz="2400" b="0" i="0" dirty="0">
+              <a:effectLst/>
+              <a:latin typeface="Söhne"/>
+            </a:endParaRPr>
+          </a:p>
+          <a:p>
+            <a:endParaRPr lang="es-AR" dirty="0"/>
           </a:p>
         </p:txBody>
       </p:sp>
@@ -9614,10 +11346,10 @@
       </p:pic>
       <p:pic>
         <p:nvPicPr>
-          <p:cNvPr id="7" name="Imagen 6">
+          <p:cNvPr id="5" name="Imagen 4">
             <a:extLst>
               <a:ext uri="{FF2B5EF4-FFF2-40B4-BE49-F238E27FC236}">
-                <a16:creationId xmlns:a16="http://schemas.microsoft.com/office/drawing/2014/main" id="{E93D8543-A937-E2CF-1797-688BEE55F80D}"/>
+                <a16:creationId xmlns:a16="http://schemas.microsoft.com/office/drawing/2014/main" id="{F85BFDC2-7453-B424-4C12-B9DB406F1857}"/>
               </a:ext>
             </a:extLst>
           </p:cNvPr>
@@ -9640,8 +11372,8 @@
         </p:blipFill>
         <p:spPr>
           <a:xfrm>
-            <a:off x="0" y="893577"/>
-            <a:ext cx="12094148" cy="5320517"/>
+            <a:off x="47298" y="881968"/>
+            <a:ext cx="12144701" cy="5387789"/>
           </a:xfrm>
           <a:prstGeom prst="rect">
             <a:avLst/>

</xml_diff>